<commit_message>
In my previous commit, I pushed a version of the orthogonal_peptide_result_analysis.pptx file that actually had some of my updates.  I am pushing the original.  Then, in the next commit, I will push my final version.
</commit_message>
<xml_diff>
--- a/presentations/orthogonal_peptide_result_analysis.pptx
+++ b/presentations/orthogonal_peptide_result_analysis.pptx
@@ -5,17 +5,14 @@
     <p:sldMasterId id="2147483648" r:id="rId1"/>
   </p:sldMasterIdLst>
   <p:notesMasterIdLst>
-    <p:notesMasterId r:id="rId10"/>
+    <p:notesMasterId r:id="rId7"/>
   </p:notesMasterIdLst>
   <p:sldIdLst>
-    <p:sldId id="259" r:id="rId2"/>
-    <p:sldId id="263" r:id="rId3"/>
-    <p:sldId id="265" r:id="rId4"/>
-    <p:sldId id="262" r:id="rId5"/>
-    <p:sldId id="258" r:id="rId6"/>
-    <p:sldId id="267" r:id="rId7"/>
-    <p:sldId id="260" r:id="rId8"/>
-    <p:sldId id="257" r:id="rId9"/>
+    <p:sldId id="258" r:id="rId2"/>
+    <p:sldId id="259" r:id="rId3"/>
+    <p:sldId id="261" r:id="rId4"/>
+    <p:sldId id="260" r:id="rId5"/>
+    <p:sldId id="257" r:id="rId6"/>
   </p:sldIdLst>
   <p:sldSz cx="9144000" cy="6858000" type="screen4x3"/>
   <p:notesSz cx="6858000" cy="9144000"/>
@@ -532,7 +529,7 @@
           <a:p>
             <a:fld id="{C1BCBD6C-3953-C346-861F-2E605B8E2A68}" type="slidenum">
               <a:rPr lang="en-US" smtClean="0"/>
-              <a:t>8</a:t>
+              <a:t>5</a:t>
             </a:fld>
             <a:endParaRPr lang="en-US"/>
           </a:p>
@@ -3551,752 +3548,73 @@
         </p:nvSpPr>
         <p:spPr>
           <a:xfrm>
-            <a:off x="0" y="0"/>
-            <a:ext cx="9144000" cy="1077006"/>
+            <a:off x="457200" y="274638"/>
+            <a:ext cx="8229600" cy="45719"/>
           </a:xfrm>
         </p:spPr>
         <p:txBody>
           <a:bodyPr>
-            <a:normAutofit/>
+            <a:normAutofit fontScale="90000"/>
           </a:bodyPr>
           <a:lstStyle/>
           <a:p>
-            <a:r>
-              <a:rPr lang="en-US" sz="3200" dirty="0" smtClean="0">
-                <a:latin typeface="Arial Black"/>
-                <a:cs typeface="Arial Black"/>
-              </a:rPr>
-              <a:t>Before normalization, histograms of light intensity are on different scales.</a:t>
-            </a:r>
-            <a:endParaRPr lang="en-US" sz="3200" dirty="0">
-              <a:latin typeface="Arial Black"/>
-              <a:cs typeface="Arial Black"/>
-            </a:endParaRPr>
-          </a:p>
-        </p:txBody>
-      </p:sp>
-      <p:pic>
-        <p:nvPicPr>
-          <p:cNvPr id="4" name="Content Placeholder 3" descr="raw_intensity.png"/>
-          <p:cNvPicPr>
-            <a:picLocks noGrp="1" noChangeAspect="1"/>
-          </p:cNvPicPr>
+            <a:endParaRPr lang="en-US" dirty="0"/>
+          </a:p>
+        </p:txBody>
+      </p:sp>
+      <p:sp>
+        <p:nvSpPr>
+          <p:cNvPr id="3" name="Content Placeholder 2"/>
+          <p:cNvSpPr>
+            <a:spLocks noGrp="1"/>
+          </p:cNvSpPr>
           <p:nvPr>
             <p:ph idx="1"/>
           </p:nvPr>
-        </p:nvPicPr>
-        <p:blipFill>
-          <a:blip r:embed="rId2">
-            <a:extLst>
-              <a:ext uri="{28A0092B-C50C-407E-A947-70E740481C1C}">
-                <a14:useLocalDpi xmlns:a14="http://schemas.microsoft.com/office/drawing/2010/main" val="0"/>
-              </a:ext>
-            </a:extLst>
-          </a:blip>
-          <a:srcRect l="9830" r="9830"/>
-          <a:stretch>
-            <a:fillRect/>
-          </a:stretch>
-        </p:blipFill>
+        </p:nvSpPr>
         <p:spPr>
           <a:xfrm>
-            <a:off x="457200" y="1032911"/>
-            <a:ext cx="8229600" cy="5587116"/>
+            <a:off x="457200" y="465956"/>
+            <a:ext cx="8229600" cy="5660207"/>
           </a:xfrm>
         </p:spPr>
-      </p:pic>
-      <p:sp>
-        <p:nvSpPr>
-          <p:cNvPr id="3" name="TextBox 2"/>
-          <p:cNvSpPr txBox="1"/>
-          <p:nvPr/>
-        </p:nvSpPr>
-        <p:spPr>
-          <a:xfrm>
-            <a:off x="873171" y="1077006"/>
-            <a:ext cx="3249958" cy="369332"/>
-          </a:xfrm>
-          <a:prstGeom prst="rect">
-            <a:avLst/>
-          </a:prstGeom>
-          <a:solidFill>
-            <a:schemeClr val="bg1"/>
-          </a:solidFill>
-        </p:spPr>
-        <p:txBody>
-          <a:bodyPr wrap="none" rtlCol="0" anchor="b">
-            <a:spAutoFit/>
-          </a:bodyPr>
-          <a:lstStyle/>
-          <a:p>
+        <p:txBody>
+          <a:bodyPr/>
+          <a:lstStyle/>
+          <a:p>
+            <a:pPr marL="0" indent="0">
+              <a:buNone/>
+            </a:pPr>
             <a:r>
               <a:rPr lang="en-US" dirty="0" smtClean="0"/>
-              <a:t>Membrane treated with </a:t>
-            </a:r>
-            <a:r>
-              <a:rPr lang="en-US" dirty="0" err="1" smtClean="0"/>
-              <a:t>Sfp</a:t>
-            </a:r>
+              <a:t>The core idea of our analysis is:</a:t>
+            </a:r>
+          </a:p>
+          <a:p>
+            <a:pPr marL="514350" indent="-514350">
+              <a:buAutoNum type="arabicPeriod"/>
+            </a:pPr>
             <a:r>
               <a:rPr lang="en-US" dirty="0" smtClean="0"/>
-              <a:t> only</a:t>
+              <a:t>Use normal distribution to fit background light intensity for each of the four sets of experiments.</a:t>
+            </a:r>
+          </a:p>
+          <a:p>
+            <a:pPr marL="514350" indent="-514350">
+              <a:buAutoNum type="arabicPeriod"/>
+            </a:pPr>
+            <a:r>
+              <a:rPr lang="en-US" dirty="0" smtClean="0"/>
+              <a:t>Normalize light intensity to standard normal scale, so that we can compare values in four sets of experiments because they are now converted to the same condition.</a:t>
             </a:r>
             <a:endParaRPr lang="en-US" dirty="0"/>
-          </a:p>
-        </p:txBody>
-      </p:sp>
-      <p:sp>
-        <p:nvSpPr>
-          <p:cNvPr id="6" name="TextBox 5"/>
-          <p:cNvSpPr txBox="1"/>
-          <p:nvPr/>
-        </p:nvSpPr>
-        <p:spPr>
-          <a:xfrm>
-            <a:off x="2707156" y="3392580"/>
-            <a:ext cx="1415973" cy="215444"/>
-          </a:xfrm>
-          <a:prstGeom prst="rect">
-            <a:avLst/>
-          </a:prstGeom>
-          <a:noFill/>
-        </p:spPr>
-        <p:txBody>
-          <a:bodyPr wrap="none" rtlCol="0">
-            <a:spAutoFit/>
-          </a:bodyPr>
-          <a:lstStyle/>
-          <a:p>
-            <a:r>
-              <a:rPr lang="en-US" sz="800" dirty="0" smtClean="0">
-                <a:latin typeface="Andale Mono"/>
-                <a:cs typeface="Andale Mono"/>
-              </a:rPr>
-              <a:t>Integrated Intensity</a:t>
-            </a:r>
-            <a:endParaRPr lang="en-US" sz="800" dirty="0">
-              <a:latin typeface="Andale Mono"/>
-              <a:cs typeface="Andale Mono"/>
-            </a:endParaRPr>
-          </a:p>
-        </p:txBody>
-      </p:sp>
-      <p:sp>
-        <p:nvSpPr>
-          <p:cNvPr id="8" name="TextBox 7"/>
-          <p:cNvSpPr txBox="1"/>
-          <p:nvPr/>
-        </p:nvSpPr>
-        <p:spPr>
-          <a:xfrm>
-            <a:off x="5242802" y="1069255"/>
-            <a:ext cx="3745098" cy="369332"/>
-          </a:xfrm>
-          <a:prstGeom prst="rect">
-            <a:avLst/>
-          </a:prstGeom>
-          <a:solidFill>
-            <a:schemeClr val="bg1"/>
-          </a:solidFill>
-        </p:spPr>
-        <p:txBody>
-          <a:bodyPr wrap="none" rtlCol="0" anchor="b">
-            <a:spAutoFit/>
-          </a:bodyPr>
-          <a:lstStyle/>
-          <a:p>
-            <a:r>
-              <a:rPr lang="en-US" dirty="0" smtClean="0"/>
-              <a:t>Membrane treated with </a:t>
-            </a:r>
-            <a:r>
-              <a:rPr lang="en-US" dirty="0" err="1" smtClean="0"/>
-              <a:t>Sfp</a:t>
-            </a:r>
-            <a:r>
-              <a:rPr lang="en-US" dirty="0" smtClean="0"/>
-              <a:t> &amp; </a:t>
-            </a:r>
-            <a:r>
-              <a:rPr lang="en-US" dirty="0" err="1" smtClean="0"/>
-              <a:t>PfAcpH</a:t>
-            </a:r>
-            <a:endParaRPr lang="en-US" dirty="0"/>
-          </a:p>
-        </p:txBody>
-      </p:sp>
-      <p:sp>
-        <p:nvSpPr>
-          <p:cNvPr id="9" name="TextBox 8"/>
-          <p:cNvSpPr txBox="1"/>
-          <p:nvPr/>
-        </p:nvSpPr>
-        <p:spPr>
-          <a:xfrm>
-            <a:off x="793792" y="3707591"/>
-            <a:ext cx="3410684" cy="369332"/>
-          </a:xfrm>
-          <a:prstGeom prst="rect">
-            <a:avLst/>
-          </a:prstGeom>
-          <a:solidFill>
-            <a:schemeClr val="bg1"/>
-          </a:solidFill>
-        </p:spPr>
-        <p:txBody>
-          <a:bodyPr wrap="none" rtlCol="0" anchor="b">
-            <a:spAutoFit/>
-          </a:bodyPr>
-          <a:lstStyle/>
-          <a:p>
-            <a:r>
-              <a:rPr lang="en-US" dirty="0" smtClean="0"/>
-              <a:t>Membrane treated with </a:t>
-            </a:r>
-            <a:r>
-              <a:rPr lang="en-US" dirty="0" err="1" smtClean="0"/>
-              <a:t>AcpS</a:t>
-            </a:r>
-            <a:r>
-              <a:rPr lang="en-US" dirty="0" smtClean="0"/>
-              <a:t> only</a:t>
-            </a:r>
-            <a:endParaRPr lang="en-US" dirty="0"/>
-          </a:p>
-        </p:txBody>
-      </p:sp>
-      <p:sp>
-        <p:nvSpPr>
-          <p:cNvPr id="10" name="TextBox 9"/>
-          <p:cNvSpPr txBox="1"/>
-          <p:nvPr/>
-        </p:nvSpPr>
-        <p:spPr>
-          <a:xfrm>
-            <a:off x="2788503" y="6137171"/>
-            <a:ext cx="1415973" cy="215444"/>
-          </a:xfrm>
-          <a:prstGeom prst="rect">
-            <a:avLst/>
-          </a:prstGeom>
-          <a:noFill/>
-        </p:spPr>
-        <p:txBody>
-          <a:bodyPr wrap="none" rtlCol="0">
-            <a:spAutoFit/>
-          </a:bodyPr>
-          <a:lstStyle/>
-          <a:p>
-            <a:r>
-              <a:rPr lang="en-US" sz="800" dirty="0" smtClean="0">
-                <a:latin typeface="Andale Mono"/>
-                <a:cs typeface="Andale Mono"/>
-              </a:rPr>
-              <a:t>Integrated Intensity</a:t>
-            </a:r>
-            <a:endParaRPr lang="en-US" sz="800" dirty="0">
-              <a:latin typeface="Andale Mono"/>
-              <a:cs typeface="Andale Mono"/>
-            </a:endParaRPr>
-          </a:p>
-        </p:txBody>
-      </p:sp>
-      <p:sp>
-        <p:nvSpPr>
-          <p:cNvPr id="11" name="TextBox 10"/>
-          <p:cNvSpPr txBox="1"/>
-          <p:nvPr/>
-        </p:nvSpPr>
-        <p:spPr>
-          <a:xfrm>
-            <a:off x="7270827" y="3437258"/>
-            <a:ext cx="1415973" cy="215444"/>
-          </a:xfrm>
-          <a:prstGeom prst="rect">
-            <a:avLst/>
-          </a:prstGeom>
-          <a:noFill/>
-        </p:spPr>
-        <p:txBody>
-          <a:bodyPr wrap="none" rtlCol="0">
-            <a:spAutoFit/>
-          </a:bodyPr>
-          <a:lstStyle/>
-          <a:p>
-            <a:r>
-              <a:rPr lang="en-US" sz="800" dirty="0" smtClean="0">
-                <a:latin typeface="Andale Mono"/>
-                <a:cs typeface="Andale Mono"/>
-              </a:rPr>
-              <a:t>Integrated Intensity</a:t>
-            </a:r>
-            <a:endParaRPr lang="en-US" sz="800" dirty="0">
-              <a:latin typeface="Andale Mono"/>
-              <a:cs typeface="Andale Mono"/>
-            </a:endParaRPr>
-          </a:p>
-        </p:txBody>
-      </p:sp>
-      <p:sp>
-        <p:nvSpPr>
-          <p:cNvPr id="12" name="TextBox 11"/>
-          <p:cNvSpPr txBox="1"/>
-          <p:nvPr/>
-        </p:nvSpPr>
-        <p:spPr>
-          <a:xfrm>
-            <a:off x="7270827" y="6111035"/>
-            <a:ext cx="1415973" cy="215444"/>
-          </a:xfrm>
-          <a:prstGeom prst="rect">
-            <a:avLst/>
-          </a:prstGeom>
-          <a:noFill/>
-        </p:spPr>
-        <p:txBody>
-          <a:bodyPr wrap="none" rtlCol="0">
-            <a:spAutoFit/>
-          </a:bodyPr>
-          <a:lstStyle/>
-          <a:p>
-            <a:r>
-              <a:rPr lang="en-US" sz="800" dirty="0" smtClean="0">
-                <a:latin typeface="Andale Mono"/>
-                <a:cs typeface="Andale Mono"/>
-              </a:rPr>
-              <a:t>Integrated Intensity</a:t>
-            </a:r>
-            <a:endParaRPr lang="en-US" sz="800" dirty="0">
-              <a:latin typeface="Andale Mono"/>
-              <a:cs typeface="Andale Mono"/>
-            </a:endParaRPr>
-          </a:p>
-        </p:txBody>
-      </p:sp>
-      <p:sp>
-        <p:nvSpPr>
-          <p:cNvPr id="13" name="TextBox 12"/>
-          <p:cNvSpPr txBox="1"/>
-          <p:nvPr/>
-        </p:nvSpPr>
-        <p:spPr>
-          <a:xfrm>
-            <a:off x="5060047" y="3707591"/>
-            <a:ext cx="3905824" cy="369332"/>
-          </a:xfrm>
-          <a:prstGeom prst="rect">
-            <a:avLst/>
-          </a:prstGeom>
-          <a:solidFill>
-            <a:schemeClr val="bg1"/>
-          </a:solidFill>
-        </p:spPr>
-        <p:txBody>
-          <a:bodyPr wrap="none" rtlCol="0" anchor="b">
-            <a:spAutoFit/>
-          </a:bodyPr>
-          <a:lstStyle/>
-          <a:p>
-            <a:r>
-              <a:rPr lang="en-US" dirty="0" smtClean="0"/>
-              <a:t>Membrane treated with </a:t>
-            </a:r>
-            <a:r>
-              <a:rPr lang="en-US" dirty="0" err="1" smtClean="0"/>
-              <a:t>AcpS</a:t>
-            </a:r>
-            <a:r>
-              <a:rPr lang="en-US" dirty="0" smtClean="0"/>
-              <a:t> &amp; </a:t>
-            </a:r>
-            <a:r>
-              <a:rPr lang="en-US" dirty="0" err="1" smtClean="0"/>
-              <a:t>PfAcpH</a:t>
-            </a:r>
-            <a:endParaRPr lang="en-US" dirty="0"/>
-          </a:p>
-        </p:txBody>
-      </p:sp>
-      <p:cxnSp>
-        <p:nvCxnSpPr>
-          <p:cNvPr id="18" name="Straight Arrow Connector 17"/>
-          <p:cNvCxnSpPr/>
-          <p:nvPr/>
-        </p:nvCxnSpPr>
-        <p:spPr>
-          <a:xfrm flipV="1">
-            <a:off x="1631676" y="3437258"/>
-            <a:ext cx="0" cy="170766"/>
-          </a:xfrm>
-          <a:prstGeom prst="straightConnector1">
-            <a:avLst/>
-          </a:prstGeom>
-          <a:ln>
-            <a:solidFill>
-              <a:srgbClr val="FF0000"/>
-            </a:solidFill>
-            <a:tailEnd type="arrow"/>
-          </a:ln>
-        </p:spPr>
-        <p:style>
-          <a:lnRef idx="2">
-            <a:schemeClr val="accent1"/>
-          </a:lnRef>
-          <a:fillRef idx="0">
-            <a:schemeClr val="accent1"/>
-          </a:fillRef>
-          <a:effectRef idx="1">
-            <a:schemeClr val="accent1"/>
-          </a:effectRef>
-          <a:fontRef idx="minor">
-            <a:schemeClr val="tx1"/>
-          </a:fontRef>
-        </p:style>
-      </p:cxnSp>
-      <p:sp>
-        <p:nvSpPr>
-          <p:cNvPr id="21" name="Title 1"/>
-          <p:cNvSpPr txBox="1">
-            <a:spLocks/>
-          </p:cNvSpPr>
-          <p:nvPr/>
-        </p:nvSpPr>
-        <p:spPr>
-          <a:xfrm>
-            <a:off x="704021" y="3567185"/>
-            <a:ext cx="2384502" cy="280811"/>
-          </a:xfrm>
-          <a:prstGeom prst="rect">
-            <a:avLst/>
-          </a:prstGeom>
-        </p:spPr>
-        <p:txBody>
-          <a:bodyPr vert="horz" lIns="91440" tIns="45720" rIns="91440" bIns="45720" rtlCol="0" anchor="ctr">
-            <a:normAutofit/>
-          </a:bodyPr>
-          <a:lstStyle>
-            <a:lvl1pPr algn="ctr" defTabSz="457200" rtl="0" eaLnBrk="1" latinLnBrk="0" hangingPunct="1">
-              <a:spcBef>
-                <a:spcPct val="0"/>
-              </a:spcBef>
-              <a:buNone/>
-              <a:defRPr sz="4400" kern="1200">
-                <a:solidFill>
-                  <a:schemeClr val="tx1"/>
-                </a:solidFill>
-                <a:latin typeface="+mj-lt"/>
-                <a:ea typeface="+mj-ea"/>
-                <a:cs typeface="+mj-cs"/>
-              </a:defRPr>
-            </a:lvl1pPr>
-          </a:lstStyle>
-          <a:p>
-            <a:r>
-              <a:rPr lang="en-US" sz="1200" dirty="0" smtClean="0">
-                <a:solidFill>
-                  <a:srgbClr val="FF0000"/>
-                </a:solidFill>
-                <a:latin typeface="Arial Black"/>
-                <a:cs typeface="Arial Black"/>
-              </a:rPr>
-              <a:t>Centered near 1500 </a:t>
-            </a:r>
-            <a:endParaRPr lang="en-US" sz="1200" dirty="0">
-              <a:solidFill>
-                <a:srgbClr val="FF0000"/>
-              </a:solidFill>
-              <a:latin typeface="Arial Black"/>
-              <a:cs typeface="Arial Black"/>
-            </a:endParaRPr>
-          </a:p>
-        </p:txBody>
-      </p:sp>
-      <p:cxnSp>
-        <p:nvCxnSpPr>
-          <p:cNvPr id="22" name="Straight Arrow Connector 21"/>
-          <p:cNvCxnSpPr/>
-          <p:nvPr/>
-        </p:nvCxnSpPr>
-        <p:spPr>
-          <a:xfrm flipV="1">
-            <a:off x="1457740" y="6047327"/>
-            <a:ext cx="0" cy="170766"/>
-          </a:xfrm>
-          <a:prstGeom prst="straightConnector1">
-            <a:avLst/>
-          </a:prstGeom>
-          <a:ln>
-            <a:solidFill>
-              <a:srgbClr val="FF0000"/>
-            </a:solidFill>
-            <a:tailEnd type="arrow"/>
-          </a:ln>
-        </p:spPr>
-        <p:style>
-          <a:lnRef idx="2">
-            <a:schemeClr val="accent1"/>
-          </a:lnRef>
-          <a:fillRef idx="0">
-            <a:schemeClr val="accent1"/>
-          </a:fillRef>
-          <a:effectRef idx="1">
-            <a:schemeClr val="accent1"/>
-          </a:effectRef>
-          <a:fontRef idx="minor">
-            <a:schemeClr val="tx1"/>
-          </a:fontRef>
-        </p:style>
-      </p:cxnSp>
-      <p:sp>
-        <p:nvSpPr>
-          <p:cNvPr id="23" name="Title 1"/>
-          <p:cNvSpPr txBox="1">
-            <a:spLocks/>
-          </p:cNvSpPr>
-          <p:nvPr/>
-        </p:nvSpPr>
-        <p:spPr>
-          <a:xfrm>
-            <a:off x="530085" y="6177254"/>
-            <a:ext cx="2384502" cy="280811"/>
-          </a:xfrm>
-          <a:prstGeom prst="rect">
-            <a:avLst/>
-          </a:prstGeom>
-        </p:spPr>
-        <p:txBody>
-          <a:bodyPr vert="horz" lIns="91440" tIns="45720" rIns="91440" bIns="45720" rtlCol="0" anchor="ctr">
-            <a:normAutofit/>
-          </a:bodyPr>
-          <a:lstStyle>
-            <a:lvl1pPr algn="ctr" defTabSz="457200" rtl="0" eaLnBrk="1" latinLnBrk="0" hangingPunct="1">
-              <a:spcBef>
-                <a:spcPct val="0"/>
-              </a:spcBef>
-              <a:buNone/>
-              <a:defRPr sz="4400" kern="1200">
-                <a:solidFill>
-                  <a:schemeClr val="tx1"/>
-                </a:solidFill>
-                <a:latin typeface="+mj-lt"/>
-                <a:ea typeface="+mj-ea"/>
-                <a:cs typeface="+mj-cs"/>
-              </a:defRPr>
-            </a:lvl1pPr>
-          </a:lstStyle>
-          <a:p>
-            <a:r>
-              <a:rPr lang="en-US" sz="1200" dirty="0" smtClean="0">
-                <a:solidFill>
-                  <a:srgbClr val="FF0000"/>
-                </a:solidFill>
-                <a:latin typeface="Arial Black"/>
-                <a:cs typeface="Arial Black"/>
-              </a:rPr>
-              <a:t>Centered near 1200 </a:t>
-            </a:r>
-            <a:endParaRPr lang="en-US" sz="1200" dirty="0">
-              <a:solidFill>
-                <a:srgbClr val="FF0000"/>
-              </a:solidFill>
-              <a:latin typeface="Arial Black"/>
-              <a:cs typeface="Arial Black"/>
-            </a:endParaRPr>
-          </a:p>
-        </p:txBody>
-      </p:sp>
-      <p:cxnSp>
-        <p:nvCxnSpPr>
-          <p:cNvPr id="24" name="Straight Arrow Connector 23"/>
-          <p:cNvCxnSpPr/>
-          <p:nvPr/>
-        </p:nvCxnSpPr>
-        <p:spPr>
-          <a:xfrm flipV="1">
-            <a:off x="5909747" y="3419620"/>
-            <a:ext cx="0" cy="170766"/>
-          </a:xfrm>
-          <a:prstGeom prst="straightConnector1">
-            <a:avLst/>
-          </a:prstGeom>
-          <a:ln>
-            <a:solidFill>
-              <a:srgbClr val="FF0000"/>
-            </a:solidFill>
-            <a:tailEnd type="arrow"/>
-          </a:ln>
-        </p:spPr>
-        <p:style>
-          <a:lnRef idx="2">
-            <a:schemeClr val="accent1"/>
-          </a:lnRef>
-          <a:fillRef idx="0">
-            <a:schemeClr val="accent1"/>
-          </a:fillRef>
-          <a:effectRef idx="1">
-            <a:schemeClr val="accent1"/>
-          </a:effectRef>
-          <a:fontRef idx="minor">
-            <a:schemeClr val="tx1"/>
-          </a:fontRef>
-        </p:style>
-      </p:cxnSp>
-      <p:sp>
-        <p:nvSpPr>
-          <p:cNvPr id="25" name="Title 1"/>
-          <p:cNvSpPr txBox="1">
-            <a:spLocks/>
-          </p:cNvSpPr>
-          <p:nvPr/>
-        </p:nvSpPr>
-        <p:spPr>
-          <a:xfrm>
-            <a:off x="4982092" y="3549547"/>
-            <a:ext cx="2384502" cy="280811"/>
-          </a:xfrm>
-          <a:prstGeom prst="rect">
-            <a:avLst/>
-          </a:prstGeom>
-        </p:spPr>
-        <p:txBody>
-          <a:bodyPr vert="horz" lIns="91440" tIns="45720" rIns="91440" bIns="45720" rtlCol="0" anchor="ctr">
-            <a:normAutofit/>
-          </a:bodyPr>
-          <a:lstStyle>
-            <a:lvl1pPr algn="ctr" defTabSz="457200" rtl="0" eaLnBrk="1" latinLnBrk="0" hangingPunct="1">
-              <a:spcBef>
-                <a:spcPct val="0"/>
-              </a:spcBef>
-              <a:buNone/>
-              <a:defRPr sz="4400" kern="1200">
-                <a:solidFill>
-                  <a:schemeClr val="tx1"/>
-                </a:solidFill>
-                <a:latin typeface="+mj-lt"/>
-                <a:ea typeface="+mj-ea"/>
-                <a:cs typeface="+mj-cs"/>
-              </a:defRPr>
-            </a:lvl1pPr>
-          </a:lstStyle>
-          <a:p>
-            <a:r>
-              <a:rPr lang="en-US" sz="1200" dirty="0" smtClean="0">
-                <a:solidFill>
-                  <a:srgbClr val="FF0000"/>
-                </a:solidFill>
-                <a:latin typeface="Arial Black"/>
-                <a:cs typeface="Arial Black"/>
-              </a:rPr>
-              <a:t>Centered near 1100 </a:t>
-            </a:r>
-            <a:endParaRPr lang="en-US" sz="1200" dirty="0">
-              <a:solidFill>
-                <a:srgbClr val="FF0000"/>
-              </a:solidFill>
-              <a:latin typeface="Arial Black"/>
-              <a:cs typeface="Arial Black"/>
-            </a:endParaRPr>
-          </a:p>
-        </p:txBody>
-      </p:sp>
-      <p:cxnSp>
-        <p:nvCxnSpPr>
-          <p:cNvPr id="26" name="Straight Arrow Connector 25"/>
-          <p:cNvCxnSpPr/>
-          <p:nvPr/>
-        </p:nvCxnSpPr>
-        <p:spPr>
-          <a:xfrm flipV="1">
-            <a:off x="5980306" y="6047327"/>
-            <a:ext cx="0" cy="170766"/>
-          </a:xfrm>
-          <a:prstGeom prst="straightConnector1">
-            <a:avLst/>
-          </a:prstGeom>
-          <a:ln>
-            <a:solidFill>
-              <a:srgbClr val="FF0000"/>
-            </a:solidFill>
-            <a:tailEnd type="arrow"/>
-          </a:ln>
-        </p:spPr>
-        <p:style>
-          <a:lnRef idx="2">
-            <a:schemeClr val="accent1"/>
-          </a:lnRef>
-          <a:fillRef idx="0">
-            <a:schemeClr val="accent1"/>
-          </a:fillRef>
-          <a:effectRef idx="1">
-            <a:schemeClr val="accent1"/>
-          </a:effectRef>
-          <a:fontRef idx="minor">
-            <a:schemeClr val="tx1"/>
-          </a:fontRef>
-        </p:style>
-      </p:cxnSp>
-      <p:sp>
-        <p:nvSpPr>
-          <p:cNvPr id="27" name="Title 1"/>
-          <p:cNvSpPr txBox="1">
-            <a:spLocks/>
-          </p:cNvSpPr>
-          <p:nvPr/>
-        </p:nvSpPr>
-        <p:spPr>
-          <a:xfrm>
-            <a:off x="5052651" y="6177254"/>
-            <a:ext cx="2384502" cy="280811"/>
-          </a:xfrm>
-          <a:prstGeom prst="rect">
-            <a:avLst/>
-          </a:prstGeom>
-        </p:spPr>
-        <p:txBody>
-          <a:bodyPr vert="horz" lIns="91440" tIns="45720" rIns="91440" bIns="45720" rtlCol="0" anchor="ctr">
-            <a:normAutofit/>
-          </a:bodyPr>
-          <a:lstStyle>
-            <a:lvl1pPr algn="ctr" defTabSz="457200" rtl="0" eaLnBrk="1" latinLnBrk="0" hangingPunct="1">
-              <a:spcBef>
-                <a:spcPct val="0"/>
-              </a:spcBef>
-              <a:buNone/>
-              <a:defRPr sz="4400" kern="1200">
-                <a:solidFill>
-                  <a:schemeClr val="tx1"/>
-                </a:solidFill>
-                <a:latin typeface="+mj-lt"/>
-                <a:ea typeface="+mj-ea"/>
-                <a:cs typeface="+mj-cs"/>
-              </a:defRPr>
-            </a:lvl1pPr>
-          </a:lstStyle>
-          <a:p>
-            <a:r>
-              <a:rPr lang="en-US" sz="1200" dirty="0" smtClean="0">
-                <a:solidFill>
-                  <a:srgbClr val="FF0000"/>
-                </a:solidFill>
-                <a:latin typeface="Arial Black"/>
-                <a:cs typeface="Arial Black"/>
-              </a:rPr>
-              <a:t>Centered near 1200 </a:t>
-            </a:r>
-            <a:endParaRPr lang="en-US" sz="1200" dirty="0">
-              <a:solidFill>
-                <a:srgbClr val="FF0000"/>
-              </a:solidFill>
-              <a:latin typeface="Arial Black"/>
-              <a:cs typeface="Arial Black"/>
-            </a:endParaRPr>
           </a:p>
         </p:txBody>
       </p:sp>
     </p:spTree>
     <p:extLst>
       <p:ext uri="{BB962C8B-B14F-4D97-AF65-F5344CB8AC3E}">
-        <p14:creationId xmlns:p14="http://schemas.microsoft.com/office/powerpoint/2010/main" val="2144814738"/>
+        <p14:creationId xmlns:p14="http://schemas.microsoft.com/office/powerpoint/2010/main" val="182862864"/>
       </p:ext>
     </p:extLst>
   </p:cSld>
@@ -4335,27 +3653,21 @@
         </p:nvSpPr>
         <p:spPr>
           <a:xfrm>
-            <a:off x="0" y="0"/>
-            <a:ext cx="9144000" cy="1077006"/>
+            <a:off x="457200" y="0"/>
+            <a:ext cx="8229600" cy="392865"/>
           </a:xfrm>
         </p:spPr>
         <p:txBody>
           <a:bodyPr>
-            <a:normAutofit/>
+            <a:normAutofit fontScale="90000"/>
           </a:bodyPr>
           <a:lstStyle/>
           <a:p>
             <a:r>
-              <a:rPr lang="en-US" sz="3200" dirty="0" smtClean="0">
-                <a:latin typeface="Arial Black"/>
-                <a:cs typeface="Arial Black"/>
-              </a:rPr>
-              <a:t>The previous normalization method only partially addressed this issue.</a:t>
-            </a:r>
-            <a:endParaRPr lang="en-US" sz="3200" dirty="0">
-              <a:latin typeface="Arial Black"/>
-              <a:cs typeface="Arial Black"/>
-            </a:endParaRPr>
+              <a:rPr lang="en-US" dirty="0" smtClean="0"/>
+              <a:t>Histogram plot before normalization</a:t>
+            </a:r>
+            <a:endParaRPr lang="en-US" dirty="0"/>
           </a:p>
         </p:txBody>
       </p:sp>
@@ -4369,7 +3681,7 @@
             <p:ph idx="1"/>
           </p:nvPr>
         </p:nvPicPr>
-        <p:blipFill rotWithShape="1">
+        <p:blipFill>
           <a:blip r:embed="rId2">
             <a:extLst>
               <a:ext uri="{28A0092B-C50C-407E-A947-70E740481C1C}">
@@ -4377,407 +3689,22 @@
               </a:ext>
             </a:extLst>
           </a:blip>
-          <a:srcRect l="9959" r="50684"/>
-          <a:stretch/>
+          <a:srcRect l="9830" r="9830"/>
+          <a:stretch>
+            <a:fillRect/>
+          </a:stretch>
         </p:blipFill>
         <p:spPr>
           <a:xfrm>
-            <a:off x="33840" y="1465042"/>
-            <a:ext cx="3979195" cy="5587116"/>
+            <a:off x="457200" y="539047"/>
+            <a:ext cx="8229600" cy="5587116"/>
           </a:xfrm>
         </p:spPr>
       </p:pic>
-      <p:sp>
-        <p:nvSpPr>
-          <p:cNvPr id="3" name="TextBox 2"/>
-          <p:cNvSpPr txBox="1"/>
-          <p:nvPr/>
-        </p:nvSpPr>
-        <p:spPr>
-          <a:xfrm>
-            <a:off x="343971" y="1509137"/>
-            <a:ext cx="3249958" cy="369332"/>
-          </a:xfrm>
-          <a:prstGeom prst="rect">
-            <a:avLst/>
-          </a:prstGeom>
-          <a:solidFill>
-            <a:schemeClr val="bg1"/>
-          </a:solidFill>
-        </p:spPr>
-        <p:txBody>
-          <a:bodyPr wrap="none" rtlCol="0" anchor="b">
-            <a:spAutoFit/>
-          </a:bodyPr>
-          <a:lstStyle/>
-          <a:p>
-            <a:r>
-              <a:rPr lang="en-US" dirty="0" smtClean="0"/>
-              <a:t>Membrane treated with </a:t>
-            </a:r>
-            <a:r>
-              <a:rPr lang="en-US" dirty="0" err="1" smtClean="0"/>
-              <a:t>Sfp</a:t>
-            </a:r>
-            <a:r>
-              <a:rPr lang="en-US" dirty="0" smtClean="0"/>
-              <a:t> only</a:t>
-            </a:r>
-            <a:endParaRPr lang="en-US" dirty="0"/>
-          </a:p>
-        </p:txBody>
-      </p:sp>
-      <p:sp>
-        <p:nvSpPr>
-          <p:cNvPr id="6" name="TextBox 5"/>
-          <p:cNvSpPr txBox="1"/>
-          <p:nvPr/>
-        </p:nvSpPr>
-        <p:spPr>
-          <a:xfrm>
-            <a:off x="2389636" y="3824711"/>
-            <a:ext cx="1415973" cy="215444"/>
-          </a:xfrm>
-          <a:prstGeom prst="rect">
-            <a:avLst/>
-          </a:prstGeom>
-          <a:noFill/>
-        </p:spPr>
-        <p:txBody>
-          <a:bodyPr wrap="none" rtlCol="0">
-            <a:spAutoFit/>
-          </a:bodyPr>
-          <a:lstStyle/>
-          <a:p>
-            <a:r>
-              <a:rPr lang="en-US" sz="800" dirty="0" smtClean="0">
-                <a:latin typeface="Andale Mono"/>
-                <a:cs typeface="Andale Mono"/>
-              </a:rPr>
-              <a:t>Integrated Intensity</a:t>
-            </a:r>
-            <a:endParaRPr lang="en-US" sz="800" dirty="0">
-              <a:latin typeface="Andale Mono"/>
-              <a:cs typeface="Andale Mono"/>
-            </a:endParaRPr>
-          </a:p>
-        </p:txBody>
-      </p:sp>
-      <p:sp>
-        <p:nvSpPr>
-          <p:cNvPr id="9" name="TextBox 8"/>
-          <p:cNvSpPr txBox="1"/>
-          <p:nvPr/>
-        </p:nvSpPr>
-        <p:spPr>
-          <a:xfrm>
-            <a:off x="317512" y="4148541"/>
-            <a:ext cx="3410684" cy="369332"/>
-          </a:xfrm>
-          <a:prstGeom prst="rect">
-            <a:avLst/>
-          </a:prstGeom>
-          <a:solidFill>
-            <a:schemeClr val="bg1"/>
-          </a:solidFill>
-        </p:spPr>
-        <p:txBody>
-          <a:bodyPr wrap="none" rtlCol="0" anchor="b">
-            <a:spAutoFit/>
-          </a:bodyPr>
-          <a:lstStyle/>
-          <a:p>
-            <a:r>
-              <a:rPr lang="en-US" dirty="0" smtClean="0"/>
-              <a:t>Membrane treated with </a:t>
-            </a:r>
-            <a:r>
-              <a:rPr lang="en-US" dirty="0" err="1" smtClean="0"/>
-              <a:t>AcpS</a:t>
-            </a:r>
-            <a:r>
-              <a:rPr lang="en-US" dirty="0" smtClean="0"/>
-              <a:t> only</a:t>
-            </a:r>
-            <a:endParaRPr lang="en-US" dirty="0"/>
-          </a:p>
-        </p:txBody>
-      </p:sp>
-      <p:sp>
-        <p:nvSpPr>
-          <p:cNvPr id="10" name="TextBox 9"/>
-          <p:cNvSpPr txBox="1"/>
-          <p:nvPr/>
-        </p:nvSpPr>
-        <p:spPr>
-          <a:xfrm>
-            <a:off x="2470983" y="6569302"/>
-            <a:ext cx="1415973" cy="215444"/>
-          </a:xfrm>
-          <a:prstGeom prst="rect">
-            <a:avLst/>
-          </a:prstGeom>
-          <a:noFill/>
-        </p:spPr>
-        <p:txBody>
-          <a:bodyPr wrap="none" rtlCol="0">
-            <a:spAutoFit/>
-          </a:bodyPr>
-          <a:lstStyle/>
-          <a:p>
-            <a:r>
-              <a:rPr lang="en-US" sz="800" dirty="0" smtClean="0">
-                <a:latin typeface="Andale Mono"/>
-                <a:cs typeface="Andale Mono"/>
-              </a:rPr>
-              <a:t>Integrated Intensity</a:t>
-            </a:r>
-            <a:endParaRPr lang="en-US" sz="800" dirty="0">
-              <a:latin typeface="Andale Mono"/>
-              <a:cs typeface="Andale Mono"/>
-            </a:endParaRPr>
-          </a:p>
-        </p:txBody>
-      </p:sp>
-      <p:sp>
-        <p:nvSpPr>
-          <p:cNvPr id="7" name="TextBox 6"/>
-          <p:cNvSpPr txBox="1"/>
-          <p:nvPr/>
-        </p:nvSpPr>
-        <p:spPr>
-          <a:xfrm>
-            <a:off x="4542233" y="1596267"/>
-            <a:ext cx="3951302" cy="4801315"/>
-          </a:xfrm>
-          <a:prstGeom prst="rect">
-            <a:avLst/>
-          </a:prstGeom>
-          <a:noFill/>
-        </p:spPr>
-        <p:txBody>
-          <a:bodyPr wrap="square" rtlCol="0">
-            <a:spAutoFit/>
-          </a:bodyPr>
-          <a:lstStyle/>
-          <a:p>
-            <a:r>
-              <a:rPr lang="en-US" dirty="0" smtClean="0"/>
-              <a:t>For the moment, let’s focus on images taken from membranes treated by </a:t>
-            </a:r>
-            <a:r>
-              <a:rPr lang="en-US" dirty="0" err="1" smtClean="0"/>
-              <a:t>Sfp</a:t>
-            </a:r>
-            <a:r>
-              <a:rPr lang="en-US" dirty="0"/>
-              <a:t> </a:t>
-            </a:r>
-            <a:r>
-              <a:rPr lang="en-US" dirty="0" smtClean="0"/>
-              <a:t>only and </a:t>
-            </a:r>
-            <a:r>
-              <a:rPr lang="en-US" dirty="0" err="1" smtClean="0"/>
-              <a:t>AcpS</a:t>
-            </a:r>
-            <a:r>
-              <a:rPr lang="en-US" dirty="0"/>
-              <a:t> </a:t>
-            </a:r>
-            <a:r>
-              <a:rPr lang="en-US" dirty="0" smtClean="0"/>
-              <a:t>only.</a:t>
-            </a:r>
-          </a:p>
-          <a:p>
-            <a:endParaRPr lang="en-US" dirty="0"/>
-          </a:p>
-          <a:p>
-            <a:r>
-              <a:rPr lang="en-US" dirty="0" smtClean="0"/>
-              <a:t>The previous normalization method performed the following calculation for these images:</a:t>
-            </a:r>
-          </a:p>
-          <a:p>
-            <a:endParaRPr lang="en-US" dirty="0"/>
-          </a:p>
-          <a:p>
-            <a:r>
-              <a:rPr lang="en-US" dirty="0" smtClean="0"/>
-              <a:t>Normalized Intensity = </a:t>
-            </a:r>
-          </a:p>
-          <a:p>
-            <a:r>
-              <a:rPr lang="en-US" dirty="0" smtClean="0"/>
-              <a:t>(Raw Intensity – MIN) / (MAX – MIN)</a:t>
-            </a:r>
-          </a:p>
-          <a:p>
-            <a:endParaRPr lang="en-US" dirty="0"/>
-          </a:p>
-          <a:p>
-            <a:r>
-              <a:rPr lang="en-US" dirty="0" smtClean="0"/>
-              <a:t>Where MIN &amp; MAX are the minimum and maximum intensities across all spots in both membranes.</a:t>
-            </a:r>
-          </a:p>
-          <a:p>
-            <a:endParaRPr lang="en-US" dirty="0"/>
-          </a:p>
-          <a:p>
-            <a:r>
-              <a:rPr lang="en-US" dirty="0" smtClean="0"/>
-              <a:t>MIN=</a:t>
-            </a:r>
-            <a:r>
-              <a:rPr lang="en-US" dirty="0"/>
-              <a:t>763.514</a:t>
-            </a:r>
-            <a:r>
-              <a:rPr lang="en-US" dirty="0"/>
-              <a:t> </a:t>
-            </a:r>
-            <a:endParaRPr lang="en-US" dirty="0" smtClean="0"/>
-          </a:p>
-          <a:p>
-            <a:r>
-              <a:rPr lang="en-US" dirty="0" smtClean="0"/>
-              <a:t>MAX=4183.726</a:t>
-            </a:r>
-            <a:endParaRPr lang="en-US" dirty="0"/>
-          </a:p>
-        </p:txBody>
-      </p:sp>
-      <p:sp>
-        <p:nvSpPr>
-          <p:cNvPr id="28" name="Title 1"/>
-          <p:cNvSpPr txBox="1">
-            <a:spLocks/>
-          </p:cNvSpPr>
-          <p:nvPr/>
-        </p:nvSpPr>
-        <p:spPr>
-          <a:xfrm>
-            <a:off x="93292" y="892130"/>
-            <a:ext cx="3765237" cy="924606"/>
-          </a:xfrm>
-          <a:prstGeom prst="rect">
-            <a:avLst/>
-          </a:prstGeom>
-        </p:spPr>
-        <p:txBody>
-          <a:bodyPr vert="horz" lIns="91440" tIns="45720" rIns="91440" bIns="45720" rtlCol="0" anchor="ctr">
-            <a:normAutofit fontScale="92500"/>
-          </a:bodyPr>
-          <a:lstStyle>
-            <a:lvl1pPr algn="ctr" defTabSz="457200" rtl="0" eaLnBrk="1" latinLnBrk="0" hangingPunct="1">
-              <a:spcBef>
-                <a:spcPct val="0"/>
-              </a:spcBef>
-              <a:buNone/>
-              <a:defRPr sz="4400" kern="1200">
-                <a:solidFill>
-                  <a:schemeClr val="tx1"/>
-                </a:solidFill>
-                <a:latin typeface="+mj-lt"/>
-                <a:ea typeface="+mj-ea"/>
-                <a:cs typeface="+mj-cs"/>
-              </a:defRPr>
-            </a:lvl1pPr>
-          </a:lstStyle>
-          <a:p>
-            <a:r>
-              <a:rPr lang="en-US" sz="3200" u="sng" dirty="0" smtClean="0">
-                <a:latin typeface="Arial"/>
-                <a:cs typeface="Arial"/>
-              </a:rPr>
-              <a:t>Before normalization</a:t>
-            </a:r>
-            <a:endParaRPr lang="en-US" sz="3200" u="sng" dirty="0">
-              <a:latin typeface="Arial"/>
-              <a:cs typeface="Arial"/>
-            </a:endParaRPr>
-          </a:p>
-        </p:txBody>
-      </p:sp>
-      <p:cxnSp>
-        <p:nvCxnSpPr>
-          <p:cNvPr id="29" name="Straight Arrow Connector 28"/>
-          <p:cNvCxnSpPr/>
-          <p:nvPr/>
-        </p:nvCxnSpPr>
-        <p:spPr>
-          <a:xfrm flipV="1">
-            <a:off x="1173042" y="3869389"/>
-            <a:ext cx="0" cy="170766"/>
-          </a:xfrm>
-          <a:prstGeom prst="straightConnector1">
-            <a:avLst/>
-          </a:prstGeom>
-          <a:ln>
-            <a:solidFill>
-              <a:srgbClr val="FF0000"/>
-            </a:solidFill>
-            <a:tailEnd type="arrow"/>
-          </a:ln>
-        </p:spPr>
-        <p:style>
-          <a:lnRef idx="2">
-            <a:schemeClr val="accent1"/>
-          </a:lnRef>
-          <a:fillRef idx="0">
-            <a:schemeClr val="accent1"/>
-          </a:fillRef>
-          <a:effectRef idx="1">
-            <a:schemeClr val="accent1"/>
-          </a:effectRef>
-          <a:fontRef idx="minor">
-            <a:schemeClr val="tx1"/>
-          </a:fontRef>
-        </p:style>
-      </p:cxnSp>
-      <p:cxnSp>
-        <p:nvCxnSpPr>
-          <p:cNvPr id="30" name="Straight Arrow Connector 29"/>
-          <p:cNvCxnSpPr/>
-          <p:nvPr/>
-        </p:nvCxnSpPr>
-        <p:spPr>
-          <a:xfrm flipV="1">
-            <a:off x="999106" y="6479458"/>
-            <a:ext cx="0" cy="170766"/>
-          </a:xfrm>
-          <a:prstGeom prst="straightConnector1">
-            <a:avLst/>
-          </a:prstGeom>
-          <a:ln>
-            <a:solidFill>
-              <a:srgbClr val="FF0000"/>
-            </a:solidFill>
-            <a:tailEnd type="arrow"/>
-          </a:ln>
-        </p:spPr>
-        <p:style>
-          <a:lnRef idx="2">
-            <a:schemeClr val="accent1"/>
-          </a:lnRef>
-          <a:fillRef idx="0">
-            <a:schemeClr val="accent1"/>
-          </a:fillRef>
-          <a:effectRef idx="1">
-            <a:schemeClr val="accent1"/>
-          </a:effectRef>
-          <a:fontRef idx="minor">
-            <a:schemeClr val="tx1"/>
-          </a:fontRef>
-        </p:style>
-      </p:cxnSp>
     </p:spTree>
     <p:extLst>
       <p:ext uri="{BB962C8B-B14F-4D97-AF65-F5344CB8AC3E}">
-        <p14:creationId xmlns:p14="http://schemas.microsoft.com/office/powerpoint/2010/main" val="285508875"/>
+        <p14:creationId xmlns:p14="http://schemas.microsoft.com/office/powerpoint/2010/main" val="2144814738"/>
       </p:ext>
     </p:extLst>
   </p:cSld>
@@ -4804,1001 +3731,298 @@
           <a:chExt cx="0" cy="0"/>
         </a:xfrm>
       </p:grpSpPr>
-      <p:pic>
-        <p:nvPicPr>
-          <p:cNvPr id="19" name="Content Placeholder 11" descr="2014-05-28-plot-of-old-normalization.pdf"/>
-          <p:cNvPicPr>
-            <a:picLocks noChangeAspect="1"/>
-          </p:cNvPicPr>
-          <p:nvPr/>
-        </p:nvPicPr>
-        <p:blipFill rotWithShape="1">
-          <a:blip r:embed="rId2">
-            <a:extLst>
-              <a:ext uri="{28A0092B-C50C-407E-A947-70E740481C1C}">
-                <a14:useLocalDpi xmlns:a14="http://schemas.microsoft.com/office/drawing/2010/main" val="0"/>
-              </a:ext>
-            </a:extLst>
-          </a:blip>
-          <a:srcRect l="11378" t="28751" r="51326" b="26203"/>
-          <a:stretch/>
-        </p:blipFill>
+      <p:sp>
+        <p:nvSpPr>
+          <p:cNvPr id="2" name="Title 1"/>
+          <p:cNvSpPr>
+            <a:spLocks noGrp="1"/>
+          </p:cNvSpPr>
+          <p:nvPr>
+            <p:ph type="title"/>
+          </p:nvPr>
+        </p:nvSpPr>
         <p:spPr>
           <a:xfrm>
-            <a:off x="5291921" y="1989078"/>
-            <a:ext cx="3069316" cy="4797382"/>
+            <a:off x="457200" y="274638"/>
+            <a:ext cx="8229600" cy="45719"/>
           </a:xfrm>
-          <a:prstGeom prst="rect">
-            <a:avLst/>
-          </a:prstGeom>
         </p:spPr>
-      </p:pic>
-      <p:sp>
-        <p:nvSpPr>
-          <p:cNvPr id="2" name="Title 1"/>
-          <p:cNvSpPr>
-            <a:spLocks noGrp="1"/>
-          </p:cNvSpPr>
-          <p:nvPr>
-            <p:ph type="title"/>
+        <p:txBody>
+          <a:bodyPr>
+            <a:normAutofit fontScale="90000"/>
+          </a:bodyPr>
+          <a:lstStyle/>
+          <a:p>
+            <a:endParaRPr lang="en-US" dirty="0"/>
+          </a:p>
+        </p:txBody>
+      </p:sp>
+      <p:sp>
+        <p:nvSpPr>
+          <p:cNvPr id="3" name="Content Placeholder 2"/>
+          <p:cNvSpPr>
+            <a:spLocks noGrp="1"/>
+          </p:cNvSpPr>
+          <p:nvPr>
+            <p:ph idx="1"/>
           </p:nvPr>
         </p:nvSpPr>
         <p:spPr>
           <a:xfrm>
-            <a:off x="0" y="0"/>
-            <a:ext cx="9144000" cy="1077006"/>
+            <a:off x="457200" y="320358"/>
+            <a:ext cx="8229600" cy="5805806"/>
           </a:xfrm>
         </p:spPr>
         <p:txBody>
           <a:bodyPr>
-            <a:normAutofit/>
+            <a:noAutofit/>
           </a:bodyPr>
           <a:lstStyle/>
           <a:p>
-            <a:r>
-              <a:rPr lang="en-US" sz="2000" dirty="0" smtClean="0">
-                <a:latin typeface="Arial Black"/>
-                <a:cs typeface="Arial Black"/>
-              </a:rPr>
-              <a:t>Using the </a:t>
-            </a:r>
-            <a:r>
-              <a:rPr lang="en-US" sz="2000" dirty="0" smtClean="0">
-                <a:latin typeface="Arial Black"/>
-                <a:cs typeface="Arial Black"/>
-              </a:rPr>
-              <a:t>previous normalization method, </a:t>
-            </a:r>
-            <a:br>
-              <a:rPr lang="en-US" sz="2000" dirty="0" smtClean="0">
-                <a:latin typeface="Arial Black"/>
-                <a:cs typeface="Arial Black"/>
-              </a:rPr>
-            </a:br>
-            <a:r>
-              <a:rPr lang="en-US" sz="2000" dirty="0" smtClean="0">
-                <a:latin typeface="Arial Black"/>
-                <a:cs typeface="Arial Black"/>
-              </a:rPr>
-              <a:t>the </a:t>
-            </a:r>
-            <a:r>
-              <a:rPr lang="en-US" sz="2000" dirty="0" err="1" smtClean="0">
-                <a:latin typeface="Arial Black"/>
-                <a:cs typeface="Arial Black"/>
-              </a:rPr>
+            <a:pPr marL="0" indent="0">
+              <a:buNone/>
+            </a:pPr>
+            <a:r>
+              <a:rPr lang="en-US" sz="1800" dirty="0" smtClean="0"/>
+              <a:t>After fitting, we get mean and standard deviation of normal distribution in each plot:</a:t>
+            </a:r>
+          </a:p>
+          <a:p>
+            <a:r>
+              <a:rPr lang="en-US" sz="1800" dirty="0" err="1" smtClean="0"/>
               <a:t>Sfp</a:t>
             </a:r>
             <a:r>
-              <a:rPr lang="en-US" sz="2000" dirty="0" smtClean="0">
-                <a:latin typeface="Arial Black"/>
-                <a:cs typeface="Arial Black"/>
-              </a:rPr>
-              <a:t>-only background is still bigger (</a:t>
-            </a:r>
-            <a:r>
-              <a:rPr lang="en-US" sz="2000" dirty="0" smtClean="0">
-                <a:solidFill>
-                  <a:srgbClr val="FF0000"/>
-                </a:solidFill>
-                <a:latin typeface="Arial Black"/>
-                <a:cs typeface="Arial Black"/>
-              </a:rPr>
-              <a:t>0.21</a:t>
-            </a:r>
-            <a:r>
-              <a:rPr lang="en-US" sz="2000" dirty="0" smtClean="0">
-                <a:latin typeface="Arial Black"/>
-                <a:cs typeface="Arial Black"/>
-              </a:rPr>
-              <a:t>) </a:t>
-            </a:r>
-            <a:br>
-              <a:rPr lang="en-US" sz="2000" dirty="0" smtClean="0">
-                <a:latin typeface="Arial Black"/>
-                <a:cs typeface="Arial Black"/>
-              </a:rPr>
-            </a:br>
-            <a:r>
-              <a:rPr lang="en-US" sz="2000" dirty="0" smtClean="0">
-                <a:latin typeface="Arial Black"/>
-                <a:cs typeface="Arial Black"/>
-              </a:rPr>
-              <a:t>than the </a:t>
-            </a:r>
-            <a:r>
-              <a:rPr lang="en-US" sz="2000" dirty="0" err="1" smtClean="0">
-                <a:latin typeface="Arial Black"/>
-                <a:cs typeface="Arial Black"/>
-              </a:rPr>
+              <a:rPr lang="en-US" sz="1800" dirty="0" smtClean="0"/>
+              <a:t>-labeling</a:t>
+            </a:r>
+          </a:p>
+          <a:p>
+            <a:pPr marL="0" indent="0">
+              <a:buNone/>
+            </a:pPr>
+            <a:r>
+              <a:rPr lang="en-US" sz="1800" dirty="0"/>
+              <a:t>	</a:t>
+            </a:r>
+            <a:r>
+              <a:rPr lang="en-US" sz="1800" dirty="0" smtClean="0"/>
+              <a:t>mean = 1455.19</a:t>
+            </a:r>
+          </a:p>
+          <a:p>
+            <a:pPr marL="0" indent="0">
+              <a:buNone/>
+            </a:pPr>
+            <a:r>
+              <a:rPr lang="en-US" sz="1800" dirty="0"/>
+              <a:t>	</a:t>
+            </a:r>
+            <a:r>
+              <a:rPr lang="en-US" sz="1800" dirty="0" err="1" smtClean="0"/>
+              <a:t>std</a:t>
+            </a:r>
+            <a:r>
+              <a:rPr lang="en-US" sz="1800" dirty="0" smtClean="0"/>
+              <a:t> (standard deviation) = 172.88</a:t>
+            </a:r>
+          </a:p>
+          <a:p>
+            <a:r>
+              <a:rPr lang="en-US" sz="1800" dirty="0" err="1" smtClean="0"/>
+              <a:t>Sfp-PfAcpH</a:t>
+            </a:r>
+            <a:endParaRPr lang="en-US" sz="1800" dirty="0" smtClean="0"/>
+          </a:p>
+          <a:p>
+            <a:pPr marL="0" indent="0">
+              <a:buNone/>
+            </a:pPr>
+            <a:r>
+              <a:rPr lang="en-US" sz="1800" dirty="0"/>
+              <a:t>	</a:t>
+            </a:r>
+            <a:r>
+              <a:rPr lang="en-US" sz="1800" dirty="0" smtClean="0"/>
+              <a:t>mean = 1109.3</a:t>
+            </a:r>
+          </a:p>
+          <a:p>
+            <a:pPr marL="0" indent="0">
+              <a:buNone/>
+            </a:pPr>
+            <a:r>
+              <a:rPr lang="en-US" sz="1800" dirty="0"/>
+              <a:t>	</a:t>
+            </a:r>
+            <a:r>
+              <a:rPr lang="en-US" sz="1800" dirty="0" err="1" smtClean="0"/>
+              <a:t>std</a:t>
+            </a:r>
+            <a:r>
+              <a:rPr lang="en-US" sz="1800" dirty="0" smtClean="0"/>
+              <a:t> = 85.52</a:t>
+            </a:r>
+          </a:p>
+          <a:p>
+            <a:r>
+              <a:rPr lang="en-US" sz="1800" dirty="0" err="1" smtClean="0"/>
               <a:t>AcpS</a:t>
             </a:r>
             <a:r>
-              <a:rPr lang="en-US" sz="2000" dirty="0" smtClean="0">
-                <a:latin typeface="Arial Black"/>
-                <a:cs typeface="Arial Black"/>
-              </a:rPr>
-              <a:t>-only background (</a:t>
-            </a:r>
-            <a:r>
-              <a:rPr lang="en-US" sz="2000" dirty="0" smtClean="0">
-                <a:solidFill>
-                  <a:srgbClr val="FF0000"/>
-                </a:solidFill>
-                <a:latin typeface="Arial Black"/>
-                <a:cs typeface="Arial Black"/>
-              </a:rPr>
-              <a:t>0.13</a:t>
-            </a:r>
-            <a:r>
-              <a:rPr lang="en-US" sz="2000" dirty="0" smtClean="0">
-                <a:latin typeface="Arial Black"/>
-                <a:cs typeface="Arial Black"/>
-              </a:rPr>
-              <a:t>).</a:t>
-            </a:r>
-            <a:r>
-              <a:rPr lang="en-US" sz="2000" dirty="0" smtClean="0">
-                <a:latin typeface="Arial Black"/>
-                <a:cs typeface="Arial Black"/>
-              </a:rPr>
-              <a:t> </a:t>
-            </a:r>
-            <a:endParaRPr lang="en-US" sz="2000" dirty="0">
-              <a:latin typeface="Arial Black"/>
-              <a:cs typeface="Arial Black"/>
-            </a:endParaRPr>
-          </a:p>
-        </p:txBody>
-      </p:sp>
-      <p:pic>
-        <p:nvPicPr>
-          <p:cNvPr id="4" name="Content Placeholder 3" descr="raw_intensity.png"/>
-          <p:cNvPicPr>
-            <a:picLocks noGrp="1" noChangeAspect="1"/>
-          </p:cNvPicPr>
-          <p:nvPr>
-            <p:ph idx="1"/>
-          </p:nvPr>
-        </p:nvPicPr>
-        <p:blipFill rotWithShape="1">
-          <a:blip r:embed="rId3">
-            <a:extLst>
-              <a:ext uri="{28A0092B-C50C-407E-A947-70E740481C1C}">
-                <a14:useLocalDpi xmlns:a14="http://schemas.microsoft.com/office/drawing/2010/main" val="0"/>
-              </a:ext>
-            </a:extLst>
-          </a:blip>
-          <a:srcRect l="9959" r="50684"/>
-          <a:stretch/>
-        </p:blipFill>
-        <p:spPr>
-          <a:xfrm>
-            <a:off x="33840" y="1465042"/>
-            <a:ext cx="3979195" cy="5587116"/>
-          </a:xfrm>
-        </p:spPr>
-      </p:pic>
-      <p:sp>
-        <p:nvSpPr>
-          <p:cNvPr id="3" name="TextBox 2"/>
-          <p:cNvSpPr txBox="1"/>
-          <p:nvPr/>
-        </p:nvSpPr>
-        <p:spPr>
-          <a:xfrm>
-            <a:off x="343971" y="1509137"/>
-            <a:ext cx="3249958" cy="369332"/>
-          </a:xfrm>
-          <a:prstGeom prst="rect">
-            <a:avLst/>
-          </a:prstGeom>
-          <a:solidFill>
-            <a:schemeClr val="bg1"/>
-          </a:solidFill>
-        </p:spPr>
-        <p:txBody>
-          <a:bodyPr wrap="none" rtlCol="0" anchor="b">
-            <a:spAutoFit/>
-          </a:bodyPr>
-          <a:lstStyle/>
-          <a:p>
-            <a:r>
-              <a:rPr lang="en-US" dirty="0" smtClean="0"/>
-              <a:t>Membrane treated with </a:t>
-            </a:r>
-            <a:r>
-              <a:rPr lang="en-US" dirty="0" err="1" smtClean="0"/>
+              <a:rPr lang="en-US" sz="1800" dirty="0" smtClean="0"/>
+              <a:t>-labeling</a:t>
+            </a:r>
+          </a:p>
+          <a:p>
+            <a:pPr marL="0" indent="0">
+              <a:buNone/>
+            </a:pPr>
+            <a:r>
+              <a:rPr lang="en-US" sz="1800" dirty="0"/>
+              <a:t>	</a:t>
+            </a:r>
+            <a:r>
+              <a:rPr lang="en-US" sz="1800" dirty="0" smtClean="0"/>
+              <a:t>mean = 1166.76</a:t>
+            </a:r>
+          </a:p>
+          <a:p>
+            <a:pPr marL="0" indent="0">
+              <a:buNone/>
+            </a:pPr>
+            <a:r>
+              <a:rPr lang="en-US" sz="1800" dirty="0"/>
+              <a:t>	</a:t>
+            </a:r>
+            <a:r>
+              <a:rPr lang="en-US" sz="1800" dirty="0" err="1" smtClean="0"/>
+              <a:t>std</a:t>
+            </a:r>
+            <a:r>
+              <a:rPr lang="en-US" sz="1800" dirty="0" smtClean="0"/>
+              <a:t> = 121.49</a:t>
+            </a:r>
+          </a:p>
+          <a:p>
+            <a:r>
+              <a:rPr lang="en-US" sz="1800" dirty="0" err="1" smtClean="0"/>
+              <a:t>AcpS-PfAcpH</a:t>
+            </a:r>
+            <a:endParaRPr lang="en-US" sz="1800" dirty="0" smtClean="0"/>
+          </a:p>
+          <a:p>
+            <a:pPr marL="457200" lvl="1" indent="0">
+              <a:buNone/>
+            </a:pPr>
+            <a:r>
+              <a:rPr lang="en-US" sz="1600" dirty="0" smtClean="0"/>
+              <a:t>Mean = 1185.07</a:t>
+            </a:r>
+          </a:p>
+          <a:p>
+            <a:pPr marL="457200" lvl="1" indent="0">
+              <a:buNone/>
+            </a:pPr>
+            <a:r>
+              <a:rPr lang="en-US" sz="1600" dirty="0" err="1" smtClean="0"/>
+              <a:t>std</a:t>
+            </a:r>
+            <a:r>
+              <a:rPr lang="en-US" sz="1600" dirty="0" smtClean="0"/>
+              <a:t> = 122.27</a:t>
+            </a:r>
+          </a:p>
+          <a:p>
+            <a:pPr marL="457200" lvl="1" indent="0">
+              <a:buNone/>
+            </a:pPr>
+            <a:endParaRPr lang="en-US" sz="1600" dirty="0"/>
+          </a:p>
+          <a:p>
+            <a:pPr marL="457200" lvl="1" indent="0">
+              <a:buNone/>
+            </a:pPr>
+            <a:r>
+              <a:rPr lang="en-US" sz="1600" dirty="0" smtClean="0"/>
+              <a:t>Then we normalize light intensity by </a:t>
+            </a:r>
+            <a:r>
+              <a:rPr lang="en-US" sz="1600" dirty="0" err="1"/>
+              <a:t>Y</a:t>
+            </a:r>
+            <a:r>
+              <a:rPr lang="en-US" sz="1000" dirty="0" err="1" smtClean="0"/>
+              <a:t>norm</a:t>
+            </a:r>
+            <a:r>
+              <a:rPr lang="en-US" sz="1600" dirty="0" smtClean="0"/>
+              <a:t> = (</a:t>
+            </a:r>
+            <a:r>
+              <a:rPr lang="en-US" sz="1600" dirty="0" err="1"/>
+              <a:t>Y</a:t>
+            </a:r>
+            <a:r>
+              <a:rPr lang="en-US" sz="1100" dirty="0" err="1" smtClean="0"/>
+              <a:t>r</a:t>
+            </a:r>
+            <a:r>
+              <a:rPr lang="en-US" sz="1050" dirty="0" err="1" smtClean="0"/>
+              <a:t>aw</a:t>
+            </a:r>
+            <a:r>
+              <a:rPr lang="en-US" sz="1600" dirty="0" smtClean="0"/>
+              <a:t> – mean) / </a:t>
+            </a:r>
+            <a:r>
+              <a:rPr lang="en-US" sz="1600" dirty="0" err="1" smtClean="0"/>
+              <a:t>std</a:t>
+            </a:r>
+            <a:r>
+              <a:rPr lang="en-US" sz="1600" dirty="0" smtClean="0"/>
+              <a:t>  for </a:t>
+            </a:r>
+            <a:r>
+              <a:rPr lang="en-US" sz="1600" dirty="0" err="1" smtClean="0"/>
               <a:t>Sfp</a:t>
             </a:r>
             <a:r>
-              <a:rPr lang="en-US" dirty="0" smtClean="0"/>
-              <a:t> only</a:t>
-            </a:r>
-            <a:endParaRPr lang="en-US" dirty="0"/>
-          </a:p>
-        </p:txBody>
-      </p:sp>
-      <p:sp>
-        <p:nvSpPr>
-          <p:cNvPr id="6" name="TextBox 5"/>
-          <p:cNvSpPr txBox="1"/>
-          <p:nvPr/>
-        </p:nvSpPr>
-        <p:spPr>
-          <a:xfrm>
-            <a:off x="2389636" y="3824711"/>
-            <a:ext cx="1415973" cy="215444"/>
-          </a:xfrm>
-          <a:prstGeom prst="rect">
-            <a:avLst/>
-          </a:prstGeom>
-          <a:noFill/>
-        </p:spPr>
-        <p:txBody>
-          <a:bodyPr wrap="none" rtlCol="0">
-            <a:spAutoFit/>
-          </a:bodyPr>
-          <a:lstStyle/>
-          <a:p>
-            <a:r>
-              <a:rPr lang="en-US" sz="800" dirty="0" smtClean="0">
-                <a:latin typeface="Andale Mono"/>
-                <a:cs typeface="Andale Mono"/>
-              </a:rPr>
-              <a:t>Integrated Intensity</a:t>
-            </a:r>
-            <a:endParaRPr lang="en-US" sz="800" dirty="0">
-              <a:latin typeface="Andale Mono"/>
-              <a:cs typeface="Andale Mono"/>
-            </a:endParaRPr>
-          </a:p>
-        </p:txBody>
-      </p:sp>
-      <p:sp>
-        <p:nvSpPr>
-          <p:cNvPr id="9" name="TextBox 8"/>
-          <p:cNvSpPr txBox="1"/>
-          <p:nvPr/>
-        </p:nvSpPr>
-        <p:spPr>
-          <a:xfrm>
-            <a:off x="317512" y="4148541"/>
-            <a:ext cx="3410684" cy="369332"/>
-          </a:xfrm>
-          <a:prstGeom prst="rect">
-            <a:avLst/>
-          </a:prstGeom>
-          <a:solidFill>
-            <a:schemeClr val="bg1"/>
-          </a:solidFill>
-        </p:spPr>
-        <p:txBody>
-          <a:bodyPr wrap="none" rtlCol="0" anchor="b">
-            <a:spAutoFit/>
-          </a:bodyPr>
-          <a:lstStyle/>
-          <a:p>
-            <a:r>
-              <a:rPr lang="en-US" dirty="0" smtClean="0"/>
-              <a:t>Membrane treated with </a:t>
-            </a:r>
-            <a:r>
-              <a:rPr lang="en-US" dirty="0" err="1" smtClean="0"/>
+              <a:rPr lang="en-US" sz="1600" dirty="0" smtClean="0"/>
+              <a:t>-labeling, </a:t>
+            </a:r>
+            <a:r>
+              <a:rPr lang="en-US" sz="1600" dirty="0" err="1" smtClean="0"/>
+              <a:t>Sfp-PfAcpH</a:t>
+            </a:r>
+            <a:r>
+              <a:rPr lang="en-US" sz="1600" dirty="0" smtClean="0"/>
+              <a:t>, </a:t>
+            </a:r>
+            <a:r>
+              <a:rPr lang="en-US" sz="1600" dirty="0" err="1" smtClean="0"/>
               <a:t>AcpS</a:t>
             </a:r>
             <a:r>
-              <a:rPr lang="en-US" dirty="0" smtClean="0"/>
-              <a:t> only</a:t>
-            </a:r>
-            <a:endParaRPr lang="en-US" dirty="0"/>
-          </a:p>
-        </p:txBody>
-      </p:sp>
-      <p:sp>
-        <p:nvSpPr>
-          <p:cNvPr id="10" name="TextBox 9"/>
-          <p:cNvSpPr txBox="1"/>
-          <p:nvPr/>
-        </p:nvSpPr>
-        <p:spPr>
-          <a:xfrm>
-            <a:off x="2470983" y="6569302"/>
-            <a:ext cx="1415973" cy="215444"/>
-          </a:xfrm>
-          <a:prstGeom prst="rect">
-            <a:avLst/>
-          </a:prstGeom>
-          <a:noFill/>
-        </p:spPr>
-        <p:txBody>
-          <a:bodyPr wrap="none" rtlCol="0">
-            <a:spAutoFit/>
-          </a:bodyPr>
-          <a:lstStyle/>
-          <a:p>
-            <a:r>
-              <a:rPr lang="en-US" sz="800" dirty="0" smtClean="0">
-                <a:latin typeface="Andale Mono"/>
-                <a:cs typeface="Andale Mono"/>
-              </a:rPr>
-              <a:t>Integrated Intensity</a:t>
-            </a:r>
-            <a:endParaRPr lang="en-US" sz="800" dirty="0">
-              <a:latin typeface="Andale Mono"/>
-              <a:cs typeface="Andale Mono"/>
-            </a:endParaRPr>
-          </a:p>
-        </p:txBody>
-      </p:sp>
-      <p:sp>
-        <p:nvSpPr>
-          <p:cNvPr id="28" name="Title 1"/>
-          <p:cNvSpPr txBox="1">
-            <a:spLocks/>
-          </p:cNvSpPr>
-          <p:nvPr/>
-        </p:nvSpPr>
-        <p:spPr>
-          <a:xfrm>
-            <a:off x="93292" y="892130"/>
-            <a:ext cx="3765237" cy="924606"/>
-          </a:xfrm>
-          <a:prstGeom prst="rect">
-            <a:avLst/>
-          </a:prstGeom>
-        </p:spPr>
-        <p:txBody>
-          <a:bodyPr vert="horz" lIns="91440" tIns="45720" rIns="91440" bIns="45720" rtlCol="0" anchor="ctr">
-            <a:normAutofit fontScale="92500"/>
-          </a:bodyPr>
-          <a:lstStyle>
-            <a:lvl1pPr algn="ctr" defTabSz="457200" rtl="0" eaLnBrk="1" latinLnBrk="0" hangingPunct="1">
-              <a:spcBef>
-                <a:spcPct val="0"/>
-              </a:spcBef>
-              <a:buNone/>
-              <a:defRPr sz="4400" kern="1200">
-                <a:solidFill>
-                  <a:schemeClr val="tx1"/>
-                </a:solidFill>
-                <a:latin typeface="+mj-lt"/>
-                <a:ea typeface="+mj-ea"/>
-                <a:cs typeface="+mj-cs"/>
-              </a:defRPr>
-            </a:lvl1pPr>
-          </a:lstStyle>
-          <a:p>
-            <a:r>
-              <a:rPr lang="en-US" sz="3200" u="sng" dirty="0" smtClean="0">
-                <a:solidFill>
-                  <a:srgbClr val="000000"/>
-                </a:solidFill>
-                <a:latin typeface="Arial"/>
-                <a:cs typeface="Arial"/>
-              </a:rPr>
-              <a:t>Before normalization</a:t>
-            </a:r>
-            <a:endParaRPr lang="en-US" sz="3200" u="sng" dirty="0">
-              <a:solidFill>
-                <a:srgbClr val="000000"/>
-              </a:solidFill>
-              <a:latin typeface="Arial"/>
-              <a:cs typeface="Arial"/>
-            </a:endParaRPr>
-          </a:p>
-        </p:txBody>
-      </p:sp>
-      <p:cxnSp>
-        <p:nvCxnSpPr>
-          <p:cNvPr id="29" name="Straight Arrow Connector 28"/>
-          <p:cNvCxnSpPr/>
-          <p:nvPr/>
-        </p:nvCxnSpPr>
-        <p:spPr>
-          <a:xfrm flipV="1">
-            <a:off x="1173042" y="3869389"/>
-            <a:ext cx="0" cy="170766"/>
-          </a:xfrm>
-          <a:prstGeom prst="straightConnector1">
-            <a:avLst/>
-          </a:prstGeom>
-          <a:ln>
-            <a:solidFill>
-              <a:srgbClr val="FF0000"/>
-            </a:solidFill>
-            <a:tailEnd type="arrow"/>
-          </a:ln>
-        </p:spPr>
-        <p:style>
-          <a:lnRef idx="2">
-            <a:schemeClr val="accent1"/>
-          </a:lnRef>
-          <a:fillRef idx="0">
-            <a:schemeClr val="accent1"/>
-          </a:fillRef>
-          <a:effectRef idx="1">
-            <a:schemeClr val="accent1"/>
-          </a:effectRef>
-          <a:fontRef idx="minor">
-            <a:schemeClr val="tx1"/>
-          </a:fontRef>
-        </p:style>
-      </p:cxnSp>
-      <p:cxnSp>
-        <p:nvCxnSpPr>
-          <p:cNvPr id="30" name="Straight Arrow Connector 29"/>
-          <p:cNvCxnSpPr/>
-          <p:nvPr/>
-        </p:nvCxnSpPr>
-        <p:spPr>
-          <a:xfrm flipV="1">
-            <a:off x="999106" y="6479458"/>
-            <a:ext cx="0" cy="170766"/>
-          </a:xfrm>
-          <a:prstGeom prst="straightConnector1">
-            <a:avLst/>
-          </a:prstGeom>
-          <a:ln>
-            <a:solidFill>
-              <a:srgbClr val="FF0000"/>
-            </a:solidFill>
-            <a:tailEnd type="arrow"/>
-          </a:ln>
-        </p:spPr>
-        <p:style>
-          <a:lnRef idx="2">
-            <a:schemeClr val="accent1"/>
-          </a:lnRef>
-          <a:fillRef idx="0">
-            <a:schemeClr val="accent1"/>
-          </a:fillRef>
-          <a:effectRef idx="1">
-            <a:schemeClr val="accent1"/>
-          </a:effectRef>
-          <a:fontRef idx="minor">
-            <a:schemeClr val="tx1"/>
-          </a:fontRef>
-        </p:style>
-      </p:cxnSp>
-      <p:sp>
-        <p:nvSpPr>
-          <p:cNvPr id="12" name="TextBox 11"/>
-          <p:cNvSpPr txBox="1"/>
-          <p:nvPr/>
-        </p:nvSpPr>
-        <p:spPr>
-          <a:xfrm>
-            <a:off x="5433036" y="1549194"/>
-            <a:ext cx="3249958" cy="369332"/>
-          </a:xfrm>
-          <a:prstGeom prst="rect">
-            <a:avLst/>
-          </a:prstGeom>
-          <a:solidFill>
-            <a:schemeClr val="bg1"/>
-          </a:solidFill>
-        </p:spPr>
-        <p:txBody>
-          <a:bodyPr wrap="none" rtlCol="0" anchor="b">
-            <a:spAutoFit/>
-          </a:bodyPr>
-          <a:lstStyle/>
-          <a:p>
-            <a:r>
-              <a:rPr lang="en-US" dirty="0" smtClean="0"/>
-              <a:t>Membrane treated with </a:t>
-            </a:r>
-            <a:r>
-              <a:rPr lang="en-US" dirty="0" err="1" smtClean="0"/>
-              <a:t>Sfp</a:t>
-            </a:r>
-            <a:r>
-              <a:rPr lang="en-US" dirty="0" smtClean="0"/>
-              <a:t> only</a:t>
-            </a:r>
-            <a:endParaRPr lang="en-US" dirty="0"/>
-          </a:p>
-        </p:txBody>
-      </p:sp>
-      <p:sp>
-        <p:nvSpPr>
-          <p:cNvPr id="13" name="TextBox 12"/>
-          <p:cNvSpPr txBox="1"/>
-          <p:nvPr/>
-        </p:nvSpPr>
-        <p:spPr>
-          <a:xfrm>
-            <a:off x="7478701" y="3935320"/>
-            <a:ext cx="1415973" cy="215444"/>
-          </a:xfrm>
-          <a:prstGeom prst="rect">
-            <a:avLst/>
-          </a:prstGeom>
-          <a:noFill/>
-        </p:spPr>
-        <p:txBody>
-          <a:bodyPr wrap="none" rtlCol="0">
-            <a:spAutoFit/>
-          </a:bodyPr>
-          <a:lstStyle/>
-          <a:p>
-            <a:r>
-              <a:rPr lang="en-US" sz="800" dirty="0" smtClean="0">
-                <a:latin typeface="Andale Mono"/>
-                <a:cs typeface="Andale Mono"/>
-              </a:rPr>
-              <a:t>Integrated Intensity</a:t>
-            </a:r>
-            <a:endParaRPr lang="en-US" sz="800" dirty="0">
-              <a:latin typeface="Andale Mono"/>
-              <a:cs typeface="Andale Mono"/>
-            </a:endParaRPr>
-          </a:p>
-        </p:txBody>
-      </p:sp>
-      <p:sp>
-        <p:nvSpPr>
-          <p:cNvPr id="15" name="TextBox 14"/>
-          <p:cNvSpPr txBox="1"/>
-          <p:nvPr/>
-        </p:nvSpPr>
-        <p:spPr>
-          <a:xfrm>
-            <a:off x="7560048" y="6679911"/>
-            <a:ext cx="1415973" cy="215444"/>
-          </a:xfrm>
-          <a:prstGeom prst="rect">
-            <a:avLst/>
-          </a:prstGeom>
-          <a:noFill/>
-        </p:spPr>
-        <p:txBody>
-          <a:bodyPr wrap="none" rtlCol="0">
-            <a:spAutoFit/>
-          </a:bodyPr>
-          <a:lstStyle/>
-          <a:p>
-            <a:r>
-              <a:rPr lang="en-US" sz="800" dirty="0" smtClean="0">
-                <a:latin typeface="Andale Mono"/>
-                <a:cs typeface="Andale Mono"/>
-              </a:rPr>
-              <a:t>Integrated Intensity</a:t>
-            </a:r>
-            <a:endParaRPr lang="en-US" sz="800" dirty="0">
-              <a:latin typeface="Andale Mono"/>
-              <a:cs typeface="Andale Mono"/>
-            </a:endParaRPr>
-          </a:p>
-        </p:txBody>
-      </p:sp>
-      <p:sp>
-        <p:nvSpPr>
-          <p:cNvPr id="16" name="Title 1"/>
-          <p:cNvSpPr txBox="1">
-            <a:spLocks/>
-          </p:cNvSpPr>
-          <p:nvPr/>
-        </p:nvSpPr>
-        <p:spPr>
-          <a:xfrm>
-            <a:off x="5182357" y="896911"/>
-            <a:ext cx="3765237" cy="924606"/>
-          </a:xfrm>
-          <a:prstGeom prst="rect">
-            <a:avLst/>
-          </a:prstGeom>
-        </p:spPr>
-        <p:txBody>
-          <a:bodyPr vert="horz" lIns="91440" tIns="45720" rIns="91440" bIns="45720" rtlCol="0" anchor="ctr">
-            <a:normAutofit/>
-          </a:bodyPr>
-          <a:lstStyle>
-            <a:lvl1pPr algn="ctr" defTabSz="457200" rtl="0" eaLnBrk="1" latinLnBrk="0" hangingPunct="1">
-              <a:spcBef>
-                <a:spcPct val="0"/>
-              </a:spcBef>
-              <a:buNone/>
-              <a:defRPr sz="4400" kern="1200">
-                <a:solidFill>
-                  <a:schemeClr val="tx1"/>
-                </a:solidFill>
-                <a:latin typeface="+mj-lt"/>
-                <a:ea typeface="+mj-ea"/>
-                <a:cs typeface="+mj-cs"/>
-              </a:defRPr>
-            </a:lvl1pPr>
-          </a:lstStyle>
-          <a:p>
-            <a:r>
-              <a:rPr lang="en-US" sz="3200" u="sng" dirty="0" smtClean="0">
-                <a:solidFill>
-                  <a:srgbClr val="000000"/>
-                </a:solidFill>
-                <a:latin typeface="Arial"/>
-                <a:cs typeface="Arial"/>
-              </a:rPr>
-              <a:t>After normalization</a:t>
-            </a:r>
-            <a:endParaRPr lang="en-US" sz="3200" u="sng" dirty="0">
-              <a:solidFill>
-                <a:srgbClr val="000000"/>
-              </a:solidFill>
-              <a:latin typeface="Arial"/>
-              <a:cs typeface="Arial"/>
-            </a:endParaRPr>
-          </a:p>
-        </p:txBody>
-      </p:sp>
-      <p:cxnSp>
-        <p:nvCxnSpPr>
-          <p:cNvPr id="17" name="Straight Arrow Connector 16"/>
-          <p:cNvCxnSpPr/>
-          <p:nvPr/>
-        </p:nvCxnSpPr>
-        <p:spPr>
-          <a:xfrm flipV="1">
-            <a:off x="6173907" y="3944722"/>
-            <a:ext cx="0" cy="170766"/>
-          </a:xfrm>
-          <a:prstGeom prst="straightConnector1">
-            <a:avLst/>
-          </a:prstGeom>
-          <a:ln>
-            <a:solidFill>
-              <a:srgbClr val="FF0000"/>
-            </a:solidFill>
-            <a:tailEnd type="arrow"/>
-          </a:ln>
-        </p:spPr>
-        <p:style>
-          <a:lnRef idx="2">
-            <a:schemeClr val="accent1"/>
-          </a:lnRef>
-          <a:fillRef idx="0">
-            <a:schemeClr val="accent1"/>
-          </a:fillRef>
-          <a:effectRef idx="1">
-            <a:schemeClr val="accent1"/>
-          </a:effectRef>
-          <a:fontRef idx="minor">
-            <a:schemeClr val="tx1"/>
-          </a:fontRef>
-        </p:style>
-      </p:cxnSp>
-      <p:cxnSp>
-        <p:nvCxnSpPr>
-          <p:cNvPr id="18" name="Straight Arrow Connector 17"/>
-          <p:cNvCxnSpPr/>
-          <p:nvPr/>
-        </p:nvCxnSpPr>
-        <p:spPr>
-          <a:xfrm flipV="1">
-            <a:off x="5929411" y="6520696"/>
-            <a:ext cx="0" cy="170766"/>
-          </a:xfrm>
-          <a:prstGeom prst="straightConnector1">
-            <a:avLst/>
-          </a:prstGeom>
-          <a:ln>
-            <a:solidFill>
-              <a:srgbClr val="FF0000"/>
-            </a:solidFill>
-            <a:tailEnd type="arrow"/>
-          </a:ln>
-        </p:spPr>
-        <p:style>
-          <a:lnRef idx="2">
-            <a:schemeClr val="accent1"/>
-          </a:lnRef>
-          <a:fillRef idx="0">
-            <a:schemeClr val="accent1"/>
-          </a:fillRef>
-          <a:effectRef idx="1">
-            <a:schemeClr val="accent1"/>
-          </a:effectRef>
-          <a:fontRef idx="minor">
-            <a:schemeClr val="tx1"/>
-          </a:fontRef>
-        </p:style>
-      </p:cxnSp>
-      <p:sp>
-        <p:nvSpPr>
-          <p:cNvPr id="14" name="TextBox 13"/>
-          <p:cNvSpPr txBox="1"/>
-          <p:nvPr/>
-        </p:nvSpPr>
-        <p:spPr>
-          <a:xfrm>
-            <a:off x="5406577" y="4126865"/>
-            <a:ext cx="3410684" cy="369332"/>
-          </a:xfrm>
-          <a:prstGeom prst="rect">
-            <a:avLst/>
-          </a:prstGeom>
-          <a:solidFill>
-            <a:schemeClr val="bg1"/>
-          </a:solidFill>
-        </p:spPr>
-        <p:txBody>
-          <a:bodyPr wrap="none" rtlCol="0" anchor="b">
-            <a:spAutoFit/>
-          </a:bodyPr>
-          <a:lstStyle/>
-          <a:p>
-            <a:r>
-              <a:rPr lang="en-US" dirty="0" smtClean="0"/>
-              <a:t>Membrane treated with </a:t>
-            </a:r>
-            <a:r>
-              <a:rPr lang="en-US" dirty="0" err="1" smtClean="0"/>
-              <a:t>AcpS</a:t>
-            </a:r>
-            <a:r>
-              <a:rPr lang="en-US" dirty="0" smtClean="0"/>
-              <a:t> only</a:t>
-            </a:r>
-            <a:endParaRPr lang="en-US" dirty="0"/>
-          </a:p>
-        </p:txBody>
-      </p:sp>
-      <p:sp>
-        <p:nvSpPr>
-          <p:cNvPr id="20" name="Title 1"/>
-          <p:cNvSpPr txBox="1">
-            <a:spLocks/>
-          </p:cNvSpPr>
-          <p:nvPr/>
-        </p:nvSpPr>
-        <p:spPr>
-          <a:xfrm>
-            <a:off x="267228" y="4032047"/>
-            <a:ext cx="2384502" cy="280811"/>
-          </a:xfrm>
-          <a:prstGeom prst="rect">
-            <a:avLst/>
-          </a:prstGeom>
-        </p:spPr>
-        <p:txBody>
-          <a:bodyPr vert="horz" lIns="91440" tIns="45720" rIns="91440" bIns="45720" rtlCol="0" anchor="ctr">
-            <a:normAutofit/>
-          </a:bodyPr>
-          <a:lstStyle>
-            <a:lvl1pPr algn="ctr" defTabSz="457200" rtl="0" eaLnBrk="1" latinLnBrk="0" hangingPunct="1">
-              <a:spcBef>
-                <a:spcPct val="0"/>
-              </a:spcBef>
-              <a:buNone/>
-              <a:defRPr sz="4400" kern="1200">
-                <a:solidFill>
-                  <a:schemeClr val="tx1"/>
-                </a:solidFill>
-                <a:latin typeface="+mj-lt"/>
-                <a:ea typeface="+mj-ea"/>
-                <a:cs typeface="+mj-cs"/>
-              </a:defRPr>
-            </a:lvl1pPr>
-          </a:lstStyle>
-          <a:p>
-            <a:r>
-              <a:rPr lang="en-US" sz="1200" dirty="0" smtClean="0">
-                <a:solidFill>
-                  <a:srgbClr val="FF0000"/>
-                </a:solidFill>
-                <a:latin typeface="Arial Black"/>
-                <a:cs typeface="Arial Black"/>
-              </a:rPr>
-              <a:t>Centered near 1500 </a:t>
-            </a:r>
-            <a:endParaRPr lang="en-US" sz="1200" dirty="0">
-              <a:solidFill>
-                <a:srgbClr val="FF0000"/>
-              </a:solidFill>
-              <a:latin typeface="Arial Black"/>
-              <a:cs typeface="Arial Black"/>
-            </a:endParaRPr>
-          </a:p>
-        </p:txBody>
-      </p:sp>
-      <p:sp>
-        <p:nvSpPr>
-          <p:cNvPr id="21" name="Title 1"/>
-          <p:cNvSpPr txBox="1">
-            <a:spLocks/>
-          </p:cNvSpPr>
-          <p:nvPr/>
-        </p:nvSpPr>
-        <p:spPr>
-          <a:xfrm>
-            <a:off x="93292" y="6576564"/>
-            <a:ext cx="2384502" cy="280811"/>
-          </a:xfrm>
-          <a:prstGeom prst="rect">
-            <a:avLst/>
-          </a:prstGeom>
-        </p:spPr>
-        <p:txBody>
-          <a:bodyPr vert="horz" lIns="91440" tIns="45720" rIns="91440" bIns="45720" rtlCol="0" anchor="ctr">
-            <a:normAutofit/>
-          </a:bodyPr>
-          <a:lstStyle>
-            <a:lvl1pPr algn="ctr" defTabSz="457200" rtl="0" eaLnBrk="1" latinLnBrk="0" hangingPunct="1">
-              <a:spcBef>
-                <a:spcPct val="0"/>
-              </a:spcBef>
-              <a:buNone/>
-              <a:defRPr sz="4400" kern="1200">
-                <a:solidFill>
-                  <a:schemeClr val="tx1"/>
-                </a:solidFill>
-                <a:latin typeface="+mj-lt"/>
-                <a:ea typeface="+mj-ea"/>
-                <a:cs typeface="+mj-cs"/>
-              </a:defRPr>
-            </a:lvl1pPr>
-          </a:lstStyle>
-          <a:p>
-            <a:r>
-              <a:rPr lang="en-US" sz="1200" dirty="0" smtClean="0">
-                <a:solidFill>
-                  <a:srgbClr val="FF0000"/>
-                </a:solidFill>
-                <a:latin typeface="Arial Black"/>
-                <a:cs typeface="Arial Black"/>
-              </a:rPr>
-              <a:t>Centered near 1200 </a:t>
-            </a:r>
-            <a:endParaRPr lang="en-US" sz="1200" dirty="0">
-              <a:solidFill>
-                <a:srgbClr val="FF0000"/>
-              </a:solidFill>
-              <a:latin typeface="Arial Black"/>
-              <a:cs typeface="Arial Black"/>
-            </a:endParaRPr>
-          </a:p>
-        </p:txBody>
-      </p:sp>
-      <p:sp>
-        <p:nvSpPr>
-          <p:cNvPr id="22" name="Title 1"/>
-          <p:cNvSpPr txBox="1">
-            <a:spLocks/>
-          </p:cNvSpPr>
-          <p:nvPr/>
-        </p:nvSpPr>
-        <p:spPr>
-          <a:xfrm>
-            <a:off x="5291921" y="4032047"/>
-            <a:ext cx="2384502" cy="280811"/>
-          </a:xfrm>
-          <a:prstGeom prst="rect">
-            <a:avLst/>
-          </a:prstGeom>
-        </p:spPr>
-        <p:txBody>
-          <a:bodyPr vert="horz" lIns="91440" tIns="45720" rIns="91440" bIns="45720" rtlCol="0" anchor="ctr">
-            <a:normAutofit/>
-          </a:bodyPr>
-          <a:lstStyle>
-            <a:lvl1pPr algn="ctr" defTabSz="457200" rtl="0" eaLnBrk="1" latinLnBrk="0" hangingPunct="1">
-              <a:spcBef>
-                <a:spcPct val="0"/>
-              </a:spcBef>
-              <a:buNone/>
-              <a:defRPr sz="4400" kern="1200">
-                <a:solidFill>
-                  <a:schemeClr val="tx1"/>
-                </a:solidFill>
-                <a:latin typeface="+mj-lt"/>
-                <a:ea typeface="+mj-ea"/>
-                <a:cs typeface="+mj-cs"/>
-              </a:defRPr>
-            </a:lvl1pPr>
-          </a:lstStyle>
-          <a:p>
-            <a:r>
-              <a:rPr lang="en-US" sz="1200" dirty="0" smtClean="0">
-                <a:solidFill>
-                  <a:srgbClr val="FF0000"/>
-                </a:solidFill>
-                <a:latin typeface="Arial Black"/>
-                <a:cs typeface="Arial Black"/>
-              </a:rPr>
-              <a:t>Centered near 0.21</a:t>
-            </a:r>
-            <a:endParaRPr lang="en-US" sz="1200" dirty="0">
-              <a:solidFill>
-                <a:srgbClr val="FF0000"/>
-              </a:solidFill>
-              <a:latin typeface="Arial Black"/>
-              <a:cs typeface="Arial Black"/>
-            </a:endParaRPr>
-          </a:p>
-        </p:txBody>
-      </p:sp>
-      <p:sp>
-        <p:nvSpPr>
-          <p:cNvPr id="23" name="Title 1"/>
-          <p:cNvSpPr txBox="1">
-            <a:spLocks/>
-          </p:cNvSpPr>
-          <p:nvPr/>
-        </p:nvSpPr>
-        <p:spPr>
-          <a:xfrm>
-            <a:off x="5117985" y="6617534"/>
-            <a:ext cx="2384502" cy="280811"/>
-          </a:xfrm>
-          <a:prstGeom prst="rect">
-            <a:avLst/>
-          </a:prstGeom>
-        </p:spPr>
-        <p:txBody>
-          <a:bodyPr vert="horz" lIns="91440" tIns="45720" rIns="91440" bIns="45720" rtlCol="0" anchor="ctr">
-            <a:normAutofit/>
-          </a:bodyPr>
-          <a:lstStyle>
-            <a:lvl1pPr algn="ctr" defTabSz="457200" rtl="0" eaLnBrk="1" latinLnBrk="0" hangingPunct="1">
-              <a:spcBef>
-                <a:spcPct val="0"/>
-              </a:spcBef>
-              <a:buNone/>
-              <a:defRPr sz="4400" kern="1200">
-                <a:solidFill>
-                  <a:schemeClr val="tx1"/>
-                </a:solidFill>
-                <a:latin typeface="+mj-lt"/>
-                <a:ea typeface="+mj-ea"/>
-                <a:cs typeface="+mj-cs"/>
-              </a:defRPr>
-            </a:lvl1pPr>
-          </a:lstStyle>
-          <a:p>
-            <a:r>
-              <a:rPr lang="en-US" sz="1200" dirty="0" smtClean="0">
-                <a:solidFill>
-                  <a:srgbClr val="FF0000"/>
-                </a:solidFill>
-                <a:latin typeface="Arial Black"/>
-                <a:cs typeface="Arial Black"/>
-              </a:rPr>
-              <a:t>Centered near 0.13</a:t>
-            </a:r>
-            <a:endParaRPr lang="en-US" sz="1200" dirty="0">
-              <a:solidFill>
-                <a:srgbClr val="FF0000"/>
-              </a:solidFill>
-              <a:latin typeface="Arial Black"/>
-              <a:cs typeface="Arial Black"/>
-            </a:endParaRPr>
+              <a:rPr lang="en-US" sz="1600" dirty="0" smtClean="0"/>
+              <a:t>-labeling and </a:t>
+            </a:r>
+            <a:r>
+              <a:rPr lang="en-US" sz="1600" dirty="0" err="1" smtClean="0"/>
+              <a:t>AcpS-PfAcpH</a:t>
+            </a:r>
+            <a:r>
+              <a:rPr lang="en-US" sz="1600" dirty="0" smtClean="0"/>
+              <a:t>.</a:t>
+            </a:r>
+            <a:endParaRPr lang="en-US" sz="1600" dirty="0"/>
           </a:p>
         </p:txBody>
       </p:sp>
     </p:spTree>
     <p:extLst>
       <p:ext uri="{BB962C8B-B14F-4D97-AF65-F5344CB8AC3E}">
-        <p14:creationId xmlns:p14="http://schemas.microsoft.com/office/powerpoint/2010/main" val="2130530324"/>
+        <p14:creationId xmlns:p14="http://schemas.microsoft.com/office/powerpoint/2010/main" val="2522871330"/>
       </p:ext>
     </p:extLst>
   </p:cSld>
@@ -5809,934 +4033,6 @@
 </file>
 
 <file path=ppt/slides/slide4.xml><?xml version="1.0" encoding="utf-8"?>
-<p:sld xmlns:a="http://schemas.openxmlformats.org/drawingml/2006/main" xmlns:r="http://schemas.openxmlformats.org/officeDocument/2006/relationships" xmlns:p="http://schemas.openxmlformats.org/presentationml/2006/main">
-  <p:cSld>
-    <p:spTree>
-      <p:nvGrpSpPr>
-        <p:cNvPr id="1" name=""/>
-        <p:cNvGrpSpPr/>
-        <p:nvPr/>
-      </p:nvGrpSpPr>
-      <p:grpSpPr>
-        <a:xfrm>
-          <a:off x="0" y="0"/>
-          <a:ext cx="0" cy="0"/>
-          <a:chOff x="0" y="0"/>
-          <a:chExt cx="0" cy="0"/>
-        </a:xfrm>
-      </p:grpSpPr>
-      <p:sp>
-        <p:nvSpPr>
-          <p:cNvPr id="3" name="Content Placeholder 2"/>
-          <p:cNvSpPr>
-            <a:spLocks noGrp="1"/>
-          </p:cNvSpPr>
-          <p:nvPr>
-            <p:ph idx="1"/>
-          </p:nvPr>
-        </p:nvSpPr>
-        <p:spPr>
-          <a:xfrm>
-            <a:off x="457200" y="1413357"/>
-            <a:ext cx="8229600" cy="4833039"/>
-          </a:xfrm>
-        </p:spPr>
-        <p:txBody>
-          <a:bodyPr/>
-          <a:lstStyle/>
-          <a:p>
-            <a:r>
-              <a:rPr lang="en-US" dirty="0" smtClean="0">
-                <a:cs typeface="Arial Black"/>
-              </a:rPr>
-              <a:t>The previous normalization method shifts </a:t>
-            </a:r>
-            <a:r>
-              <a:rPr lang="en-US" dirty="0" err="1" smtClean="0">
-                <a:cs typeface="Arial Black"/>
-              </a:rPr>
-              <a:t>Sfp</a:t>
-            </a:r>
-            <a:r>
-              <a:rPr lang="en-US" dirty="0" smtClean="0">
-                <a:cs typeface="Arial Black"/>
-              </a:rPr>
-              <a:t>-only and </a:t>
-            </a:r>
-            <a:r>
-              <a:rPr lang="en-US" dirty="0" err="1" smtClean="0">
-                <a:cs typeface="Arial Black"/>
-              </a:rPr>
-              <a:t>AcpS</a:t>
-            </a:r>
-            <a:r>
-              <a:rPr lang="en-US" dirty="0" smtClean="0">
-                <a:cs typeface="Arial Black"/>
-              </a:rPr>
-              <a:t>-only by the same amount.</a:t>
-            </a:r>
-          </a:p>
-          <a:p>
-            <a:r>
-              <a:rPr lang="en-US" dirty="0" smtClean="0">
-                <a:cs typeface="Arial Black"/>
-              </a:rPr>
-              <a:t>This makes it appear as if </a:t>
-            </a:r>
-            <a:r>
-              <a:rPr lang="en-US" dirty="0" err="1" smtClean="0">
-                <a:cs typeface="Arial Black"/>
-              </a:rPr>
-              <a:t>Sfp</a:t>
-            </a:r>
-            <a:r>
-              <a:rPr lang="en-US" dirty="0" smtClean="0">
-                <a:cs typeface="Arial Black"/>
-              </a:rPr>
-              <a:t> labels lots of peptides, and </a:t>
-            </a:r>
-            <a:r>
-              <a:rPr lang="en-US" dirty="0" err="1" smtClean="0">
-                <a:cs typeface="Arial Black"/>
-              </a:rPr>
-              <a:t>AcpS</a:t>
-            </a:r>
-            <a:r>
-              <a:rPr lang="en-US" dirty="0" smtClean="0">
-                <a:cs typeface="Arial Black"/>
-              </a:rPr>
-              <a:t> labels few.</a:t>
-            </a:r>
-            <a:endParaRPr lang="en-US" dirty="0" smtClean="0">
-              <a:cs typeface="Arial Black"/>
-            </a:endParaRPr>
-          </a:p>
-          <a:p>
-            <a:r>
-              <a:rPr lang="en-US" dirty="0" smtClean="0">
-                <a:cs typeface="Arial Black"/>
-              </a:rPr>
-              <a:t>We recommend a new renormalization method, detailed below, that accounts for differences in average background.</a:t>
-            </a:r>
-          </a:p>
-          <a:p>
-            <a:r>
-              <a:rPr lang="en-US" dirty="0" smtClean="0">
-                <a:cs typeface="Arial Black"/>
-              </a:rPr>
-              <a:t>Using this new renormalization method, we see many more peptides labeled by </a:t>
-            </a:r>
-            <a:r>
-              <a:rPr lang="en-US" dirty="0" err="1" smtClean="0">
-                <a:cs typeface="Arial Black"/>
-              </a:rPr>
-              <a:t>AcpS</a:t>
-            </a:r>
-            <a:r>
-              <a:rPr lang="en-US" dirty="0" smtClean="0">
-                <a:cs typeface="Arial Black"/>
-              </a:rPr>
-              <a:t>.</a:t>
-            </a:r>
-            <a:endParaRPr lang="en-US" dirty="0"/>
-          </a:p>
-        </p:txBody>
-      </p:sp>
-      <p:sp>
-        <p:nvSpPr>
-          <p:cNvPr id="4" name="Title 1"/>
-          <p:cNvSpPr>
-            <a:spLocks noGrp="1"/>
-          </p:cNvSpPr>
-          <p:nvPr>
-            <p:ph type="title"/>
-          </p:nvPr>
-        </p:nvSpPr>
-        <p:spPr>
-          <a:xfrm>
-            <a:off x="0" y="0"/>
-            <a:ext cx="9144000" cy="1077006"/>
-          </a:xfrm>
-        </p:spPr>
-        <p:txBody>
-          <a:bodyPr>
-            <a:normAutofit/>
-          </a:bodyPr>
-          <a:lstStyle/>
-          <a:p>
-            <a:r>
-              <a:rPr lang="en-US" sz="3200" dirty="0" smtClean="0">
-                <a:latin typeface="Arial Black"/>
-                <a:cs typeface="Arial Black"/>
-              </a:rPr>
-              <a:t>This issue made it appear that there were few peptides labeled by </a:t>
-            </a:r>
-            <a:r>
-              <a:rPr lang="en-US" sz="3200" dirty="0" err="1" smtClean="0">
-                <a:latin typeface="Arial Black"/>
-                <a:cs typeface="Arial Black"/>
-              </a:rPr>
-              <a:t>AcpS</a:t>
-            </a:r>
-            <a:r>
-              <a:rPr lang="en-US" sz="3200" dirty="0" smtClean="0">
-                <a:latin typeface="Arial Black"/>
-                <a:cs typeface="Arial Black"/>
-              </a:rPr>
-              <a:t> </a:t>
-            </a:r>
-            <a:endParaRPr lang="en-US" sz="3200" dirty="0">
-              <a:latin typeface="Arial Black"/>
-              <a:cs typeface="Arial Black"/>
-            </a:endParaRPr>
-          </a:p>
-        </p:txBody>
-      </p:sp>
-    </p:spTree>
-    <p:extLst>
-      <p:ext uri="{BB962C8B-B14F-4D97-AF65-F5344CB8AC3E}">
-        <p14:creationId xmlns:p14="http://schemas.microsoft.com/office/powerpoint/2010/main" val="3868603180"/>
-      </p:ext>
-    </p:extLst>
-  </p:cSld>
-  <p:clrMapOvr>
-    <a:masterClrMapping/>
-  </p:clrMapOvr>
-</p:sld>
-</file>
-
-<file path=ppt/slides/slide5.xml><?xml version="1.0" encoding="utf-8"?>
-<p:sld xmlns:a="http://schemas.openxmlformats.org/drawingml/2006/main" xmlns:r="http://schemas.openxmlformats.org/officeDocument/2006/relationships" xmlns:p="http://schemas.openxmlformats.org/presentationml/2006/main">
-  <p:cSld>
-    <p:spTree>
-      <p:nvGrpSpPr>
-        <p:cNvPr id="1" name=""/>
-        <p:cNvGrpSpPr/>
-        <p:nvPr/>
-      </p:nvGrpSpPr>
-      <p:grpSpPr>
-        <a:xfrm>
-          <a:off x="0" y="0"/>
-          <a:ext cx="0" cy="0"/>
-          <a:chOff x="0" y="0"/>
-          <a:chExt cx="0" cy="0"/>
-        </a:xfrm>
-      </p:grpSpPr>
-      <p:sp>
-        <p:nvSpPr>
-          <p:cNvPr id="3" name="Content Placeholder 2"/>
-          <p:cNvSpPr>
-            <a:spLocks noGrp="1"/>
-          </p:cNvSpPr>
-          <p:nvPr>
-            <p:ph idx="1"/>
-          </p:nvPr>
-        </p:nvSpPr>
-        <p:spPr>
-          <a:xfrm>
-            <a:off x="457200" y="465956"/>
-            <a:ext cx="8229600" cy="5660207"/>
-          </a:xfrm>
-        </p:spPr>
-        <p:txBody>
-          <a:bodyPr/>
-          <a:lstStyle/>
-          <a:p>
-            <a:pPr marL="0" indent="0">
-              <a:buNone/>
-            </a:pPr>
-            <a:r>
-              <a:rPr lang="en-US" dirty="0" smtClean="0"/>
-              <a:t>The core idea of our </a:t>
-            </a:r>
-            <a:r>
-              <a:rPr lang="en-US" dirty="0" smtClean="0"/>
-              <a:t>renormalization method is</a:t>
-            </a:r>
-            <a:r>
-              <a:rPr lang="en-US" dirty="0" smtClean="0"/>
-              <a:t>:</a:t>
-            </a:r>
-          </a:p>
-          <a:p>
-            <a:pPr marL="514350" indent="-514350">
-              <a:buAutoNum type="arabicPeriod"/>
-            </a:pPr>
-            <a:r>
-              <a:rPr lang="en-US" dirty="0" smtClean="0"/>
-              <a:t>Using a normal distribution, fit a mean </a:t>
-            </a:r>
-            <a:r>
-              <a:rPr lang="en-US" dirty="0" smtClean="0"/>
-              <a:t>and standard deviation for the background </a:t>
-            </a:r>
-            <a:r>
-              <a:rPr lang="en-US" dirty="0" smtClean="0"/>
-              <a:t>light intensity for each of the four sets of experiments.</a:t>
-            </a:r>
-          </a:p>
-          <a:p>
-            <a:pPr marL="514350" indent="-514350">
-              <a:buAutoNum type="arabicPeriod"/>
-            </a:pPr>
-            <a:r>
-              <a:rPr lang="en-US" dirty="0" smtClean="0"/>
-              <a:t>Normalize </a:t>
-            </a:r>
-            <a:r>
-              <a:rPr lang="en-US" dirty="0" smtClean="0"/>
-              <a:t>the light </a:t>
-            </a:r>
-            <a:r>
-              <a:rPr lang="en-US" dirty="0" smtClean="0"/>
-              <a:t>intensity to </a:t>
-            </a:r>
-            <a:r>
-              <a:rPr lang="en-US" dirty="0" smtClean="0"/>
-              <a:t>the standard </a:t>
-            </a:r>
-            <a:r>
-              <a:rPr lang="en-US" dirty="0" smtClean="0"/>
-              <a:t>normal </a:t>
-            </a:r>
-            <a:r>
-              <a:rPr lang="en-US" dirty="0" smtClean="0"/>
-              <a:t>scale.  This puts the four sets of experiments on the same scale.</a:t>
-            </a:r>
-            <a:endParaRPr lang="en-US" dirty="0"/>
-          </a:p>
-        </p:txBody>
-      </p:sp>
-    </p:spTree>
-    <p:extLst>
-      <p:ext uri="{BB962C8B-B14F-4D97-AF65-F5344CB8AC3E}">
-        <p14:creationId xmlns:p14="http://schemas.microsoft.com/office/powerpoint/2010/main" val="182862864"/>
-      </p:ext>
-    </p:extLst>
-  </p:cSld>
-  <p:clrMapOvr>
-    <a:masterClrMapping/>
-  </p:clrMapOvr>
-</p:sld>
-</file>
-
-<file path=ppt/slides/slide6.xml><?xml version="1.0" encoding="utf-8"?>
-<p:sld xmlns:a="http://schemas.openxmlformats.org/drawingml/2006/main" xmlns:r="http://schemas.openxmlformats.org/officeDocument/2006/relationships" xmlns:p="http://schemas.openxmlformats.org/presentationml/2006/main">
-  <p:cSld>
-    <p:spTree>
-      <p:nvGrpSpPr>
-        <p:cNvPr id="1" name=""/>
-        <p:cNvGrpSpPr/>
-        <p:nvPr/>
-      </p:nvGrpSpPr>
-      <p:grpSpPr>
-        <a:xfrm>
-          <a:off x="0" y="0"/>
-          <a:ext cx="0" cy="0"/>
-          <a:chOff x="0" y="0"/>
-          <a:chExt cx="0" cy="0"/>
-        </a:xfrm>
-      </p:grpSpPr>
-      <p:pic>
-        <p:nvPicPr>
-          <p:cNvPr id="4" name="Content Placeholder 3" descr="raw_intensity.png"/>
-          <p:cNvPicPr>
-            <a:picLocks noChangeAspect="1"/>
-          </p:cNvPicPr>
-          <p:nvPr/>
-        </p:nvPicPr>
-        <p:blipFill>
-          <a:blip r:embed="rId2">
-            <a:extLst>
-              <a:ext uri="{28A0092B-C50C-407E-A947-70E740481C1C}">
-                <a14:useLocalDpi xmlns:a14="http://schemas.microsoft.com/office/drawing/2010/main" val="0"/>
-              </a:ext>
-            </a:extLst>
-          </a:blip>
-          <a:srcRect l="9830" r="9830"/>
-          <a:stretch>
-            <a:fillRect/>
-          </a:stretch>
-        </p:blipFill>
-        <p:spPr>
-          <a:xfrm>
-            <a:off x="832817" y="1459921"/>
-            <a:ext cx="7370368" cy="5003779"/>
-          </a:xfrm>
-          <a:prstGeom prst="rect">
-            <a:avLst/>
-          </a:prstGeom>
-        </p:spPr>
-      </p:pic>
-      <p:sp>
-        <p:nvSpPr>
-          <p:cNvPr id="5" name="TextBox 4"/>
-          <p:cNvSpPr txBox="1"/>
-          <p:nvPr/>
-        </p:nvSpPr>
-        <p:spPr>
-          <a:xfrm>
-            <a:off x="833783" y="1434148"/>
-            <a:ext cx="3736259" cy="369332"/>
-          </a:xfrm>
-          <a:prstGeom prst="rect">
-            <a:avLst/>
-          </a:prstGeom>
-          <a:solidFill>
-            <a:schemeClr val="bg1"/>
-          </a:solidFill>
-        </p:spPr>
-        <p:txBody>
-          <a:bodyPr wrap="square" rtlCol="0" anchor="b">
-            <a:spAutoFit/>
-          </a:bodyPr>
-          <a:lstStyle/>
-          <a:p>
-            <a:r>
-              <a:rPr lang="en-US" dirty="0" err="1" smtClean="0"/>
-              <a:t>Sfp</a:t>
-            </a:r>
-            <a:r>
-              <a:rPr lang="en-US" dirty="0" smtClean="0"/>
-              <a:t> only: mean=1455.19, </a:t>
-            </a:r>
-            <a:r>
-              <a:rPr lang="en-US" dirty="0" err="1" smtClean="0"/>
-              <a:t>std</a:t>
-            </a:r>
-            <a:r>
-              <a:rPr lang="en-US" dirty="0" smtClean="0"/>
-              <a:t>=172.88</a:t>
-            </a:r>
-            <a:endParaRPr lang="en-US" dirty="0"/>
-          </a:p>
-        </p:txBody>
-      </p:sp>
-      <p:sp>
-        <p:nvSpPr>
-          <p:cNvPr id="7" name="TextBox 6"/>
-          <p:cNvSpPr txBox="1"/>
-          <p:nvPr/>
-        </p:nvSpPr>
-        <p:spPr>
-          <a:xfrm>
-            <a:off x="4892762" y="1426166"/>
-            <a:ext cx="4059952" cy="369332"/>
-          </a:xfrm>
-          <a:prstGeom prst="rect">
-            <a:avLst/>
-          </a:prstGeom>
-          <a:solidFill>
-            <a:schemeClr val="bg1"/>
-          </a:solidFill>
-        </p:spPr>
-        <p:txBody>
-          <a:bodyPr wrap="square" rtlCol="0" anchor="b">
-            <a:spAutoFit/>
-          </a:bodyPr>
-          <a:lstStyle/>
-          <a:p>
-            <a:r>
-              <a:rPr lang="en-US" dirty="0" err="1" smtClean="0"/>
-              <a:t>Sfp</a:t>
-            </a:r>
-            <a:r>
-              <a:rPr lang="en-US" dirty="0" smtClean="0"/>
-              <a:t> &amp; </a:t>
-            </a:r>
-            <a:r>
-              <a:rPr lang="en-US" dirty="0" err="1" smtClean="0"/>
-              <a:t>PfAcpH</a:t>
-            </a:r>
-            <a:r>
-              <a:rPr lang="en-US" dirty="0" smtClean="0"/>
-              <a:t>: mean </a:t>
-            </a:r>
-            <a:r>
-              <a:rPr lang="en-US" dirty="0"/>
-              <a:t>= </a:t>
-            </a:r>
-            <a:r>
-              <a:rPr lang="en-US" dirty="0" smtClean="0"/>
-              <a:t>1109.3 </a:t>
-            </a:r>
-            <a:r>
-              <a:rPr lang="en-US" dirty="0" err="1" smtClean="0"/>
-              <a:t>std</a:t>
-            </a:r>
-            <a:r>
-              <a:rPr lang="en-US" dirty="0" smtClean="0"/>
-              <a:t> = 85.52</a:t>
-            </a:r>
-            <a:endParaRPr lang="en-US" dirty="0"/>
-          </a:p>
-        </p:txBody>
-      </p:sp>
-      <p:sp>
-        <p:nvSpPr>
-          <p:cNvPr id="8" name="TextBox 7"/>
-          <p:cNvSpPr txBox="1"/>
-          <p:nvPr/>
-        </p:nvSpPr>
-        <p:spPr>
-          <a:xfrm>
-            <a:off x="833782" y="3838406"/>
-            <a:ext cx="4058980" cy="369332"/>
-          </a:xfrm>
-          <a:prstGeom prst="rect">
-            <a:avLst/>
-          </a:prstGeom>
-          <a:solidFill>
-            <a:schemeClr val="bg1"/>
-          </a:solidFill>
-        </p:spPr>
-        <p:txBody>
-          <a:bodyPr wrap="square" rtlCol="0" anchor="b">
-            <a:spAutoFit/>
-          </a:bodyPr>
-          <a:lstStyle/>
-          <a:p>
-            <a:r>
-              <a:rPr lang="en-US" dirty="0" err="1" smtClean="0"/>
-              <a:t>AcpS</a:t>
-            </a:r>
-            <a:r>
-              <a:rPr lang="en-US" dirty="0" smtClean="0"/>
-              <a:t> only: </a:t>
-            </a:r>
-            <a:r>
-              <a:rPr lang="en-US" dirty="0"/>
-              <a:t>mean = 1166.76 </a:t>
-            </a:r>
-            <a:r>
-              <a:rPr lang="en-US" dirty="0" err="1"/>
-              <a:t>std</a:t>
-            </a:r>
-            <a:r>
-              <a:rPr lang="en-US" dirty="0"/>
-              <a:t> = 121.49</a:t>
-            </a:r>
-          </a:p>
-        </p:txBody>
-      </p:sp>
-      <p:sp>
-        <p:nvSpPr>
-          <p:cNvPr id="12" name="TextBox 11"/>
-          <p:cNvSpPr txBox="1"/>
-          <p:nvPr/>
-        </p:nvSpPr>
-        <p:spPr>
-          <a:xfrm>
-            <a:off x="4819892" y="3792664"/>
-            <a:ext cx="4132822" cy="369332"/>
-          </a:xfrm>
-          <a:prstGeom prst="rect">
-            <a:avLst/>
-          </a:prstGeom>
-          <a:solidFill>
-            <a:schemeClr val="bg1"/>
-          </a:solidFill>
-        </p:spPr>
-        <p:txBody>
-          <a:bodyPr wrap="square" rtlCol="0" anchor="b">
-            <a:spAutoFit/>
-          </a:bodyPr>
-          <a:lstStyle/>
-          <a:p>
-            <a:pPr marL="0" lvl="1"/>
-            <a:r>
-              <a:rPr lang="en-US" dirty="0" err="1" smtClean="0"/>
-              <a:t>AcpS</a:t>
-            </a:r>
-            <a:r>
-              <a:rPr lang="en-US" dirty="0" smtClean="0"/>
-              <a:t> &amp; </a:t>
-            </a:r>
-            <a:r>
-              <a:rPr lang="en-US" dirty="0" err="1" smtClean="0"/>
-              <a:t>PfAcpH</a:t>
-            </a:r>
-            <a:r>
-              <a:rPr lang="en-US" dirty="0" smtClean="0"/>
-              <a:t>: </a:t>
-            </a:r>
-            <a:r>
-              <a:rPr lang="en-US" sz="1600" dirty="0"/>
-              <a:t>Mean = 1185.07 </a:t>
-            </a:r>
-            <a:r>
-              <a:rPr lang="en-US" sz="1600" dirty="0" err="1"/>
-              <a:t>std</a:t>
-            </a:r>
-            <a:r>
-              <a:rPr lang="en-US" sz="1600" dirty="0"/>
-              <a:t> = </a:t>
-            </a:r>
-            <a:r>
-              <a:rPr lang="en-US" sz="1600" dirty="0" smtClean="0"/>
-              <a:t>122.27</a:t>
-            </a:r>
-            <a:endParaRPr lang="en-US" sz="1600" dirty="0"/>
-          </a:p>
-        </p:txBody>
-      </p:sp>
-      <p:sp>
-        <p:nvSpPr>
-          <p:cNvPr id="2" name="Content Placeholder 1"/>
-          <p:cNvSpPr>
-            <a:spLocks noGrp="1"/>
-          </p:cNvSpPr>
-          <p:nvPr>
-            <p:ph idx="1"/>
-          </p:nvPr>
-        </p:nvSpPr>
-        <p:spPr>
-          <a:xfrm>
-            <a:off x="311462" y="6014314"/>
-            <a:ext cx="8229600" cy="731780"/>
-          </a:xfrm>
-        </p:spPr>
-        <p:txBody>
-          <a:bodyPr/>
-          <a:lstStyle/>
-          <a:p>
-            <a:pPr marL="0" lvl="1" indent="0">
-              <a:buNone/>
-            </a:pPr>
-            <a:r>
-              <a:rPr lang="en-US" sz="1600" dirty="0" smtClean="0">
-                <a:latin typeface="Arial Black"/>
-                <a:cs typeface="Arial Black"/>
-              </a:rPr>
-              <a:t>Step 2</a:t>
-            </a:r>
-            <a:r>
-              <a:rPr lang="en-US" sz="1600" dirty="0" smtClean="0"/>
-              <a:t>: we </a:t>
-            </a:r>
-            <a:r>
-              <a:rPr lang="en-US" sz="1600" dirty="0"/>
-              <a:t>normalize light intensity by </a:t>
-            </a:r>
-            <a:endParaRPr lang="en-US" sz="1600" dirty="0" smtClean="0"/>
-          </a:p>
-          <a:p>
-            <a:pPr marL="0" lvl="1" indent="0">
-              <a:buNone/>
-            </a:pPr>
-            <a:r>
-              <a:rPr lang="en-US" sz="1600" dirty="0" smtClean="0"/>
-              <a:t>	</a:t>
-            </a:r>
-            <a:r>
-              <a:rPr lang="en-US" sz="1600" dirty="0" err="1" smtClean="0"/>
-              <a:t>Y</a:t>
-            </a:r>
-            <a:r>
-              <a:rPr lang="en-US" sz="1000" dirty="0" err="1" smtClean="0"/>
-              <a:t>norm</a:t>
-            </a:r>
-            <a:r>
-              <a:rPr lang="en-US" sz="1600" dirty="0" smtClean="0"/>
-              <a:t> </a:t>
-            </a:r>
-            <a:r>
-              <a:rPr lang="en-US" sz="1600" dirty="0"/>
-              <a:t>= (</a:t>
-            </a:r>
-            <a:r>
-              <a:rPr lang="en-US" sz="1600" dirty="0" err="1"/>
-              <a:t>Y</a:t>
-            </a:r>
-            <a:r>
-              <a:rPr lang="en-US" sz="1100" dirty="0" err="1"/>
-              <a:t>r</a:t>
-            </a:r>
-            <a:r>
-              <a:rPr lang="en-US" sz="1050" dirty="0" err="1"/>
-              <a:t>aw</a:t>
-            </a:r>
-            <a:r>
-              <a:rPr lang="en-US" sz="1600" dirty="0"/>
-              <a:t> – mean) / </a:t>
-            </a:r>
-            <a:r>
-              <a:rPr lang="en-US" sz="1600" dirty="0" err="1"/>
-              <a:t>std</a:t>
-            </a:r>
-            <a:r>
-              <a:rPr lang="en-US" sz="1600" dirty="0"/>
-              <a:t>  for </a:t>
-            </a:r>
-            <a:r>
-              <a:rPr lang="en-US" sz="1600" dirty="0" err="1"/>
-              <a:t>Sfp</a:t>
-            </a:r>
-            <a:r>
-              <a:rPr lang="en-US" sz="1600" dirty="0" smtClean="0"/>
-              <a:t>-only, </a:t>
-            </a:r>
-            <a:r>
-              <a:rPr lang="en-US" sz="1600" dirty="0" err="1"/>
-              <a:t>Sfp-PfAcpH</a:t>
-            </a:r>
-            <a:r>
-              <a:rPr lang="en-US" sz="1600" dirty="0"/>
-              <a:t>, </a:t>
-            </a:r>
-            <a:r>
-              <a:rPr lang="en-US" sz="1600" dirty="0" err="1"/>
-              <a:t>AcpS</a:t>
-            </a:r>
-            <a:r>
-              <a:rPr lang="en-US" sz="1600" dirty="0" smtClean="0"/>
-              <a:t>-only and </a:t>
-            </a:r>
-            <a:r>
-              <a:rPr lang="en-US" sz="1600" dirty="0" err="1"/>
-              <a:t>AcpS-PfAcpH</a:t>
-            </a:r>
-            <a:r>
-              <a:rPr lang="en-US" sz="1600" dirty="0"/>
-              <a:t>.</a:t>
-            </a:r>
-          </a:p>
-          <a:p>
-            <a:endParaRPr lang="en-US" dirty="0"/>
-          </a:p>
-        </p:txBody>
-      </p:sp>
-      <p:sp>
-        <p:nvSpPr>
-          <p:cNvPr id="9" name="Content Placeholder 1"/>
-          <p:cNvSpPr txBox="1">
-            <a:spLocks/>
-          </p:cNvSpPr>
-          <p:nvPr/>
-        </p:nvSpPr>
-        <p:spPr>
-          <a:xfrm>
-            <a:off x="172379" y="728141"/>
-            <a:ext cx="8229600" cy="731780"/>
-          </a:xfrm>
-          <a:prstGeom prst="rect">
-            <a:avLst/>
-          </a:prstGeom>
-        </p:spPr>
-        <p:txBody>
-          <a:bodyPr vert="horz" lIns="91440" tIns="45720" rIns="91440" bIns="45720" rtlCol="0">
-            <a:normAutofit fontScale="92500"/>
-          </a:bodyPr>
-          <a:lstStyle>
-            <a:lvl1pPr marL="342900" indent="-342900" algn="l" defTabSz="457200" rtl="0" eaLnBrk="1" latinLnBrk="0" hangingPunct="1">
-              <a:spcBef>
-                <a:spcPct val="20000"/>
-              </a:spcBef>
-              <a:buFont typeface="Arial"/>
-              <a:buChar char="•"/>
-              <a:defRPr sz="3200" kern="1200">
-                <a:solidFill>
-                  <a:schemeClr val="tx1"/>
-                </a:solidFill>
-                <a:latin typeface="+mn-lt"/>
-                <a:ea typeface="+mn-ea"/>
-                <a:cs typeface="+mn-cs"/>
-              </a:defRPr>
-            </a:lvl1pPr>
-            <a:lvl2pPr marL="742950" indent="-285750" algn="l" defTabSz="457200" rtl="0" eaLnBrk="1" latinLnBrk="0" hangingPunct="1">
-              <a:spcBef>
-                <a:spcPct val="20000"/>
-              </a:spcBef>
-              <a:buFont typeface="Arial"/>
-              <a:buChar char="–"/>
-              <a:defRPr sz="2800" kern="1200">
-                <a:solidFill>
-                  <a:schemeClr val="tx1"/>
-                </a:solidFill>
-                <a:latin typeface="+mn-lt"/>
-                <a:ea typeface="+mn-ea"/>
-                <a:cs typeface="+mn-cs"/>
-              </a:defRPr>
-            </a:lvl2pPr>
-            <a:lvl3pPr marL="1143000" indent="-228600" algn="l" defTabSz="457200" rtl="0" eaLnBrk="1" latinLnBrk="0" hangingPunct="1">
-              <a:spcBef>
-                <a:spcPct val="20000"/>
-              </a:spcBef>
-              <a:buFont typeface="Arial"/>
-              <a:buChar char="•"/>
-              <a:defRPr sz="2400" kern="1200">
-                <a:solidFill>
-                  <a:schemeClr val="tx1"/>
-                </a:solidFill>
-                <a:latin typeface="+mn-lt"/>
-                <a:ea typeface="+mn-ea"/>
-                <a:cs typeface="+mn-cs"/>
-              </a:defRPr>
-            </a:lvl3pPr>
-            <a:lvl4pPr marL="1600200" indent="-228600" algn="l" defTabSz="457200" rtl="0" eaLnBrk="1" latinLnBrk="0" hangingPunct="1">
-              <a:spcBef>
-                <a:spcPct val="20000"/>
-              </a:spcBef>
-              <a:buFont typeface="Arial"/>
-              <a:buChar char="–"/>
-              <a:defRPr sz="2000" kern="1200">
-                <a:solidFill>
-                  <a:schemeClr val="tx1"/>
-                </a:solidFill>
-                <a:latin typeface="+mn-lt"/>
-                <a:ea typeface="+mn-ea"/>
-                <a:cs typeface="+mn-cs"/>
-              </a:defRPr>
-            </a:lvl4pPr>
-            <a:lvl5pPr marL="2057400" indent="-228600" algn="l" defTabSz="457200" rtl="0" eaLnBrk="1" latinLnBrk="0" hangingPunct="1">
-              <a:spcBef>
-                <a:spcPct val="20000"/>
-              </a:spcBef>
-              <a:buFont typeface="Arial"/>
-              <a:buChar char="»"/>
-              <a:defRPr sz="2000" kern="1200">
-                <a:solidFill>
-                  <a:schemeClr val="tx1"/>
-                </a:solidFill>
-                <a:latin typeface="+mn-lt"/>
-                <a:ea typeface="+mn-ea"/>
-                <a:cs typeface="+mn-cs"/>
-              </a:defRPr>
-            </a:lvl5pPr>
-            <a:lvl6pPr marL="2514600" indent="-228600" algn="l" defTabSz="457200" rtl="0" eaLnBrk="1" latinLnBrk="0" hangingPunct="1">
-              <a:spcBef>
-                <a:spcPct val="20000"/>
-              </a:spcBef>
-              <a:buFont typeface="Arial"/>
-              <a:buChar char="•"/>
-              <a:defRPr sz="2000" kern="1200">
-                <a:solidFill>
-                  <a:schemeClr val="tx1"/>
-                </a:solidFill>
-                <a:latin typeface="+mn-lt"/>
-                <a:ea typeface="+mn-ea"/>
-                <a:cs typeface="+mn-cs"/>
-              </a:defRPr>
-            </a:lvl6pPr>
-            <a:lvl7pPr marL="2971800" indent="-228600" algn="l" defTabSz="457200" rtl="0" eaLnBrk="1" latinLnBrk="0" hangingPunct="1">
-              <a:spcBef>
-                <a:spcPct val="20000"/>
-              </a:spcBef>
-              <a:buFont typeface="Arial"/>
-              <a:buChar char="•"/>
-              <a:defRPr sz="2000" kern="1200">
-                <a:solidFill>
-                  <a:schemeClr val="tx1"/>
-                </a:solidFill>
-                <a:latin typeface="+mn-lt"/>
-                <a:ea typeface="+mn-ea"/>
-                <a:cs typeface="+mn-cs"/>
-              </a:defRPr>
-            </a:lvl7pPr>
-            <a:lvl8pPr marL="3429000" indent="-228600" algn="l" defTabSz="457200" rtl="0" eaLnBrk="1" latinLnBrk="0" hangingPunct="1">
-              <a:spcBef>
-                <a:spcPct val="20000"/>
-              </a:spcBef>
-              <a:buFont typeface="Arial"/>
-              <a:buChar char="•"/>
-              <a:defRPr sz="2000" kern="1200">
-                <a:solidFill>
-                  <a:schemeClr val="tx1"/>
-                </a:solidFill>
-                <a:latin typeface="+mn-lt"/>
-                <a:ea typeface="+mn-ea"/>
-                <a:cs typeface="+mn-cs"/>
-              </a:defRPr>
-            </a:lvl8pPr>
-            <a:lvl9pPr marL="3886200" indent="-228600" algn="l" defTabSz="457200" rtl="0" eaLnBrk="1" latinLnBrk="0" hangingPunct="1">
-              <a:spcBef>
-                <a:spcPct val="20000"/>
-              </a:spcBef>
-              <a:buFont typeface="Arial"/>
-              <a:buChar char="•"/>
-              <a:defRPr sz="2000" kern="1200">
-                <a:solidFill>
-                  <a:schemeClr val="tx1"/>
-                </a:solidFill>
-                <a:latin typeface="+mn-lt"/>
-                <a:ea typeface="+mn-ea"/>
-                <a:cs typeface="+mn-cs"/>
-              </a:defRPr>
-            </a:lvl9pPr>
-          </a:lstStyle>
-          <a:p>
-            <a:pPr marL="0" lvl="1" indent="0">
-              <a:buFont typeface="Arial"/>
-              <a:buNone/>
-            </a:pPr>
-            <a:r>
-              <a:rPr lang="en-US" sz="1600" dirty="0" smtClean="0">
-                <a:latin typeface="Arial Black"/>
-                <a:cs typeface="Arial Black"/>
-              </a:rPr>
-              <a:t>Step 1</a:t>
-            </a:r>
-            <a:r>
-              <a:rPr lang="en-US" sz="1600" dirty="0" smtClean="0"/>
-              <a:t>: we assume that the background raw light intensity is normally distributed, and treat active peptides as outliers.  We estimate the mean and standard deviation (</a:t>
-            </a:r>
-            <a:r>
-              <a:rPr lang="en-US" sz="1600" dirty="0" err="1" smtClean="0"/>
-              <a:t>std</a:t>
-            </a:r>
-            <a:r>
-              <a:rPr lang="en-US" sz="1600" dirty="0" smtClean="0"/>
-              <a:t>)  of the underlying normal.</a:t>
-            </a:r>
-          </a:p>
-        </p:txBody>
-      </p:sp>
-      <p:sp>
-        <p:nvSpPr>
-          <p:cNvPr id="6" name="Rectangle 5"/>
-          <p:cNvSpPr/>
-          <p:nvPr/>
-        </p:nvSpPr>
-        <p:spPr>
-          <a:xfrm>
-            <a:off x="0" y="92527"/>
-            <a:ext cx="9143999" cy="523220"/>
-          </a:xfrm>
-          <a:prstGeom prst="rect">
-            <a:avLst/>
-          </a:prstGeom>
-        </p:spPr>
-        <p:txBody>
-          <a:bodyPr wrap="square">
-            <a:spAutoFit/>
-          </a:bodyPr>
-          <a:lstStyle/>
-          <a:p>
-            <a:r>
-              <a:rPr lang="en-US" sz="2800" dirty="0" smtClean="0">
-                <a:latin typeface="Arial Black"/>
-                <a:cs typeface="Arial Black"/>
-              </a:rPr>
-              <a:t>Here’s how our normalization method works</a:t>
-            </a:r>
-            <a:endParaRPr lang="en-US" sz="2800" dirty="0"/>
-          </a:p>
-        </p:txBody>
-      </p:sp>
-    </p:spTree>
-    <p:extLst>
-      <p:ext uri="{BB962C8B-B14F-4D97-AF65-F5344CB8AC3E}">
-        <p14:creationId xmlns:p14="http://schemas.microsoft.com/office/powerpoint/2010/main" val="2906139978"/>
-      </p:ext>
-    </p:extLst>
-  </p:cSld>
-  <p:clrMapOvr>
-    <a:masterClrMapping/>
-  </p:clrMapOvr>
-</p:sld>
-</file>
-
-<file path=ppt/slides/slide7.xml><?xml version="1.0" encoding="utf-8"?>
 <p:sld xmlns:a="http://schemas.openxmlformats.org/drawingml/2006/main" xmlns:r="http://schemas.openxmlformats.org/officeDocument/2006/relationships" xmlns:p="http://schemas.openxmlformats.org/presentationml/2006/main">
   <p:cSld>
     <p:spTree>
@@ -6826,7 +4122,7 @@
 </p:sld>
 </file>
 
-<file path=ppt/slides/slide8.xml><?xml version="1.0" encoding="utf-8"?>
+<file path=ppt/slides/slide5.xml><?xml version="1.0" encoding="utf-8"?>
 <p:sld xmlns:a="http://schemas.openxmlformats.org/drawingml/2006/main" xmlns:r="http://schemas.openxmlformats.org/officeDocument/2006/relationships" xmlns:p="http://schemas.openxmlformats.org/presentationml/2006/main">
   <p:cSld>
     <p:spTree>
@@ -6867,7 +4163,11 @@
           <a:p>
             <a:r>
               <a:rPr lang="en-US" sz="3000" b="1" dirty="0" smtClean="0"/>
-              <a:t>Breakdown of Results (Details in excel spreadsheet)</a:t>
+              <a:t>Breakdown of </a:t>
+            </a:r>
+            <a:r>
+              <a:rPr lang="en-US" sz="3000" b="1" dirty="0" smtClean="0"/>
+              <a:t>Results (Details in excel spreadsheet)</a:t>
             </a:r>
             <a:endParaRPr lang="en-US" sz="3000" b="1" dirty="0"/>
           </a:p>

</xml_diff>

<commit_message>
Here are my edits to the slides orthogonol_peptide_result_analysis. I will go ahead and send these to Lori.
</commit_message>
<xml_diff>
--- a/presentations/orthogonal_peptide_result_analysis.pptx
+++ b/presentations/orthogonal_peptide_result_analysis.pptx
@@ -5,14 +5,17 @@
     <p:sldMasterId id="2147483648" r:id="rId1"/>
   </p:sldMasterIdLst>
   <p:notesMasterIdLst>
-    <p:notesMasterId r:id="rId7"/>
+    <p:notesMasterId r:id="rId10"/>
   </p:notesMasterIdLst>
   <p:sldIdLst>
-    <p:sldId id="258" r:id="rId2"/>
-    <p:sldId id="259" r:id="rId3"/>
-    <p:sldId id="261" r:id="rId4"/>
-    <p:sldId id="260" r:id="rId5"/>
-    <p:sldId id="257" r:id="rId6"/>
+    <p:sldId id="259" r:id="rId2"/>
+    <p:sldId id="263" r:id="rId3"/>
+    <p:sldId id="265" r:id="rId4"/>
+    <p:sldId id="262" r:id="rId5"/>
+    <p:sldId id="258" r:id="rId6"/>
+    <p:sldId id="267" r:id="rId7"/>
+    <p:sldId id="260" r:id="rId8"/>
+    <p:sldId id="257" r:id="rId9"/>
   </p:sldIdLst>
   <p:sldSz cx="9144000" cy="6858000" type="screen4x3"/>
   <p:notesSz cx="6858000" cy="9144000"/>
@@ -529,7 +532,7 @@
           <a:p>
             <a:fld id="{C1BCBD6C-3953-C346-861F-2E605B8E2A68}" type="slidenum">
               <a:rPr lang="en-US" smtClean="0"/>
-              <a:t>5</a:t>
+              <a:t>8</a:t>
             </a:fld>
             <a:endParaRPr lang="en-US"/>
           </a:p>
@@ -3548,73 +3551,752 @@
         </p:nvSpPr>
         <p:spPr>
           <a:xfrm>
-            <a:off x="457200" y="274638"/>
-            <a:ext cx="8229600" cy="45719"/>
+            <a:off x="0" y="0"/>
+            <a:ext cx="9144000" cy="1077006"/>
           </a:xfrm>
         </p:spPr>
         <p:txBody>
           <a:bodyPr>
-            <a:normAutofit fontScale="90000"/>
+            <a:normAutofit/>
           </a:bodyPr>
           <a:lstStyle/>
           <a:p>
+            <a:r>
+              <a:rPr lang="en-US" sz="3200" dirty="0" smtClean="0">
+                <a:latin typeface="Arial Black"/>
+                <a:cs typeface="Arial Black"/>
+              </a:rPr>
+              <a:t>Before normalization, histograms of light intensity are on different scales.</a:t>
+            </a:r>
+            <a:endParaRPr lang="en-US" sz="3200" dirty="0">
+              <a:latin typeface="Arial Black"/>
+              <a:cs typeface="Arial Black"/>
+            </a:endParaRPr>
+          </a:p>
+        </p:txBody>
+      </p:sp>
+      <p:pic>
+        <p:nvPicPr>
+          <p:cNvPr id="4" name="Content Placeholder 3" descr="raw_intensity.png"/>
+          <p:cNvPicPr>
+            <a:picLocks noGrp="1" noChangeAspect="1"/>
+          </p:cNvPicPr>
+          <p:nvPr>
+            <p:ph idx="1"/>
+          </p:nvPr>
+        </p:nvPicPr>
+        <p:blipFill>
+          <a:blip r:embed="rId2">
+            <a:extLst>
+              <a:ext uri="{28A0092B-C50C-407E-A947-70E740481C1C}">
+                <a14:useLocalDpi xmlns:a14="http://schemas.microsoft.com/office/drawing/2010/main" val="0"/>
+              </a:ext>
+            </a:extLst>
+          </a:blip>
+          <a:srcRect l="9830" r="9830"/>
+          <a:stretch>
+            <a:fillRect/>
+          </a:stretch>
+        </p:blipFill>
+        <p:spPr>
+          <a:xfrm>
+            <a:off x="457200" y="1032911"/>
+            <a:ext cx="8229600" cy="5587116"/>
+          </a:xfrm>
+        </p:spPr>
+      </p:pic>
+      <p:sp>
+        <p:nvSpPr>
+          <p:cNvPr id="3" name="TextBox 2"/>
+          <p:cNvSpPr txBox="1"/>
+          <p:nvPr/>
+        </p:nvSpPr>
+        <p:spPr>
+          <a:xfrm>
+            <a:off x="873171" y="1077006"/>
+            <a:ext cx="3249958" cy="369332"/>
+          </a:xfrm>
+          <a:prstGeom prst="rect">
+            <a:avLst/>
+          </a:prstGeom>
+          <a:solidFill>
+            <a:schemeClr val="bg1"/>
+          </a:solidFill>
+        </p:spPr>
+        <p:txBody>
+          <a:bodyPr wrap="none" rtlCol="0" anchor="b">
+            <a:spAutoFit/>
+          </a:bodyPr>
+          <a:lstStyle/>
+          <a:p>
+            <a:r>
+              <a:rPr lang="en-US" dirty="0" smtClean="0"/>
+              <a:t>Membrane treated with </a:t>
+            </a:r>
+            <a:r>
+              <a:rPr lang="en-US" dirty="0" err="1" smtClean="0"/>
+              <a:t>Sfp</a:t>
+            </a:r>
+            <a:r>
+              <a:rPr lang="en-US" dirty="0" smtClean="0"/>
+              <a:t> only</a:t>
+            </a:r>
             <a:endParaRPr lang="en-US" dirty="0"/>
           </a:p>
         </p:txBody>
       </p:sp>
       <p:sp>
         <p:nvSpPr>
-          <p:cNvPr id="3" name="Content Placeholder 2"/>
-          <p:cNvSpPr>
-            <a:spLocks noGrp="1"/>
-          </p:cNvSpPr>
-          <p:nvPr>
-            <p:ph idx="1"/>
-          </p:nvPr>
-        </p:nvSpPr>
-        <p:spPr>
-          <a:xfrm>
-            <a:off x="457200" y="465956"/>
-            <a:ext cx="8229600" cy="5660207"/>
-          </a:xfrm>
-        </p:spPr>
-        <p:txBody>
-          <a:bodyPr/>
-          <a:lstStyle/>
-          <a:p>
-            <a:pPr marL="0" indent="0">
-              <a:buNone/>
-            </a:pPr>
+          <p:cNvPr id="6" name="TextBox 5"/>
+          <p:cNvSpPr txBox="1"/>
+          <p:nvPr/>
+        </p:nvSpPr>
+        <p:spPr>
+          <a:xfrm>
+            <a:off x="2707156" y="3392580"/>
+            <a:ext cx="1415973" cy="215444"/>
+          </a:xfrm>
+          <a:prstGeom prst="rect">
+            <a:avLst/>
+          </a:prstGeom>
+          <a:noFill/>
+        </p:spPr>
+        <p:txBody>
+          <a:bodyPr wrap="none" rtlCol="0">
+            <a:spAutoFit/>
+          </a:bodyPr>
+          <a:lstStyle/>
+          <a:p>
+            <a:r>
+              <a:rPr lang="en-US" sz="800" dirty="0" smtClean="0">
+                <a:latin typeface="Andale Mono"/>
+                <a:cs typeface="Andale Mono"/>
+              </a:rPr>
+              <a:t>Integrated Intensity</a:t>
+            </a:r>
+            <a:endParaRPr lang="en-US" sz="800" dirty="0">
+              <a:latin typeface="Andale Mono"/>
+              <a:cs typeface="Andale Mono"/>
+            </a:endParaRPr>
+          </a:p>
+        </p:txBody>
+      </p:sp>
+      <p:sp>
+        <p:nvSpPr>
+          <p:cNvPr id="8" name="TextBox 7"/>
+          <p:cNvSpPr txBox="1"/>
+          <p:nvPr/>
+        </p:nvSpPr>
+        <p:spPr>
+          <a:xfrm>
+            <a:off x="5242802" y="1069255"/>
+            <a:ext cx="3745098" cy="369332"/>
+          </a:xfrm>
+          <a:prstGeom prst="rect">
+            <a:avLst/>
+          </a:prstGeom>
+          <a:solidFill>
+            <a:schemeClr val="bg1"/>
+          </a:solidFill>
+        </p:spPr>
+        <p:txBody>
+          <a:bodyPr wrap="none" rtlCol="0" anchor="b">
+            <a:spAutoFit/>
+          </a:bodyPr>
+          <a:lstStyle/>
+          <a:p>
             <a:r>
               <a:rPr lang="en-US" dirty="0" smtClean="0"/>
-              <a:t>The core idea of our analysis is:</a:t>
-            </a:r>
-          </a:p>
-          <a:p>
-            <a:pPr marL="514350" indent="-514350">
-              <a:buAutoNum type="arabicPeriod"/>
-            </a:pPr>
+              <a:t>Membrane treated with </a:t>
+            </a:r>
+            <a:r>
+              <a:rPr lang="en-US" dirty="0" err="1" smtClean="0"/>
+              <a:t>Sfp</a:t>
+            </a:r>
             <a:r>
               <a:rPr lang="en-US" dirty="0" smtClean="0"/>
-              <a:t>Use normal distribution to fit background light intensity for each of the four sets of experiments.</a:t>
-            </a:r>
-          </a:p>
-          <a:p>
-            <a:pPr marL="514350" indent="-514350">
-              <a:buAutoNum type="arabicPeriod"/>
-            </a:pPr>
+              <a:t> &amp; </a:t>
+            </a:r>
+            <a:r>
+              <a:rPr lang="en-US" dirty="0" err="1" smtClean="0"/>
+              <a:t>PfAcpH</a:t>
+            </a:r>
+            <a:endParaRPr lang="en-US" dirty="0"/>
+          </a:p>
+        </p:txBody>
+      </p:sp>
+      <p:sp>
+        <p:nvSpPr>
+          <p:cNvPr id="9" name="TextBox 8"/>
+          <p:cNvSpPr txBox="1"/>
+          <p:nvPr/>
+        </p:nvSpPr>
+        <p:spPr>
+          <a:xfrm>
+            <a:off x="793792" y="3707591"/>
+            <a:ext cx="3410684" cy="369332"/>
+          </a:xfrm>
+          <a:prstGeom prst="rect">
+            <a:avLst/>
+          </a:prstGeom>
+          <a:solidFill>
+            <a:schemeClr val="bg1"/>
+          </a:solidFill>
+        </p:spPr>
+        <p:txBody>
+          <a:bodyPr wrap="none" rtlCol="0" anchor="b">
+            <a:spAutoFit/>
+          </a:bodyPr>
+          <a:lstStyle/>
+          <a:p>
             <a:r>
               <a:rPr lang="en-US" dirty="0" smtClean="0"/>
-              <a:t>Normalize light intensity to standard normal scale, so that we can compare values in four sets of experiments because they are now converted to the same condition.</a:t>
+              <a:t>Membrane treated with </a:t>
+            </a:r>
+            <a:r>
+              <a:rPr lang="en-US" dirty="0" err="1" smtClean="0"/>
+              <a:t>AcpS</a:t>
+            </a:r>
+            <a:r>
+              <a:rPr lang="en-US" dirty="0" smtClean="0"/>
+              <a:t> only</a:t>
             </a:r>
             <a:endParaRPr lang="en-US" dirty="0"/>
+          </a:p>
+        </p:txBody>
+      </p:sp>
+      <p:sp>
+        <p:nvSpPr>
+          <p:cNvPr id="10" name="TextBox 9"/>
+          <p:cNvSpPr txBox="1"/>
+          <p:nvPr/>
+        </p:nvSpPr>
+        <p:spPr>
+          <a:xfrm>
+            <a:off x="2788503" y="6137171"/>
+            <a:ext cx="1415973" cy="215444"/>
+          </a:xfrm>
+          <a:prstGeom prst="rect">
+            <a:avLst/>
+          </a:prstGeom>
+          <a:noFill/>
+        </p:spPr>
+        <p:txBody>
+          <a:bodyPr wrap="none" rtlCol="0">
+            <a:spAutoFit/>
+          </a:bodyPr>
+          <a:lstStyle/>
+          <a:p>
+            <a:r>
+              <a:rPr lang="en-US" sz="800" dirty="0" smtClean="0">
+                <a:latin typeface="Andale Mono"/>
+                <a:cs typeface="Andale Mono"/>
+              </a:rPr>
+              <a:t>Integrated Intensity</a:t>
+            </a:r>
+            <a:endParaRPr lang="en-US" sz="800" dirty="0">
+              <a:latin typeface="Andale Mono"/>
+              <a:cs typeface="Andale Mono"/>
+            </a:endParaRPr>
+          </a:p>
+        </p:txBody>
+      </p:sp>
+      <p:sp>
+        <p:nvSpPr>
+          <p:cNvPr id="11" name="TextBox 10"/>
+          <p:cNvSpPr txBox="1"/>
+          <p:nvPr/>
+        </p:nvSpPr>
+        <p:spPr>
+          <a:xfrm>
+            <a:off x="7270827" y="3437258"/>
+            <a:ext cx="1415973" cy="215444"/>
+          </a:xfrm>
+          <a:prstGeom prst="rect">
+            <a:avLst/>
+          </a:prstGeom>
+          <a:noFill/>
+        </p:spPr>
+        <p:txBody>
+          <a:bodyPr wrap="none" rtlCol="0">
+            <a:spAutoFit/>
+          </a:bodyPr>
+          <a:lstStyle/>
+          <a:p>
+            <a:r>
+              <a:rPr lang="en-US" sz="800" dirty="0" smtClean="0">
+                <a:latin typeface="Andale Mono"/>
+                <a:cs typeface="Andale Mono"/>
+              </a:rPr>
+              <a:t>Integrated Intensity</a:t>
+            </a:r>
+            <a:endParaRPr lang="en-US" sz="800" dirty="0">
+              <a:latin typeface="Andale Mono"/>
+              <a:cs typeface="Andale Mono"/>
+            </a:endParaRPr>
+          </a:p>
+        </p:txBody>
+      </p:sp>
+      <p:sp>
+        <p:nvSpPr>
+          <p:cNvPr id="12" name="TextBox 11"/>
+          <p:cNvSpPr txBox="1"/>
+          <p:nvPr/>
+        </p:nvSpPr>
+        <p:spPr>
+          <a:xfrm>
+            <a:off x="7270827" y="6111035"/>
+            <a:ext cx="1415973" cy="215444"/>
+          </a:xfrm>
+          <a:prstGeom prst="rect">
+            <a:avLst/>
+          </a:prstGeom>
+          <a:noFill/>
+        </p:spPr>
+        <p:txBody>
+          <a:bodyPr wrap="none" rtlCol="0">
+            <a:spAutoFit/>
+          </a:bodyPr>
+          <a:lstStyle/>
+          <a:p>
+            <a:r>
+              <a:rPr lang="en-US" sz="800" dirty="0" smtClean="0">
+                <a:latin typeface="Andale Mono"/>
+                <a:cs typeface="Andale Mono"/>
+              </a:rPr>
+              <a:t>Integrated Intensity</a:t>
+            </a:r>
+            <a:endParaRPr lang="en-US" sz="800" dirty="0">
+              <a:latin typeface="Andale Mono"/>
+              <a:cs typeface="Andale Mono"/>
+            </a:endParaRPr>
+          </a:p>
+        </p:txBody>
+      </p:sp>
+      <p:sp>
+        <p:nvSpPr>
+          <p:cNvPr id="13" name="TextBox 12"/>
+          <p:cNvSpPr txBox="1"/>
+          <p:nvPr/>
+        </p:nvSpPr>
+        <p:spPr>
+          <a:xfrm>
+            <a:off x="5060047" y="3707591"/>
+            <a:ext cx="3905824" cy="369332"/>
+          </a:xfrm>
+          <a:prstGeom prst="rect">
+            <a:avLst/>
+          </a:prstGeom>
+          <a:solidFill>
+            <a:schemeClr val="bg1"/>
+          </a:solidFill>
+        </p:spPr>
+        <p:txBody>
+          <a:bodyPr wrap="none" rtlCol="0" anchor="b">
+            <a:spAutoFit/>
+          </a:bodyPr>
+          <a:lstStyle/>
+          <a:p>
+            <a:r>
+              <a:rPr lang="en-US" dirty="0" smtClean="0"/>
+              <a:t>Membrane treated with </a:t>
+            </a:r>
+            <a:r>
+              <a:rPr lang="en-US" dirty="0" err="1" smtClean="0"/>
+              <a:t>AcpS</a:t>
+            </a:r>
+            <a:r>
+              <a:rPr lang="en-US" dirty="0" smtClean="0"/>
+              <a:t> &amp; </a:t>
+            </a:r>
+            <a:r>
+              <a:rPr lang="en-US" dirty="0" err="1" smtClean="0"/>
+              <a:t>PfAcpH</a:t>
+            </a:r>
+            <a:endParaRPr lang="en-US" dirty="0"/>
+          </a:p>
+        </p:txBody>
+      </p:sp>
+      <p:cxnSp>
+        <p:nvCxnSpPr>
+          <p:cNvPr id="18" name="Straight Arrow Connector 17"/>
+          <p:cNvCxnSpPr/>
+          <p:nvPr/>
+        </p:nvCxnSpPr>
+        <p:spPr>
+          <a:xfrm flipV="1">
+            <a:off x="1631676" y="3437258"/>
+            <a:ext cx="0" cy="170766"/>
+          </a:xfrm>
+          <a:prstGeom prst="straightConnector1">
+            <a:avLst/>
+          </a:prstGeom>
+          <a:ln>
+            <a:solidFill>
+              <a:srgbClr val="FF0000"/>
+            </a:solidFill>
+            <a:tailEnd type="arrow"/>
+          </a:ln>
+        </p:spPr>
+        <p:style>
+          <a:lnRef idx="2">
+            <a:schemeClr val="accent1"/>
+          </a:lnRef>
+          <a:fillRef idx="0">
+            <a:schemeClr val="accent1"/>
+          </a:fillRef>
+          <a:effectRef idx="1">
+            <a:schemeClr val="accent1"/>
+          </a:effectRef>
+          <a:fontRef idx="minor">
+            <a:schemeClr val="tx1"/>
+          </a:fontRef>
+        </p:style>
+      </p:cxnSp>
+      <p:sp>
+        <p:nvSpPr>
+          <p:cNvPr id="21" name="Title 1"/>
+          <p:cNvSpPr txBox="1">
+            <a:spLocks/>
+          </p:cNvSpPr>
+          <p:nvPr/>
+        </p:nvSpPr>
+        <p:spPr>
+          <a:xfrm>
+            <a:off x="704021" y="3567185"/>
+            <a:ext cx="2384502" cy="280811"/>
+          </a:xfrm>
+          <a:prstGeom prst="rect">
+            <a:avLst/>
+          </a:prstGeom>
+        </p:spPr>
+        <p:txBody>
+          <a:bodyPr vert="horz" lIns="91440" tIns="45720" rIns="91440" bIns="45720" rtlCol="0" anchor="ctr">
+            <a:normAutofit/>
+          </a:bodyPr>
+          <a:lstStyle>
+            <a:lvl1pPr algn="ctr" defTabSz="457200" rtl="0" eaLnBrk="1" latinLnBrk="0" hangingPunct="1">
+              <a:spcBef>
+                <a:spcPct val="0"/>
+              </a:spcBef>
+              <a:buNone/>
+              <a:defRPr sz="4400" kern="1200">
+                <a:solidFill>
+                  <a:schemeClr val="tx1"/>
+                </a:solidFill>
+                <a:latin typeface="+mj-lt"/>
+                <a:ea typeface="+mj-ea"/>
+                <a:cs typeface="+mj-cs"/>
+              </a:defRPr>
+            </a:lvl1pPr>
+          </a:lstStyle>
+          <a:p>
+            <a:r>
+              <a:rPr lang="en-US" sz="1200" dirty="0" smtClean="0">
+                <a:solidFill>
+                  <a:srgbClr val="FF0000"/>
+                </a:solidFill>
+                <a:latin typeface="Arial Black"/>
+                <a:cs typeface="Arial Black"/>
+              </a:rPr>
+              <a:t>Centered near 1500 </a:t>
+            </a:r>
+            <a:endParaRPr lang="en-US" sz="1200" dirty="0">
+              <a:solidFill>
+                <a:srgbClr val="FF0000"/>
+              </a:solidFill>
+              <a:latin typeface="Arial Black"/>
+              <a:cs typeface="Arial Black"/>
+            </a:endParaRPr>
+          </a:p>
+        </p:txBody>
+      </p:sp>
+      <p:cxnSp>
+        <p:nvCxnSpPr>
+          <p:cNvPr id="22" name="Straight Arrow Connector 21"/>
+          <p:cNvCxnSpPr/>
+          <p:nvPr/>
+        </p:nvCxnSpPr>
+        <p:spPr>
+          <a:xfrm flipV="1">
+            <a:off x="1457740" y="6047327"/>
+            <a:ext cx="0" cy="170766"/>
+          </a:xfrm>
+          <a:prstGeom prst="straightConnector1">
+            <a:avLst/>
+          </a:prstGeom>
+          <a:ln>
+            <a:solidFill>
+              <a:srgbClr val="FF0000"/>
+            </a:solidFill>
+            <a:tailEnd type="arrow"/>
+          </a:ln>
+        </p:spPr>
+        <p:style>
+          <a:lnRef idx="2">
+            <a:schemeClr val="accent1"/>
+          </a:lnRef>
+          <a:fillRef idx="0">
+            <a:schemeClr val="accent1"/>
+          </a:fillRef>
+          <a:effectRef idx="1">
+            <a:schemeClr val="accent1"/>
+          </a:effectRef>
+          <a:fontRef idx="minor">
+            <a:schemeClr val="tx1"/>
+          </a:fontRef>
+        </p:style>
+      </p:cxnSp>
+      <p:sp>
+        <p:nvSpPr>
+          <p:cNvPr id="23" name="Title 1"/>
+          <p:cNvSpPr txBox="1">
+            <a:spLocks/>
+          </p:cNvSpPr>
+          <p:nvPr/>
+        </p:nvSpPr>
+        <p:spPr>
+          <a:xfrm>
+            <a:off x="530085" y="6177254"/>
+            <a:ext cx="2384502" cy="280811"/>
+          </a:xfrm>
+          <a:prstGeom prst="rect">
+            <a:avLst/>
+          </a:prstGeom>
+        </p:spPr>
+        <p:txBody>
+          <a:bodyPr vert="horz" lIns="91440" tIns="45720" rIns="91440" bIns="45720" rtlCol="0" anchor="ctr">
+            <a:normAutofit/>
+          </a:bodyPr>
+          <a:lstStyle>
+            <a:lvl1pPr algn="ctr" defTabSz="457200" rtl="0" eaLnBrk="1" latinLnBrk="0" hangingPunct="1">
+              <a:spcBef>
+                <a:spcPct val="0"/>
+              </a:spcBef>
+              <a:buNone/>
+              <a:defRPr sz="4400" kern="1200">
+                <a:solidFill>
+                  <a:schemeClr val="tx1"/>
+                </a:solidFill>
+                <a:latin typeface="+mj-lt"/>
+                <a:ea typeface="+mj-ea"/>
+                <a:cs typeface="+mj-cs"/>
+              </a:defRPr>
+            </a:lvl1pPr>
+          </a:lstStyle>
+          <a:p>
+            <a:r>
+              <a:rPr lang="en-US" sz="1200" dirty="0" smtClean="0">
+                <a:solidFill>
+                  <a:srgbClr val="FF0000"/>
+                </a:solidFill>
+                <a:latin typeface="Arial Black"/>
+                <a:cs typeface="Arial Black"/>
+              </a:rPr>
+              <a:t>Centered near 1200 </a:t>
+            </a:r>
+            <a:endParaRPr lang="en-US" sz="1200" dirty="0">
+              <a:solidFill>
+                <a:srgbClr val="FF0000"/>
+              </a:solidFill>
+              <a:latin typeface="Arial Black"/>
+              <a:cs typeface="Arial Black"/>
+            </a:endParaRPr>
+          </a:p>
+        </p:txBody>
+      </p:sp>
+      <p:cxnSp>
+        <p:nvCxnSpPr>
+          <p:cNvPr id="24" name="Straight Arrow Connector 23"/>
+          <p:cNvCxnSpPr/>
+          <p:nvPr/>
+        </p:nvCxnSpPr>
+        <p:spPr>
+          <a:xfrm flipV="1">
+            <a:off x="5909747" y="3419620"/>
+            <a:ext cx="0" cy="170766"/>
+          </a:xfrm>
+          <a:prstGeom prst="straightConnector1">
+            <a:avLst/>
+          </a:prstGeom>
+          <a:ln>
+            <a:solidFill>
+              <a:srgbClr val="FF0000"/>
+            </a:solidFill>
+            <a:tailEnd type="arrow"/>
+          </a:ln>
+        </p:spPr>
+        <p:style>
+          <a:lnRef idx="2">
+            <a:schemeClr val="accent1"/>
+          </a:lnRef>
+          <a:fillRef idx="0">
+            <a:schemeClr val="accent1"/>
+          </a:fillRef>
+          <a:effectRef idx="1">
+            <a:schemeClr val="accent1"/>
+          </a:effectRef>
+          <a:fontRef idx="minor">
+            <a:schemeClr val="tx1"/>
+          </a:fontRef>
+        </p:style>
+      </p:cxnSp>
+      <p:sp>
+        <p:nvSpPr>
+          <p:cNvPr id="25" name="Title 1"/>
+          <p:cNvSpPr txBox="1">
+            <a:spLocks/>
+          </p:cNvSpPr>
+          <p:nvPr/>
+        </p:nvSpPr>
+        <p:spPr>
+          <a:xfrm>
+            <a:off x="4982092" y="3549547"/>
+            <a:ext cx="2384502" cy="280811"/>
+          </a:xfrm>
+          <a:prstGeom prst="rect">
+            <a:avLst/>
+          </a:prstGeom>
+        </p:spPr>
+        <p:txBody>
+          <a:bodyPr vert="horz" lIns="91440" tIns="45720" rIns="91440" bIns="45720" rtlCol="0" anchor="ctr">
+            <a:normAutofit/>
+          </a:bodyPr>
+          <a:lstStyle>
+            <a:lvl1pPr algn="ctr" defTabSz="457200" rtl="0" eaLnBrk="1" latinLnBrk="0" hangingPunct="1">
+              <a:spcBef>
+                <a:spcPct val="0"/>
+              </a:spcBef>
+              <a:buNone/>
+              <a:defRPr sz="4400" kern="1200">
+                <a:solidFill>
+                  <a:schemeClr val="tx1"/>
+                </a:solidFill>
+                <a:latin typeface="+mj-lt"/>
+                <a:ea typeface="+mj-ea"/>
+                <a:cs typeface="+mj-cs"/>
+              </a:defRPr>
+            </a:lvl1pPr>
+          </a:lstStyle>
+          <a:p>
+            <a:r>
+              <a:rPr lang="en-US" sz="1200" dirty="0" smtClean="0">
+                <a:solidFill>
+                  <a:srgbClr val="FF0000"/>
+                </a:solidFill>
+                <a:latin typeface="Arial Black"/>
+                <a:cs typeface="Arial Black"/>
+              </a:rPr>
+              <a:t>Centered near 1100 </a:t>
+            </a:r>
+            <a:endParaRPr lang="en-US" sz="1200" dirty="0">
+              <a:solidFill>
+                <a:srgbClr val="FF0000"/>
+              </a:solidFill>
+              <a:latin typeface="Arial Black"/>
+              <a:cs typeface="Arial Black"/>
+            </a:endParaRPr>
+          </a:p>
+        </p:txBody>
+      </p:sp>
+      <p:cxnSp>
+        <p:nvCxnSpPr>
+          <p:cNvPr id="26" name="Straight Arrow Connector 25"/>
+          <p:cNvCxnSpPr/>
+          <p:nvPr/>
+        </p:nvCxnSpPr>
+        <p:spPr>
+          <a:xfrm flipV="1">
+            <a:off x="5980306" y="6047327"/>
+            <a:ext cx="0" cy="170766"/>
+          </a:xfrm>
+          <a:prstGeom prst="straightConnector1">
+            <a:avLst/>
+          </a:prstGeom>
+          <a:ln>
+            <a:solidFill>
+              <a:srgbClr val="FF0000"/>
+            </a:solidFill>
+            <a:tailEnd type="arrow"/>
+          </a:ln>
+        </p:spPr>
+        <p:style>
+          <a:lnRef idx="2">
+            <a:schemeClr val="accent1"/>
+          </a:lnRef>
+          <a:fillRef idx="0">
+            <a:schemeClr val="accent1"/>
+          </a:fillRef>
+          <a:effectRef idx="1">
+            <a:schemeClr val="accent1"/>
+          </a:effectRef>
+          <a:fontRef idx="minor">
+            <a:schemeClr val="tx1"/>
+          </a:fontRef>
+        </p:style>
+      </p:cxnSp>
+      <p:sp>
+        <p:nvSpPr>
+          <p:cNvPr id="27" name="Title 1"/>
+          <p:cNvSpPr txBox="1">
+            <a:spLocks/>
+          </p:cNvSpPr>
+          <p:nvPr/>
+        </p:nvSpPr>
+        <p:spPr>
+          <a:xfrm>
+            <a:off x="5052651" y="6177254"/>
+            <a:ext cx="2384502" cy="280811"/>
+          </a:xfrm>
+          <a:prstGeom prst="rect">
+            <a:avLst/>
+          </a:prstGeom>
+        </p:spPr>
+        <p:txBody>
+          <a:bodyPr vert="horz" lIns="91440" tIns="45720" rIns="91440" bIns="45720" rtlCol="0" anchor="ctr">
+            <a:normAutofit/>
+          </a:bodyPr>
+          <a:lstStyle>
+            <a:lvl1pPr algn="ctr" defTabSz="457200" rtl="0" eaLnBrk="1" latinLnBrk="0" hangingPunct="1">
+              <a:spcBef>
+                <a:spcPct val="0"/>
+              </a:spcBef>
+              <a:buNone/>
+              <a:defRPr sz="4400" kern="1200">
+                <a:solidFill>
+                  <a:schemeClr val="tx1"/>
+                </a:solidFill>
+                <a:latin typeface="+mj-lt"/>
+                <a:ea typeface="+mj-ea"/>
+                <a:cs typeface="+mj-cs"/>
+              </a:defRPr>
+            </a:lvl1pPr>
+          </a:lstStyle>
+          <a:p>
+            <a:r>
+              <a:rPr lang="en-US" sz="1200" dirty="0" smtClean="0">
+                <a:solidFill>
+                  <a:srgbClr val="FF0000"/>
+                </a:solidFill>
+                <a:latin typeface="Arial Black"/>
+                <a:cs typeface="Arial Black"/>
+              </a:rPr>
+              <a:t>Centered near 1200 </a:t>
+            </a:r>
+            <a:endParaRPr lang="en-US" sz="1200" dirty="0">
+              <a:solidFill>
+                <a:srgbClr val="FF0000"/>
+              </a:solidFill>
+              <a:latin typeface="Arial Black"/>
+              <a:cs typeface="Arial Black"/>
+            </a:endParaRPr>
           </a:p>
         </p:txBody>
       </p:sp>
     </p:spTree>
     <p:extLst>
       <p:ext uri="{BB962C8B-B14F-4D97-AF65-F5344CB8AC3E}">
-        <p14:creationId xmlns:p14="http://schemas.microsoft.com/office/powerpoint/2010/main" val="182862864"/>
+        <p14:creationId xmlns:p14="http://schemas.microsoft.com/office/powerpoint/2010/main" val="2144814738"/>
       </p:ext>
     </p:extLst>
   </p:cSld>
@@ -3653,21 +4335,27 @@
         </p:nvSpPr>
         <p:spPr>
           <a:xfrm>
-            <a:off x="457200" y="0"/>
-            <a:ext cx="8229600" cy="392865"/>
+            <a:off x="0" y="0"/>
+            <a:ext cx="9144000" cy="1077006"/>
           </a:xfrm>
         </p:spPr>
         <p:txBody>
           <a:bodyPr>
-            <a:normAutofit fontScale="90000"/>
+            <a:normAutofit/>
           </a:bodyPr>
           <a:lstStyle/>
           <a:p>
             <a:r>
-              <a:rPr lang="en-US" dirty="0" smtClean="0"/>
-              <a:t>Histogram plot before normalization</a:t>
-            </a:r>
-            <a:endParaRPr lang="en-US" dirty="0"/>
+              <a:rPr lang="en-US" sz="3200" dirty="0" smtClean="0">
+                <a:latin typeface="Arial Black"/>
+                <a:cs typeface="Arial Black"/>
+              </a:rPr>
+              <a:t>The previous normalization method only partially addressed this issue.</a:t>
+            </a:r>
+            <a:endParaRPr lang="en-US" sz="3200" dirty="0">
+              <a:latin typeface="Arial Black"/>
+              <a:cs typeface="Arial Black"/>
+            </a:endParaRPr>
           </a:p>
         </p:txBody>
       </p:sp>
@@ -3681,7 +4369,7 @@
             <p:ph idx="1"/>
           </p:nvPr>
         </p:nvPicPr>
-        <p:blipFill>
+        <p:blipFill rotWithShape="1">
           <a:blip r:embed="rId2">
             <a:extLst>
               <a:ext uri="{28A0092B-C50C-407E-A947-70E740481C1C}">
@@ -3689,22 +4377,407 @@
               </a:ext>
             </a:extLst>
           </a:blip>
-          <a:srcRect l="9830" r="9830"/>
-          <a:stretch>
-            <a:fillRect/>
-          </a:stretch>
+          <a:srcRect l="9959" r="50684"/>
+          <a:stretch/>
         </p:blipFill>
         <p:spPr>
           <a:xfrm>
-            <a:off x="457200" y="539047"/>
-            <a:ext cx="8229600" cy="5587116"/>
+            <a:off x="33840" y="1465042"/>
+            <a:ext cx="3979195" cy="5587116"/>
           </a:xfrm>
         </p:spPr>
       </p:pic>
+      <p:sp>
+        <p:nvSpPr>
+          <p:cNvPr id="3" name="TextBox 2"/>
+          <p:cNvSpPr txBox="1"/>
+          <p:nvPr/>
+        </p:nvSpPr>
+        <p:spPr>
+          <a:xfrm>
+            <a:off x="343971" y="1509137"/>
+            <a:ext cx="3249958" cy="369332"/>
+          </a:xfrm>
+          <a:prstGeom prst="rect">
+            <a:avLst/>
+          </a:prstGeom>
+          <a:solidFill>
+            <a:schemeClr val="bg1"/>
+          </a:solidFill>
+        </p:spPr>
+        <p:txBody>
+          <a:bodyPr wrap="none" rtlCol="0" anchor="b">
+            <a:spAutoFit/>
+          </a:bodyPr>
+          <a:lstStyle/>
+          <a:p>
+            <a:r>
+              <a:rPr lang="en-US" dirty="0" smtClean="0"/>
+              <a:t>Membrane treated with </a:t>
+            </a:r>
+            <a:r>
+              <a:rPr lang="en-US" dirty="0" err="1" smtClean="0"/>
+              <a:t>Sfp</a:t>
+            </a:r>
+            <a:r>
+              <a:rPr lang="en-US" dirty="0" smtClean="0"/>
+              <a:t> only</a:t>
+            </a:r>
+            <a:endParaRPr lang="en-US" dirty="0"/>
+          </a:p>
+        </p:txBody>
+      </p:sp>
+      <p:sp>
+        <p:nvSpPr>
+          <p:cNvPr id="6" name="TextBox 5"/>
+          <p:cNvSpPr txBox="1"/>
+          <p:nvPr/>
+        </p:nvSpPr>
+        <p:spPr>
+          <a:xfrm>
+            <a:off x="2389636" y="3824711"/>
+            <a:ext cx="1415973" cy="215444"/>
+          </a:xfrm>
+          <a:prstGeom prst="rect">
+            <a:avLst/>
+          </a:prstGeom>
+          <a:noFill/>
+        </p:spPr>
+        <p:txBody>
+          <a:bodyPr wrap="none" rtlCol="0">
+            <a:spAutoFit/>
+          </a:bodyPr>
+          <a:lstStyle/>
+          <a:p>
+            <a:r>
+              <a:rPr lang="en-US" sz="800" dirty="0" smtClean="0">
+                <a:latin typeface="Andale Mono"/>
+                <a:cs typeface="Andale Mono"/>
+              </a:rPr>
+              <a:t>Integrated Intensity</a:t>
+            </a:r>
+            <a:endParaRPr lang="en-US" sz="800" dirty="0">
+              <a:latin typeface="Andale Mono"/>
+              <a:cs typeface="Andale Mono"/>
+            </a:endParaRPr>
+          </a:p>
+        </p:txBody>
+      </p:sp>
+      <p:sp>
+        <p:nvSpPr>
+          <p:cNvPr id="9" name="TextBox 8"/>
+          <p:cNvSpPr txBox="1"/>
+          <p:nvPr/>
+        </p:nvSpPr>
+        <p:spPr>
+          <a:xfrm>
+            <a:off x="317512" y="4148541"/>
+            <a:ext cx="3410684" cy="369332"/>
+          </a:xfrm>
+          <a:prstGeom prst="rect">
+            <a:avLst/>
+          </a:prstGeom>
+          <a:solidFill>
+            <a:schemeClr val="bg1"/>
+          </a:solidFill>
+        </p:spPr>
+        <p:txBody>
+          <a:bodyPr wrap="none" rtlCol="0" anchor="b">
+            <a:spAutoFit/>
+          </a:bodyPr>
+          <a:lstStyle/>
+          <a:p>
+            <a:r>
+              <a:rPr lang="en-US" dirty="0" smtClean="0"/>
+              <a:t>Membrane treated with </a:t>
+            </a:r>
+            <a:r>
+              <a:rPr lang="en-US" dirty="0" err="1" smtClean="0"/>
+              <a:t>AcpS</a:t>
+            </a:r>
+            <a:r>
+              <a:rPr lang="en-US" dirty="0" smtClean="0"/>
+              <a:t> only</a:t>
+            </a:r>
+            <a:endParaRPr lang="en-US" dirty="0"/>
+          </a:p>
+        </p:txBody>
+      </p:sp>
+      <p:sp>
+        <p:nvSpPr>
+          <p:cNvPr id="10" name="TextBox 9"/>
+          <p:cNvSpPr txBox="1"/>
+          <p:nvPr/>
+        </p:nvSpPr>
+        <p:spPr>
+          <a:xfrm>
+            <a:off x="2470983" y="6569302"/>
+            <a:ext cx="1415973" cy="215444"/>
+          </a:xfrm>
+          <a:prstGeom prst="rect">
+            <a:avLst/>
+          </a:prstGeom>
+          <a:noFill/>
+        </p:spPr>
+        <p:txBody>
+          <a:bodyPr wrap="none" rtlCol="0">
+            <a:spAutoFit/>
+          </a:bodyPr>
+          <a:lstStyle/>
+          <a:p>
+            <a:r>
+              <a:rPr lang="en-US" sz="800" dirty="0" smtClean="0">
+                <a:latin typeface="Andale Mono"/>
+                <a:cs typeface="Andale Mono"/>
+              </a:rPr>
+              <a:t>Integrated Intensity</a:t>
+            </a:r>
+            <a:endParaRPr lang="en-US" sz="800" dirty="0">
+              <a:latin typeface="Andale Mono"/>
+              <a:cs typeface="Andale Mono"/>
+            </a:endParaRPr>
+          </a:p>
+        </p:txBody>
+      </p:sp>
+      <p:sp>
+        <p:nvSpPr>
+          <p:cNvPr id="7" name="TextBox 6"/>
+          <p:cNvSpPr txBox="1"/>
+          <p:nvPr/>
+        </p:nvSpPr>
+        <p:spPr>
+          <a:xfrm>
+            <a:off x="4542233" y="1596267"/>
+            <a:ext cx="3951302" cy="4801315"/>
+          </a:xfrm>
+          <a:prstGeom prst="rect">
+            <a:avLst/>
+          </a:prstGeom>
+          <a:noFill/>
+        </p:spPr>
+        <p:txBody>
+          <a:bodyPr wrap="square" rtlCol="0">
+            <a:spAutoFit/>
+          </a:bodyPr>
+          <a:lstStyle/>
+          <a:p>
+            <a:r>
+              <a:rPr lang="en-US" dirty="0" smtClean="0"/>
+              <a:t>For the moment, let’s focus on images taken from membranes treated by </a:t>
+            </a:r>
+            <a:r>
+              <a:rPr lang="en-US" dirty="0" err="1" smtClean="0"/>
+              <a:t>Sfp</a:t>
+            </a:r>
+            <a:r>
+              <a:rPr lang="en-US" dirty="0"/>
+              <a:t> </a:t>
+            </a:r>
+            <a:r>
+              <a:rPr lang="en-US" dirty="0" smtClean="0"/>
+              <a:t>only and </a:t>
+            </a:r>
+            <a:r>
+              <a:rPr lang="en-US" dirty="0" err="1" smtClean="0"/>
+              <a:t>AcpS</a:t>
+            </a:r>
+            <a:r>
+              <a:rPr lang="en-US" dirty="0"/>
+              <a:t> </a:t>
+            </a:r>
+            <a:r>
+              <a:rPr lang="en-US" dirty="0" smtClean="0"/>
+              <a:t>only.</a:t>
+            </a:r>
+          </a:p>
+          <a:p>
+            <a:endParaRPr lang="en-US" dirty="0"/>
+          </a:p>
+          <a:p>
+            <a:r>
+              <a:rPr lang="en-US" dirty="0" smtClean="0"/>
+              <a:t>The previous normalization method performed the following calculation for these images:</a:t>
+            </a:r>
+          </a:p>
+          <a:p>
+            <a:endParaRPr lang="en-US" dirty="0"/>
+          </a:p>
+          <a:p>
+            <a:r>
+              <a:rPr lang="en-US" dirty="0" smtClean="0"/>
+              <a:t>Normalized Intensity = </a:t>
+            </a:r>
+          </a:p>
+          <a:p>
+            <a:r>
+              <a:rPr lang="en-US" dirty="0" smtClean="0"/>
+              <a:t>(Raw Intensity – MIN) / (MAX – MIN)</a:t>
+            </a:r>
+          </a:p>
+          <a:p>
+            <a:endParaRPr lang="en-US" dirty="0"/>
+          </a:p>
+          <a:p>
+            <a:r>
+              <a:rPr lang="en-US" dirty="0" smtClean="0"/>
+              <a:t>Where MIN &amp; MAX are the minimum and maximum intensities across all spots in both membranes.</a:t>
+            </a:r>
+          </a:p>
+          <a:p>
+            <a:endParaRPr lang="en-US" dirty="0"/>
+          </a:p>
+          <a:p>
+            <a:r>
+              <a:rPr lang="en-US" dirty="0" smtClean="0"/>
+              <a:t>MIN=</a:t>
+            </a:r>
+            <a:r>
+              <a:rPr lang="en-US" dirty="0"/>
+              <a:t>763.514</a:t>
+            </a:r>
+            <a:r>
+              <a:rPr lang="en-US" dirty="0"/>
+              <a:t> </a:t>
+            </a:r>
+            <a:endParaRPr lang="en-US" dirty="0" smtClean="0"/>
+          </a:p>
+          <a:p>
+            <a:r>
+              <a:rPr lang="en-US" dirty="0" smtClean="0"/>
+              <a:t>MAX=4183.726</a:t>
+            </a:r>
+            <a:endParaRPr lang="en-US" dirty="0"/>
+          </a:p>
+        </p:txBody>
+      </p:sp>
+      <p:sp>
+        <p:nvSpPr>
+          <p:cNvPr id="28" name="Title 1"/>
+          <p:cNvSpPr txBox="1">
+            <a:spLocks/>
+          </p:cNvSpPr>
+          <p:nvPr/>
+        </p:nvSpPr>
+        <p:spPr>
+          <a:xfrm>
+            <a:off x="93292" y="892130"/>
+            <a:ext cx="3765237" cy="924606"/>
+          </a:xfrm>
+          <a:prstGeom prst="rect">
+            <a:avLst/>
+          </a:prstGeom>
+        </p:spPr>
+        <p:txBody>
+          <a:bodyPr vert="horz" lIns="91440" tIns="45720" rIns="91440" bIns="45720" rtlCol="0" anchor="ctr">
+            <a:normAutofit fontScale="92500"/>
+          </a:bodyPr>
+          <a:lstStyle>
+            <a:lvl1pPr algn="ctr" defTabSz="457200" rtl="0" eaLnBrk="1" latinLnBrk="0" hangingPunct="1">
+              <a:spcBef>
+                <a:spcPct val="0"/>
+              </a:spcBef>
+              <a:buNone/>
+              <a:defRPr sz="4400" kern="1200">
+                <a:solidFill>
+                  <a:schemeClr val="tx1"/>
+                </a:solidFill>
+                <a:latin typeface="+mj-lt"/>
+                <a:ea typeface="+mj-ea"/>
+                <a:cs typeface="+mj-cs"/>
+              </a:defRPr>
+            </a:lvl1pPr>
+          </a:lstStyle>
+          <a:p>
+            <a:r>
+              <a:rPr lang="en-US" sz="3200" u="sng" dirty="0" smtClean="0">
+                <a:latin typeface="Arial"/>
+                <a:cs typeface="Arial"/>
+              </a:rPr>
+              <a:t>Before normalization</a:t>
+            </a:r>
+            <a:endParaRPr lang="en-US" sz="3200" u="sng" dirty="0">
+              <a:latin typeface="Arial"/>
+              <a:cs typeface="Arial"/>
+            </a:endParaRPr>
+          </a:p>
+        </p:txBody>
+      </p:sp>
+      <p:cxnSp>
+        <p:nvCxnSpPr>
+          <p:cNvPr id="29" name="Straight Arrow Connector 28"/>
+          <p:cNvCxnSpPr/>
+          <p:nvPr/>
+        </p:nvCxnSpPr>
+        <p:spPr>
+          <a:xfrm flipV="1">
+            <a:off x="1173042" y="3869389"/>
+            <a:ext cx="0" cy="170766"/>
+          </a:xfrm>
+          <a:prstGeom prst="straightConnector1">
+            <a:avLst/>
+          </a:prstGeom>
+          <a:ln>
+            <a:solidFill>
+              <a:srgbClr val="FF0000"/>
+            </a:solidFill>
+            <a:tailEnd type="arrow"/>
+          </a:ln>
+        </p:spPr>
+        <p:style>
+          <a:lnRef idx="2">
+            <a:schemeClr val="accent1"/>
+          </a:lnRef>
+          <a:fillRef idx="0">
+            <a:schemeClr val="accent1"/>
+          </a:fillRef>
+          <a:effectRef idx="1">
+            <a:schemeClr val="accent1"/>
+          </a:effectRef>
+          <a:fontRef idx="minor">
+            <a:schemeClr val="tx1"/>
+          </a:fontRef>
+        </p:style>
+      </p:cxnSp>
+      <p:cxnSp>
+        <p:nvCxnSpPr>
+          <p:cNvPr id="30" name="Straight Arrow Connector 29"/>
+          <p:cNvCxnSpPr/>
+          <p:nvPr/>
+        </p:nvCxnSpPr>
+        <p:spPr>
+          <a:xfrm flipV="1">
+            <a:off x="999106" y="6479458"/>
+            <a:ext cx="0" cy="170766"/>
+          </a:xfrm>
+          <a:prstGeom prst="straightConnector1">
+            <a:avLst/>
+          </a:prstGeom>
+          <a:ln>
+            <a:solidFill>
+              <a:srgbClr val="FF0000"/>
+            </a:solidFill>
+            <a:tailEnd type="arrow"/>
+          </a:ln>
+        </p:spPr>
+        <p:style>
+          <a:lnRef idx="2">
+            <a:schemeClr val="accent1"/>
+          </a:lnRef>
+          <a:fillRef idx="0">
+            <a:schemeClr val="accent1"/>
+          </a:fillRef>
+          <a:effectRef idx="1">
+            <a:schemeClr val="accent1"/>
+          </a:effectRef>
+          <a:fontRef idx="minor">
+            <a:schemeClr val="tx1"/>
+          </a:fontRef>
+        </p:style>
+      </p:cxnSp>
     </p:spTree>
     <p:extLst>
       <p:ext uri="{BB962C8B-B14F-4D97-AF65-F5344CB8AC3E}">
-        <p14:creationId xmlns:p14="http://schemas.microsoft.com/office/powerpoint/2010/main" val="2144814738"/>
+        <p14:creationId xmlns:p14="http://schemas.microsoft.com/office/powerpoint/2010/main" val="285508875"/>
       </p:ext>
     </p:extLst>
   </p:cSld>
@@ -3731,6 +4804,35 @@
           <a:chExt cx="0" cy="0"/>
         </a:xfrm>
       </p:grpSpPr>
+      <p:pic>
+        <p:nvPicPr>
+          <p:cNvPr id="19" name="Content Placeholder 11" descr="2014-05-28-plot-of-old-normalization.pdf"/>
+          <p:cNvPicPr>
+            <a:picLocks noChangeAspect="1"/>
+          </p:cNvPicPr>
+          <p:nvPr/>
+        </p:nvPicPr>
+        <p:blipFill rotWithShape="1">
+          <a:blip r:embed="rId2">
+            <a:extLst>
+              <a:ext uri="{28A0092B-C50C-407E-A947-70E740481C1C}">
+                <a14:useLocalDpi xmlns:a14="http://schemas.microsoft.com/office/drawing/2010/main" val="0"/>
+              </a:ext>
+            </a:extLst>
+          </a:blip>
+          <a:srcRect l="11378" t="28751" r="51326" b="26203"/>
+          <a:stretch/>
+        </p:blipFill>
+        <p:spPr>
+          <a:xfrm>
+            <a:off x="5291921" y="1989078"/>
+            <a:ext cx="3069316" cy="4797382"/>
+          </a:xfrm>
+          <a:prstGeom prst="rect">
+            <a:avLst/>
+          </a:prstGeom>
+        </p:spPr>
+      </p:pic>
       <p:sp>
         <p:nvSpPr>
           <p:cNvPr id="2" name="Title 1"/>
@@ -3743,286 +4845,960 @@
         </p:nvSpPr>
         <p:spPr>
           <a:xfrm>
-            <a:off x="457200" y="274638"/>
-            <a:ext cx="8229600" cy="45719"/>
+            <a:off x="0" y="0"/>
+            <a:ext cx="9144000" cy="1077006"/>
           </a:xfrm>
         </p:spPr>
         <p:txBody>
           <a:bodyPr>
-            <a:normAutofit fontScale="90000"/>
+            <a:normAutofit/>
           </a:bodyPr>
           <a:lstStyle/>
           <a:p>
+            <a:r>
+              <a:rPr lang="en-US" sz="2000" dirty="0" smtClean="0">
+                <a:latin typeface="Arial Black"/>
+                <a:cs typeface="Arial Black"/>
+              </a:rPr>
+              <a:t>Using the </a:t>
+            </a:r>
+            <a:r>
+              <a:rPr lang="en-US" sz="2000" dirty="0" smtClean="0">
+                <a:latin typeface="Arial Black"/>
+                <a:cs typeface="Arial Black"/>
+              </a:rPr>
+              <a:t>previous normalization method, </a:t>
+            </a:r>
+            <a:br>
+              <a:rPr lang="en-US" sz="2000" dirty="0" smtClean="0">
+                <a:latin typeface="Arial Black"/>
+                <a:cs typeface="Arial Black"/>
+              </a:rPr>
+            </a:br>
+            <a:r>
+              <a:rPr lang="en-US" sz="2000" dirty="0" smtClean="0">
+                <a:latin typeface="Arial Black"/>
+                <a:cs typeface="Arial Black"/>
+              </a:rPr>
+              <a:t>the </a:t>
+            </a:r>
+            <a:r>
+              <a:rPr lang="en-US" sz="2000" dirty="0" err="1" smtClean="0">
+                <a:latin typeface="Arial Black"/>
+                <a:cs typeface="Arial Black"/>
+              </a:rPr>
+              <a:t>Sfp</a:t>
+            </a:r>
+            <a:r>
+              <a:rPr lang="en-US" sz="2000" dirty="0" smtClean="0">
+                <a:latin typeface="Arial Black"/>
+                <a:cs typeface="Arial Black"/>
+              </a:rPr>
+              <a:t>-only background is still bigger (</a:t>
+            </a:r>
+            <a:r>
+              <a:rPr lang="en-US" sz="2000" dirty="0" smtClean="0">
+                <a:solidFill>
+                  <a:srgbClr val="FF0000"/>
+                </a:solidFill>
+                <a:latin typeface="Arial Black"/>
+                <a:cs typeface="Arial Black"/>
+              </a:rPr>
+              <a:t>0.21</a:t>
+            </a:r>
+            <a:r>
+              <a:rPr lang="en-US" sz="2000" dirty="0" smtClean="0">
+                <a:latin typeface="Arial Black"/>
+                <a:cs typeface="Arial Black"/>
+              </a:rPr>
+              <a:t>) </a:t>
+            </a:r>
+            <a:br>
+              <a:rPr lang="en-US" sz="2000" dirty="0" smtClean="0">
+                <a:latin typeface="Arial Black"/>
+                <a:cs typeface="Arial Black"/>
+              </a:rPr>
+            </a:br>
+            <a:r>
+              <a:rPr lang="en-US" sz="2000" dirty="0" smtClean="0">
+                <a:latin typeface="Arial Black"/>
+                <a:cs typeface="Arial Black"/>
+              </a:rPr>
+              <a:t>than the </a:t>
+            </a:r>
+            <a:r>
+              <a:rPr lang="en-US" sz="2000" dirty="0" err="1" smtClean="0">
+                <a:latin typeface="Arial Black"/>
+                <a:cs typeface="Arial Black"/>
+              </a:rPr>
+              <a:t>AcpS</a:t>
+            </a:r>
+            <a:r>
+              <a:rPr lang="en-US" sz="2000" dirty="0" smtClean="0">
+                <a:latin typeface="Arial Black"/>
+                <a:cs typeface="Arial Black"/>
+              </a:rPr>
+              <a:t>-only background (</a:t>
+            </a:r>
+            <a:r>
+              <a:rPr lang="en-US" sz="2000" dirty="0" smtClean="0">
+                <a:solidFill>
+                  <a:srgbClr val="FF0000"/>
+                </a:solidFill>
+                <a:latin typeface="Arial Black"/>
+                <a:cs typeface="Arial Black"/>
+              </a:rPr>
+              <a:t>0.13</a:t>
+            </a:r>
+            <a:r>
+              <a:rPr lang="en-US" sz="2000" dirty="0" smtClean="0">
+                <a:latin typeface="Arial Black"/>
+                <a:cs typeface="Arial Black"/>
+              </a:rPr>
+              <a:t>).</a:t>
+            </a:r>
+            <a:r>
+              <a:rPr lang="en-US" sz="2000" dirty="0" smtClean="0">
+                <a:latin typeface="Arial Black"/>
+                <a:cs typeface="Arial Black"/>
+              </a:rPr>
+              <a:t> </a:t>
+            </a:r>
+            <a:endParaRPr lang="en-US" sz="2000" dirty="0">
+              <a:latin typeface="Arial Black"/>
+              <a:cs typeface="Arial Black"/>
+            </a:endParaRPr>
+          </a:p>
+        </p:txBody>
+      </p:sp>
+      <p:pic>
+        <p:nvPicPr>
+          <p:cNvPr id="4" name="Content Placeholder 3" descr="raw_intensity.png"/>
+          <p:cNvPicPr>
+            <a:picLocks noGrp="1" noChangeAspect="1"/>
+          </p:cNvPicPr>
+          <p:nvPr>
+            <p:ph idx="1"/>
+          </p:nvPr>
+        </p:nvPicPr>
+        <p:blipFill rotWithShape="1">
+          <a:blip r:embed="rId3">
+            <a:extLst>
+              <a:ext uri="{28A0092B-C50C-407E-A947-70E740481C1C}">
+                <a14:useLocalDpi xmlns:a14="http://schemas.microsoft.com/office/drawing/2010/main" val="0"/>
+              </a:ext>
+            </a:extLst>
+          </a:blip>
+          <a:srcRect l="9959" r="50684"/>
+          <a:stretch/>
+        </p:blipFill>
+        <p:spPr>
+          <a:xfrm>
+            <a:off x="33840" y="1465042"/>
+            <a:ext cx="3979195" cy="5587116"/>
+          </a:xfrm>
+        </p:spPr>
+      </p:pic>
+      <p:sp>
+        <p:nvSpPr>
+          <p:cNvPr id="3" name="TextBox 2"/>
+          <p:cNvSpPr txBox="1"/>
+          <p:nvPr/>
+        </p:nvSpPr>
+        <p:spPr>
+          <a:xfrm>
+            <a:off x="343971" y="1509137"/>
+            <a:ext cx="3249958" cy="369332"/>
+          </a:xfrm>
+          <a:prstGeom prst="rect">
+            <a:avLst/>
+          </a:prstGeom>
+          <a:solidFill>
+            <a:schemeClr val="bg1"/>
+          </a:solidFill>
+        </p:spPr>
+        <p:txBody>
+          <a:bodyPr wrap="none" rtlCol="0" anchor="b">
+            <a:spAutoFit/>
+          </a:bodyPr>
+          <a:lstStyle/>
+          <a:p>
+            <a:r>
+              <a:rPr lang="en-US" dirty="0" smtClean="0"/>
+              <a:t>Membrane treated with </a:t>
+            </a:r>
+            <a:r>
+              <a:rPr lang="en-US" dirty="0" err="1" smtClean="0"/>
+              <a:t>Sfp</a:t>
+            </a:r>
+            <a:r>
+              <a:rPr lang="en-US" dirty="0" smtClean="0"/>
+              <a:t> only</a:t>
+            </a:r>
             <a:endParaRPr lang="en-US" dirty="0"/>
           </a:p>
         </p:txBody>
       </p:sp>
       <p:sp>
         <p:nvSpPr>
-          <p:cNvPr id="3" name="Content Placeholder 2"/>
-          <p:cNvSpPr>
-            <a:spLocks noGrp="1"/>
-          </p:cNvSpPr>
-          <p:nvPr>
-            <p:ph idx="1"/>
-          </p:nvPr>
-        </p:nvSpPr>
-        <p:spPr>
-          <a:xfrm>
-            <a:off x="457200" y="320358"/>
-            <a:ext cx="8229600" cy="5805806"/>
-          </a:xfrm>
-        </p:spPr>
-        <p:txBody>
-          <a:bodyPr>
-            <a:noAutofit/>
+          <p:cNvPr id="6" name="TextBox 5"/>
+          <p:cNvSpPr txBox="1"/>
+          <p:nvPr/>
+        </p:nvSpPr>
+        <p:spPr>
+          <a:xfrm>
+            <a:off x="2389636" y="3824711"/>
+            <a:ext cx="1415973" cy="215444"/>
+          </a:xfrm>
+          <a:prstGeom prst="rect">
+            <a:avLst/>
+          </a:prstGeom>
+          <a:noFill/>
+        </p:spPr>
+        <p:txBody>
+          <a:bodyPr wrap="none" rtlCol="0">
+            <a:spAutoFit/>
           </a:bodyPr>
           <a:lstStyle/>
           <a:p>
-            <a:pPr marL="0" indent="0">
-              <a:buNone/>
-            </a:pPr>
-            <a:r>
-              <a:rPr lang="en-US" sz="1800" dirty="0" smtClean="0"/>
-              <a:t>After fitting, we get mean and standard deviation of normal distribution in each plot:</a:t>
-            </a:r>
-          </a:p>
-          <a:p>
-            <a:r>
-              <a:rPr lang="en-US" sz="1800" dirty="0" err="1" smtClean="0"/>
+            <a:r>
+              <a:rPr lang="en-US" sz="800" dirty="0" smtClean="0">
+                <a:latin typeface="Andale Mono"/>
+                <a:cs typeface="Andale Mono"/>
+              </a:rPr>
+              <a:t>Integrated Intensity</a:t>
+            </a:r>
+            <a:endParaRPr lang="en-US" sz="800" dirty="0">
+              <a:latin typeface="Andale Mono"/>
+              <a:cs typeface="Andale Mono"/>
+            </a:endParaRPr>
+          </a:p>
+        </p:txBody>
+      </p:sp>
+      <p:sp>
+        <p:nvSpPr>
+          <p:cNvPr id="9" name="TextBox 8"/>
+          <p:cNvSpPr txBox="1"/>
+          <p:nvPr/>
+        </p:nvSpPr>
+        <p:spPr>
+          <a:xfrm>
+            <a:off x="317512" y="4148541"/>
+            <a:ext cx="3410684" cy="369332"/>
+          </a:xfrm>
+          <a:prstGeom prst="rect">
+            <a:avLst/>
+          </a:prstGeom>
+          <a:solidFill>
+            <a:schemeClr val="bg1"/>
+          </a:solidFill>
+        </p:spPr>
+        <p:txBody>
+          <a:bodyPr wrap="none" rtlCol="0" anchor="b">
+            <a:spAutoFit/>
+          </a:bodyPr>
+          <a:lstStyle/>
+          <a:p>
+            <a:r>
+              <a:rPr lang="en-US" dirty="0" smtClean="0"/>
+              <a:t>Membrane treated with </a:t>
+            </a:r>
+            <a:r>
+              <a:rPr lang="en-US" dirty="0" err="1" smtClean="0"/>
+              <a:t>AcpS</a:t>
+            </a:r>
+            <a:r>
+              <a:rPr lang="en-US" dirty="0" smtClean="0"/>
+              <a:t> only</a:t>
+            </a:r>
+            <a:endParaRPr lang="en-US" dirty="0"/>
+          </a:p>
+        </p:txBody>
+      </p:sp>
+      <p:sp>
+        <p:nvSpPr>
+          <p:cNvPr id="10" name="TextBox 9"/>
+          <p:cNvSpPr txBox="1"/>
+          <p:nvPr/>
+        </p:nvSpPr>
+        <p:spPr>
+          <a:xfrm>
+            <a:off x="2470983" y="6569302"/>
+            <a:ext cx="1415973" cy="215444"/>
+          </a:xfrm>
+          <a:prstGeom prst="rect">
+            <a:avLst/>
+          </a:prstGeom>
+          <a:noFill/>
+        </p:spPr>
+        <p:txBody>
+          <a:bodyPr wrap="none" rtlCol="0">
+            <a:spAutoFit/>
+          </a:bodyPr>
+          <a:lstStyle/>
+          <a:p>
+            <a:r>
+              <a:rPr lang="en-US" sz="800" dirty="0" smtClean="0">
+                <a:latin typeface="Andale Mono"/>
+                <a:cs typeface="Andale Mono"/>
+              </a:rPr>
+              <a:t>Integrated Intensity</a:t>
+            </a:r>
+            <a:endParaRPr lang="en-US" sz="800" dirty="0">
+              <a:latin typeface="Andale Mono"/>
+              <a:cs typeface="Andale Mono"/>
+            </a:endParaRPr>
+          </a:p>
+        </p:txBody>
+      </p:sp>
+      <p:sp>
+        <p:nvSpPr>
+          <p:cNvPr id="28" name="Title 1"/>
+          <p:cNvSpPr txBox="1">
+            <a:spLocks/>
+          </p:cNvSpPr>
+          <p:nvPr/>
+        </p:nvSpPr>
+        <p:spPr>
+          <a:xfrm>
+            <a:off x="93292" y="892130"/>
+            <a:ext cx="3765237" cy="924606"/>
+          </a:xfrm>
+          <a:prstGeom prst="rect">
+            <a:avLst/>
+          </a:prstGeom>
+        </p:spPr>
+        <p:txBody>
+          <a:bodyPr vert="horz" lIns="91440" tIns="45720" rIns="91440" bIns="45720" rtlCol="0" anchor="ctr">
+            <a:normAutofit fontScale="92500"/>
+          </a:bodyPr>
+          <a:lstStyle>
+            <a:lvl1pPr algn="ctr" defTabSz="457200" rtl="0" eaLnBrk="1" latinLnBrk="0" hangingPunct="1">
+              <a:spcBef>
+                <a:spcPct val="0"/>
+              </a:spcBef>
+              <a:buNone/>
+              <a:defRPr sz="4400" kern="1200">
+                <a:solidFill>
+                  <a:schemeClr val="tx1"/>
+                </a:solidFill>
+                <a:latin typeface="+mj-lt"/>
+                <a:ea typeface="+mj-ea"/>
+                <a:cs typeface="+mj-cs"/>
+              </a:defRPr>
+            </a:lvl1pPr>
+          </a:lstStyle>
+          <a:p>
+            <a:r>
+              <a:rPr lang="en-US" sz="3200" u="sng" dirty="0" smtClean="0">
+                <a:solidFill>
+                  <a:srgbClr val="000000"/>
+                </a:solidFill>
+                <a:latin typeface="Arial"/>
+                <a:cs typeface="Arial"/>
+              </a:rPr>
+              <a:t>Before normalization</a:t>
+            </a:r>
+            <a:endParaRPr lang="en-US" sz="3200" u="sng" dirty="0">
+              <a:solidFill>
+                <a:srgbClr val="000000"/>
+              </a:solidFill>
+              <a:latin typeface="Arial"/>
+              <a:cs typeface="Arial"/>
+            </a:endParaRPr>
+          </a:p>
+        </p:txBody>
+      </p:sp>
+      <p:cxnSp>
+        <p:nvCxnSpPr>
+          <p:cNvPr id="29" name="Straight Arrow Connector 28"/>
+          <p:cNvCxnSpPr/>
+          <p:nvPr/>
+        </p:nvCxnSpPr>
+        <p:spPr>
+          <a:xfrm flipV="1">
+            <a:off x="1173042" y="3869389"/>
+            <a:ext cx="0" cy="170766"/>
+          </a:xfrm>
+          <a:prstGeom prst="straightConnector1">
+            <a:avLst/>
+          </a:prstGeom>
+          <a:ln>
+            <a:solidFill>
+              <a:srgbClr val="FF0000"/>
+            </a:solidFill>
+            <a:tailEnd type="arrow"/>
+          </a:ln>
+        </p:spPr>
+        <p:style>
+          <a:lnRef idx="2">
+            <a:schemeClr val="accent1"/>
+          </a:lnRef>
+          <a:fillRef idx="0">
+            <a:schemeClr val="accent1"/>
+          </a:fillRef>
+          <a:effectRef idx="1">
+            <a:schemeClr val="accent1"/>
+          </a:effectRef>
+          <a:fontRef idx="minor">
+            <a:schemeClr val="tx1"/>
+          </a:fontRef>
+        </p:style>
+      </p:cxnSp>
+      <p:cxnSp>
+        <p:nvCxnSpPr>
+          <p:cNvPr id="30" name="Straight Arrow Connector 29"/>
+          <p:cNvCxnSpPr/>
+          <p:nvPr/>
+        </p:nvCxnSpPr>
+        <p:spPr>
+          <a:xfrm flipV="1">
+            <a:off x="999106" y="6479458"/>
+            <a:ext cx="0" cy="170766"/>
+          </a:xfrm>
+          <a:prstGeom prst="straightConnector1">
+            <a:avLst/>
+          </a:prstGeom>
+          <a:ln>
+            <a:solidFill>
+              <a:srgbClr val="FF0000"/>
+            </a:solidFill>
+            <a:tailEnd type="arrow"/>
+          </a:ln>
+        </p:spPr>
+        <p:style>
+          <a:lnRef idx="2">
+            <a:schemeClr val="accent1"/>
+          </a:lnRef>
+          <a:fillRef idx="0">
+            <a:schemeClr val="accent1"/>
+          </a:fillRef>
+          <a:effectRef idx="1">
+            <a:schemeClr val="accent1"/>
+          </a:effectRef>
+          <a:fontRef idx="minor">
+            <a:schemeClr val="tx1"/>
+          </a:fontRef>
+        </p:style>
+      </p:cxnSp>
+      <p:sp>
+        <p:nvSpPr>
+          <p:cNvPr id="12" name="TextBox 11"/>
+          <p:cNvSpPr txBox="1"/>
+          <p:nvPr/>
+        </p:nvSpPr>
+        <p:spPr>
+          <a:xfrm>
+            <a:off x="5433036" y="1549194"/>
+            <a:ext cx="3249958" cy="369332"/>
+          </a:xfrm>
+          <a:prstGeom prst="rect">
+            <a:avLst/>
+          </a:prstGeom>
+          <a:solidFill>
+            <a:schemeClr val="bg1"/>
+          </a:solidFill>
+        </p:spPr>
+        <p:txBody>
+          <a:bodyPr wrap="none" rtlCol="0" anchor="b">
+            <a:spAutoFit/>
+          </a:bodyPr>
+          <a:lstStyle/>
+          <a:p>
+            <a:r>
+              <a:rPr lang="en-US" dirty="0" smtClean="0"/>
+              <a:t>Membrane treated with </a:t>
+            </a:r>
+            <a:r>
+              <a:rPr lang="en-US" dirty="0" err="1" smtClean="0"/>
               <a:t>Sfp</a:t>
             </a:r>
             <a:r>
-              <a:rPr lang="en-US" sz="1800" dirty="0" smtClean="0"/>
-              <a:t>-labeling</a:t>
-            </a:r>
-          </a:p>
-          <a:p>
-            <a:pPr marL="0" indent="0">
-              <a:buNone/>
-            </a:pPr>
-            <a:r>
-              <a:rPr lang="en-US" sz="1800" dirty="0"/>
-              <a:t>	</a:t>
-            </a:r>
-            <a:r>
-              <a:rPr lang="en-US" sz="1800" dirty="0" smtClean="0"/>
-              <a:t>mean = 1455.19</a:t>
-            </a:r>
-          </a:p>
-          <a:p>
-            <a:pPr marL="0" indent="0">
-              <a:buNone/>
-            </a:pPr>
-            <a:r>
-              <a:rPr lang="en-US" sz="1800" dirty="0"/>
-              <a:t>	</a:t>
-            </a:r>
-            <a:r>
-              <a:rPr lang="en-US" sz="1800" dirty="0" err="1" smtClean="0"/>
-              <a:t>std</a:t>
-            </a:r>
-            <a:r>
-              <a:rPr lang="en-US" sz="1800" dirty="0" smtClean="0"/>
-              <a:t> (standard deviation) = 172.88</a:t>
-            </a:r>
-          </a:p>
-          <a:p>
-            <a:r>
-              <a:rPr lang="en-US" sz="1800" dirty="0" err="1" smtClean="0"/>
-              <a:t>Sfp-PfAcpH</a:t>
-            </a:r>
-            <a:endParaRPr lang="en-US" sz="1800" dirty="0" smtClean="0"/>
-          </a:p>
-          <a:p>
-            <a:pPr marL="0" indent="0">
-              <a:buNone/>
-            </a:pPr>
-            <a:r>
-              <a:rPr lang="en-US" sz="1800" dirty="0"/>
-              <a:t>	</a:t>
-            </a:r>
-            <a:r>
-              <a:rPr lang="en-US" sz="1800" dirty="0" smtClean="0"/>
-              <a:t>mean = 1109.3</a:t>
-            </a:r>
-          </a:p>
-          <a:p>
-            <a:pPr marL="0" indent="0">
-              <a:buNone/>
-            </a:pPr>
-            <a:r>
-              <a:rPr lang="en-US" sz="1800" dirty="0"/>
-              <a:t>	</a:t>
-            </a:r>
-            <a:r>
-              <a:rPr lang="en-US" sz="1800" dirty="0" err="1" smtClean="0"/>
-              <a:t>std</a:t>
-            </a:r>
-            <a:r>
-              <a:rPr lang="en-US" sz="1800" dirty="0" smtClean="0"/>
-              <a:t> = 85.52</a:t>
-            </a:r>
-          </a:p>
-          <a:p>
-            <a:r>
-              <a:rPr lang="en-US" sz="1800" dirty="0" err="1" smtClean="0"/>
+              <a:rPr lang="en-US" dirty="0" smtClean="0"/>
+              <a:t> only</a:t>
+            </a:r>
+            <a:endParaRPr lang="en-US" dirty="0"/>
+          </a:p>
+        </p:txBody>
+      </p:sp>
+      <p:sp>
+        <p:nvSpPr>
+          <p:cNvPr id="13" name="TextBox 12"/>
+          <p:cNvSpPr txBox="1"/>
+          <p:nvPr/>
+        </p:nvSpPr>
+        <p:spPr>
+          <a:xfrm>
+            <a:off x="7478701" y="3935320"/>
+            <a:ext cx="1415973" cy="215444"/>
+          </a:xfrm>
+          <a:prstGeom prst="rect">
+            <a:avLst/>
+          </a:prstGeom>
+          <a:noFill/>
+        </p:spPr>
+        <p:txBody>
+          <a:bodyPr wrap="none" rtlCol="0">
+            <a:spAutoFit/>
+          </a:bodyPr>
+          <a:lstStyle/>
+          <a:p>
+            <a:r>
+              <a:rPr lang="en-US" sz="800" dirty="0" smtClean="0">
+                <a:latin typeface="Andale Mono"/>
+                <a:cs typeface="Andale Mono"/>
+              </a:rPr>
+              <a:t>Integrated Intensity</a:t>
+            </a:r>
+            <a:endParaRPr lang="en-US" sz="800" dirty="0">
+              <a:latin typeface="Andale Mono"/>
+              <a:cs typeface="Andale Mono"/>
+            </a:endParaRPr>
+          </a:p>
+        </p:txBody>
+      </p:sp>
+      <p:sp>
+        <p:nvSpPr>
+          <p:cNvPr id="15" name="TextBox 14"/>
+          <p:cNvSpPr txBox="1"/>
+          <p:nvPr/>
+        </p:nvSpPr>
+        <p:spPr>
+          <a:xfrm>
+            <a:off x="7560048" y="6679911"/>
+            <a:ext cx="1415973" cy="215444"/>
+          </a:xfrm>
+          <a:prstGeom prst="rect">
+            <a:avLst/>
+          </a:prstGeom>
+          <a:noFill/>
+        </p:spPr>
+        <p:txBody>
+          <a:bodyPr wrap="none" rtlCol="0">
+            <a:spAutoFit/>
+          </a:bodyPr>
+          <a:lstStyle/>
+          <a:p>
+            <a:r>
+              <a:rPr lang="en-US" sz="800" dirty="0" smtClean="0">
+                <a:latin typeface="Andale Mono"/>
+                <a:cs typeface="Andale Mono"/>
+              </a:rPr>
+              <a:t>Integrated Intensity</a:t>
+            </a:r>
+            <a:endParaRPr lang="en-US" sz="800" dirty="0">
+              <a:latin typeface="Andale Mono"/>
+              <a:cs typeface="Andale Mono"/>
+            </a:endParaRPr>
+          </a:p>
+        </p:txBody>
+      </p:sp>
+      <p:sp>
+        <p:nvSpPr>
+          <p:cNvPr id="16" name="Title 1"/>
+          <p:cNvSpPr txBox="1">
+            <a:spLocks/>
+          </p:cNvSpPr>
+          <p:nvPr/>
+        </p:nvSpPr>
+        <p:spPr>
+          <a:xfrm>
+            <a:off x="5182357" y="896911"/>
+            <a:ext cx="3765237" cy="924606"/>
+          </a:xfrm>
+          <a:prstGeom prst="rect">
+            <a:avLst/>
+          </a:prstGeom>
+        </p:spPr>
+        <p:txBody>
+          <a:bodyPr vert="horz" lIns="91440" tIns="45720" rIns="91440" bIns="45720" rtlCol="0" anchor="ctr">
+            <a:normAutofit/>
+          </a:bodyPr>
+          <a:lstStyle>
+            <a:lvl1pPr algn="ctr" defTabSz="457200" rtl="0" eaLnBrk="1" latinLnBrk="0" hangingPunct="1">
+              <a:spcBef>
+                <a:spcPct val="0"/>
+              </a:spcBef>
+              <a:buNone/>
+              <a:defRPr sz="4400" kern="1200">
+                <a:solidFill>
+                  <a:schemeClr val="tx1"/>
+                </a:solidFill>
+                <a:latin typeface="+mj-lt"/>
+                <a:ea typeface="+mj-ea"/>
+                <a:cs typeface="+mj-cs"/>
+              </a:defRPr>
+            </a:lvl1pPr>
+          </a:lstStyle>
+          <a:p>
+            <a:r>
+              <a:rPr lang="en-US" sz="3200" u="sng" dirty="0" smtClean="0">
+                <a:solidFill>
+                  <a:srgbClr val="000000"/>
+                </a:solidFill>
+                <a:latin typeface="Arial"/>
+                <a:cs typeface="Arial"/>
+              </a:rPr>
+              <a:t>After normalization</a:t>
+            </a:r>
+            <a:endParaRPr lang="en-US" sz="3200" u="sng" dirty="0">
+              <a:solidFill>
+                <a:srgbClr val="000000"/>
+              </a:solidFill>
+              <a:latin typeface="Arial"/>
+              <a:cs typeface="Arial"/>
+            </a:endParaRPr>
+          </a:p>
+        </p:txBody>
+      </p:sp>
+      <p:cxnSp>
+        <p:nvCxnSpPr>
+          <p:cNvPr id="17" name="Straight Arrow Connector 16"/>
+          <p:cNvCxnSpPr/>
+          <p:nvPr/>
+        </p:nvCxnSpPr>
+        <p:spPr>
+          <a:xfrm flipV="1">
+            <a:off x="6173907" y="3944722"/>
+            <a:ext cx="0" cy="170766"/>
+          </a:xfrm>
+          <a:prstGeom prst="straightConnector1">
+            <a:avLst/>
+          </a:prstGeom>
+          <a:ln>
+            <a:solidFill>
+              <a:srgbClr val="FF0000"/>
+            </a:solidFill>
+            <a:tailEnd type="arrow"/>
+          </a:ln>
+        </p:spPr>
+        <p:style>
+          <a:lnRef idx="2">
+            <a:schemeClr val="accent1"/>
+          </a:lnRef>
+          <a:fillRef idx="0">
+            <a:schemeClr val="accent1"/>
+          </a:fillRef>
+          <a:effectRef idx="1">
+            <a:schemeClr val="accent1"/>
+          </a:effectRef>
+          <a:fontRef idx="minor">
+            <a:schemeClr val="tx1"/>
+          </a:fontRef>
+        </p:style>
+      </p:cxnSp>
+      <p:cxnSp>
+        <p:nvCxnSpPr>
+          <p:cNvPr id="18" name="Straight Arrow Connector 17"/>
+          <p:cNvCxnSpPr/>
+          <p:nvPr/>
+        </p:nvCxnSpPr>
+        <p:spPr>
+          <a:xfrm flipV="1">
+            <a:off x="5929411" y="6520696"/>
+            <a:ext cx="0" cy="170766"/>
+          </a:xfrm>
+          <a:prstGeom prst="straightConnector1">
+            <a:avLst/>
+          </a:prstGeom>
+          <a:ln>
+            <a:solidFill>
+              <a:srgbClr val="FF0000"/>
+            </a:solidFill>
+            <a:tailEnd type="arrow"/>
+          </a:ln>
+        </p:spPr>
+        <p:style>
+          <a:lnRef idx="2">
+            <a:schemeClr val="accent1"/>
+          </a:lnRef>
+          <a:fillRef idx="0">
+            <a:schemeClr val="accent1"/>
+          </a:fillRef>
+          <a:effectRef idx="1">
+            <a:schemeClr val="accent1"/>
+          </a:effectRef>
+          <a:fontRef idx="minor">
+            <a:schemeClr val="tx1"/>
+          </a:fontRef>
+        </p:style>
+      </p:cxnSp>
+      <p:sp>
+        <p:nvSpPr>
+          <p:cNvPr id="14" name="TextBox 13"/>
+          <p:cNvSpPr txBox="1"/>
+          <p:nvPr/>
+        </p:nvSpPr>
+        <p:spPr>
+          <a:xfrm>
+            <a:off x="5406577" y="4126865"/>
+            <a:ext cx="3410684" cy="369332"/>
+          </a:xfrm>
+          <a:prstGeom prst="rect">
+            <a:avLst/>
+          </a:prstGeom>
+          <a:solidFill>
+            <a:schemeClr val="bg1"/>
+          </a:solidFill>
+        </p:spPr>
+        <p:txBody>
+          <a:bodyPr wrap="none" rtlCol="0" anchor="b">
+            <a:spAutoFit/>
+          </a:bodyPr>
+          <a:lstStyle/>
+          <a:p>
+            <a:r>
+              <a:rPr lang="en-US" dirty="0" smtClean="0"/>
+              <a:t>Membrane treated with </a:t>
+            </a:r>
+            <a:r>
+              <a:rPr lang="en-US" dirty="0" err="1" smtClean="0"/>
               <a:t>AcpS</a:t>
             </a:r>
             <a:r>
-              <a:rPr lang="en-US" sz="1800" dirty="0" smtClean="0"/>
-              <a:t>-labeling</a:t>
-            </a:r>
-          </a:p>
-          <a:p>
-            <a:pPr marL="0" indent="0">
-              <a:buNone/>
-            </a:pPr>
-            <a:r>
-              <a:rPr lang="en-US" sz="1800" dirty="0"/>
-              <a:t>	</a:t>
-            </a:r>
-            <a:r>
-              <a:rPr lang="en-US" sz="1800" dirty="0" smtClean="0"/>
-              <a:t>mean = 1166.76</a:t>
-            </a:r>
-          </a:p>
-          <a:p>
-            <a:pPr marL="0" indent="0">
-              <a:buNone/>
-            </a:pPr>
-            <a:r>
-              <a:rPr lang="en-US" sz="1800" dirty="0"/>
-              <a:t>	</a:t>
-            </a:r>
-            <a:r>
-              <a:rPr lang="en-US" sz="1800" dirty="0" err="1" smtClean="0"/>
-              <a:t>std</a:t>
-            </a:r>
-            <a:r>
-              <a:rPr lang="en-US" sz="1800" dirty="0" smtClean="0"/>
-              <a:t> = 121.49</a:t>
-            </a:r>
-          </a:p>
-          <a:p>
-            <a:r>
-              <a:rPr lang="en-US" sz="1800" dirty="0" err="1" smtClean="0"/>
-              <a:t>AcpS-PfAcpH</a:t>
-            </a:r>
-            <a:endParaRPr lang="en-US" sz="1800" dirty="0" smtClean="0"/>
-          </a:p>
-          <a:p>
-            <a:pPr marL="457200" lvl="1" indent="0">
-              <a:buNone/>
-            </a:pPr>
-            <a:r>
-              <a:rPr lang="en-US" sz="1600" dirty="0" smtClean="0"/>
-              <a:t>Mean = 1185.07</a:t>
-            </a:r>
-          </a:p>
-          <a:p>
-            <a:pPr marL="457200" lvl="1" indent="0">
-              <a:buNone/>
-            </a:pPr>
-            <a:r>
-              <a:rPr lang="en-US" sz="1600" dirty="0" err="1" smtClean="0"/>
-              <a:t>std</a:t>
-            </a:r>
-            <a:r>
-              <a:rPr lang="en-US" sz="1600" dirty="0" smtClean="0"/>
-              <a:t> = 122.27</a:t>
-            </a:r>
-          </a:p>
-          <a:p>
-            <a:pPr marL="457200" lvl="1" indent="0">
-              <a:buNone/>
-            </a:pPr>
-            <a:endParaRPr lang="en-US" sz="1600" dirty="0"/>
-          </a:p>
-          <a:p>
-            <a:pPr marL="457200" lvl="1" indent="0">
-              <a:buNone/>
-            </a:pPr>
-            <a:r>
-              <a:rPr lang="en-US" sz="1600" dirty="0" smtClean="0"/>
-              <a:t>Then we normalize light intensity by </a:t>
-            </a:r>
-            <a:r>
-              <a:rPr lang="en-US" sz="1600" dirty="0" err="1"/>
-              <a:t>Y</a:t>
-            </a:r>
-            <a:r>
-              <a:rPr lang="en-US" sz="1000" dirty="0" err="1" smtClean="0"/>
-              <a:t>norm</a:t>
-            </a:r>
-            <a:r>
-              <a:rPr lang="en-US" sz="1600" dirty="0" smtClean="0"/>
-              <a:t> = (</a:t>
-            </a:r>
-            <a:r>
-              <a:rPr lang="en-US" sz="1600" dirty="0" err="1"/>
-              <a:t>Y</a:t>
-            </a:r>
-            <a:r>
-              <a:rPr lang="en-US" sz="1100" dirty="0" err="1" smtClean="0"/>
-              <a:t>r</a:t>
-            </a:r>
-            <a:r>
-              <a:rPr lang="en-US" sz="1050" dirty="0" err="1" smtClean="0"/>
-              <a:t>aw</a:t>
-            </a:r>
-            <a:r>
-              <a:rPr lang="en-US" sz="1600" dirty="0" smtClean="0"/>
-              <a:t> – mean) / </a:t>
-            </a:r>
-            <a:r>
-              <a:rPr lang="en-US" sz="1600" dirty="0" err="1" smtClean="0"/>
-              <a:t>std</a:t>
-            </a:r>
-            <a:r>
-              <a:rPr lang="en-US" sz="1600" dirty="0" smtClean="0"/>
-              <a:t>  for </a:t>
-            </a:r>
-            <a:r>
-              <a:rPr lang="en-US" sz="1600" dirty="0" err="1" smtClean="0"/>
-              <a:t>Sfp</a:t>
-            </a:r>
-            <a:r>
-              <a:rPr lang="en-US" sz="1600" dirty="0" smtClean="0"/>
-              <a:t>-labeling, </a:t>
-            </a:r>
-            <a:r>
-              <a:rPr lang="en-US" sz="1600" dirty="0" err="1" smtClean="0"/>
-              <a:t>Sfp-PfAcpH</a:t>
-            </a:r>
-            <a:r>
-              <a:rPr lang="en-US" sz="1600" dirty="0" smtClean="0"/>
-              <a:t>, </a:t>
-            </a:r>
-            <a:r>
-              <a:rPr lang="en-US" sz="1600" dirty="0" err="1" smtClean="0"/>
-              <a:t>AcpS</a:t>
-            </a:r>
-            <a:r>
-              <a:rPr lang="en-US" sz="1600" dirty="0" smtClean="0"/>
-              <a:t>-labeling and </a:t>
-            </a:r>
-            <a:r>
-              <a:rPr lang="en-US" sz="1600" dirty="0" err="1" smtClean="0"/>
-              <a:t>AcpS-PfAcpH</a:t>
-            </a:r>
-            <a:r>
-              <a:rPr lang="en-US" sz="1600" dirty="0" smtClean="0"/>
-              <a:t>.</a:t>
-            </a:r>
-            <a:endParaRPr lang="en-US" sz="1600" dirty="0"/>
+              <a:rPr lang="en-US" dirty="0" smtClean="0"/>
+              <a:t> only</a:t>
+            </a:r>
+            <a:endParaRPr lang="en-US" dirty="0"/>
+          </a:p>
+        </p:txBody>
+      </p:sp>
+      <p:sp>
+        <p:nvSpPr>
+          <p:cNvPr id="20" name="Title 1"/>
+          <p:cNvSpPr txBox="1">
+            <a:spLocks/>
+          </p:cNvSpPr>
+          <p:nvPr/>
+        </p:nvSpPr>
+        <p:spPr>
+          <a:xfrm>
+            <a:off x="267228" y="4032047"/>
+            <a:ext cx="2384502" cy="280811"/>
+          </a:xfrm>
+          <a:prstGeom prst="rect">
+            <a:avLst/>
+          </a:prstGeom>
+        </p:spPr>
+        <p:txBody>
+          <a:bodyPr vert="horz" lIns="91440" tIns="45720" rIns="91440" bIns="45720" rtlCol="0" anchor="ctr">
+            <a:normAutofit/>
+          </a:bodyPr>
+          <a:lstStyle>
+            <a:lvl1pPr algn="ctr" defTabSz="457200" rtl="0" eaLnBrk="1" latinLnBrk="0" hangingPunct="1">
+              <a:spcBef>
+                <a:spcPct val="0"/>
+              </a:spcBef>
+              <a:buNone/>
+              <a:defRPr sz="4400" kern="1200">
+                <a:solidFill>
+                  <a:schemeClr val="tx1"/>
+                </a:solidFill>
+                <a:latin typeface="+mj-lt"/>
+                <a:ea typeface="+mj-ea"/>
+                <a:cs typeface="+mj-cs"/>
+              </a:defRPr>
+            </a:lvl1pPr>
+          </a:lstStyle>
+          <a:p>
+            <a:r>
+              <a:rPr lang="en-US" sz="1200" dirty="0" smtClean="0">
+                <a:solidFill>
+                  <a:srgbClr val="FF0000"/>
+                </a:solidFill>
+                <a:latin typeface="Arial Black"/>
+                <a:cs typeface="Arial Black"/>
+              </a:rPr>
+              <a:t>Centered near 1500 </a:t>
+            </a:r>
+            <a:endParaRPr lang="en-US" sz="1200" dirty="0">
+              <a:solidFill>
+                <a:srgbClr val="FF0000"/>
+              </a:solidFill>
+              <a:latin typeface="Arial Black"/>
+              <a:cs typeface="Arial Black"/>
+            </a:endParaRPr>
+          </a:p>
+        </p:txBody>
+      </p:sp>
+      <p:sp>
+        <p:nvSpPr>
+          <p:cNvPr id="21" name="Title 1"/>
+          <p:cNvSpPr txBox="1">
+            <a:spLocks/>
+          </p:cNvSpPr>
+          <p:nvPr/>
+        </p:nvSpPr>
+        <p:spPr>
+          <a:xfrm>
+            <a:off x="93292" y="6576564"/>
+            <a:ext cx="2384502" cy="280811"/>
+          </a:xfrm>
+          <a:prstGeom prst="rect">
+            <a:avLst/>
+          </a:prstGeom>
+        </p:spPr>
+        <p:txBody>
+          <a:bodyPr vert="horz" lIns="91440" tIns="45720" rIns="91440" bIns="45720" rtlCol="0" anchor="ctr">
+            <a:normAutofit/>
+          </a:bodyPr>
+          <a:lstStyle>
+            <a:lvl1pPr algn="ctr" defTabSz="457200" rtl="0" eaLnBrk="1" latinLnBrk="0" hangingPunct="1">
+              <a:spcBef>
+                <a:spcPct val="0"/>
+              </a:spcBef>
+              <a:buNone/>
+              <a:defRPr sz="4400" kern="1200">
+                <a:solidFill>
+                  <a:schemeClr val="tx1"/>
+                </a:solidFill>
+                <a:latin typeface="+mj-lt"/>
+                <a:ea typeface="+mj-ea"/>
+                <a:cs typeface="+mj-cs"/>
+              </a:defRPr>
+            </a:lvl1pPr>
+          </a:lstStyle>
+          <a:p>
+            <a:r>
+              <a:rPr lang="en-US" sz="1200" dirty="0" smtClean="0">
+                <a:solidFill>
+                  <a:srgbClr val="FF0000"/>
+                </a:solidFill>
+                <a:latin typeface="Arial Black"/>
+                <a:cs typeface="Arial Black"/>
+              </a:rPr>
+              <a:t>Centered near 1200 </a:t>
+            </a:r>
+            <a:endParaRPr lang="en-US" sz="1200" dirty="0">
+              <a:solidFill>
+                <a:srgbClr val="FF0000"/>
+              </a:solidFill>
+              <a:latin typeface="Arial Black"/>
+              <a:cs typeface="Arial Black"/>
+            </a:endParaRPr>
+          </a:p>
+        </p:txBody>
+      </p:sp>
+      <p:sp>
+        <p:nvSpPr>
+          <p:cNvPr id="22" name="Title 1"/>
+          <p:cNvSpPr txBox="1">
+            <a:spLocks/>
+          </p:cNvSpPr>
+          <p:nvPr/>
+        </p:nvSpPr>
+        <p:spPr>
+          <a:xfrm>
+            <a:off x="5291921" y="4032047"/>
+            <a:ext cx="2384502" cy="280811"/>
+          </a:xfrm>
+          <a:prstGeom prst="rect">
+            <a:avLst/>
+          </a:prstGeom>
+        </p:spPr>
+        <p:txBody>
+          <a:bodyPr vert="horz" lIns="91440" tIns="45720" rIns="91440" bIns="45720" rtlCol="0" anchor="ctr">
+            <a:normAutofit/>
+          </a:bodyPr>
+          <a:lstStyle>
+            <a:lvl1pPr algn="ctr" defTabSz="457200" rtl="0" eaLnBrk="1" latinLnBrk="0" hangingPunct="1">
+              <a:spcBef>
+                <a:spcPct val="0"/>
+              </a:spcBef>
+              <a:buNone/>
+              <a:defRPr sz="4400" kern="1200">
+                <a:solidFill>
+                  <a:schemeClr val="tx1"/>
+                </a:solidFill>
+                <a:latin typeface="+mj-lt"/>
+                <a:ea typeface="+mj-ea"/>
+                <a:cs typeface="+mj-cs"/>
+              </a:defRPr>
+            </a:lvl1pPr>
+          </a:lstStyle>
+          <a:p>
+            <a:r>
+              <a:rPr lang="en-US" sz="1200" dirty="0" smtClean="0">
+                <a:solidFill>
+                  <a:srgbClr val="FF0000"/>
+                </a:solidFill>
+                <a:latin typeface="Arial Black"/>
+                <a:cs typeface="Arial Black"/>
+              </a:rPr>
+              <a:t>Centered near 0.21</a:t>
+            </a:r>
+            <a:endParaRPr lang="en-US" sz="1200" dirty="0">
+              <a:solidFill>
+                <a:srgbClr val="FF0000"/>
+              </a:solidFill>
+              <a:latin typeface="Arial Black"/>
+              <a:cs typeface="Arial Black"/>
+            </a:endParaRPr>
+          </a:p>
+        </p:txBody>
+      </p:sp>
+      <p:sp>
+        <p:nvSpPr>
+          <p:cNvPr id="23" name="Title 1"/>
+          <p:cNvSpPr txBox="1">
+            <a:spLocks/>
+          </p:cNvSpPr>
+          <p:nvPr/>
+        </p:nvSpPr>
+        <p:spPr>
+          <a:xfrm>
+            <a:off x="5117985" y="6617534"/>
+            <a:ext cx="2384502" cy="280811"/>
+          </a:xfrm>
+          <a:prstGeom prst="rect">
+            <a:avLst/>
+          </a:prstGeom>
+        </p:spPr>
+        <p:txBody>
+          <a:bodyPr vert="horz" lIns="91440" tIns="45720" rIns="91440" bIns="45720" rtlCol="0" anchor="ctr">
+            <a:normAutofit/>
+          </a:bodyPr>
+          <a:lstStyle>
+            <a:lvl1pPr algn="ctr" defTabSz="457200" rtl="0" eaLnBrk="1" latinLnBrk="0" hangingPunct="1">
+              <a:spcBef>
+                <a:spcPct val="0"/>
+              </a:spcBef>
+              <a:buNone/>
+              <a:defRPr sz="4400" kern="1200">
+                <a:solidFill>
+                  <a:schemeClr val="tx1"/>
+                </a:solidFill>
+                <a:latin typeface="+mj-lt"/>
+                <a:ea typeface="+mj-ea"/>
+                <a:cs typeface="+mj-cs"/>
+              </a:defRPr>
+            </a:lvl1pPr>
+          </a:lstStyle>
+          <a:p>
+            <a:r>
+              <a:rPr lang="en-US" sz="1200" dirty="0" smtClean="0">
+                <a:solidFill>
+                  <a:srgbClr val="FF0000"/>
+                </a:solidFill>
+                <a:latin typeface="Arial Black"/>
+                <a:cs typeface="Arial Black"/>
+              </a:rPr>
+              <a:t>Centered near 0.13</a:t>
+            </a:r>
+            <a:endParaRPr lang="en-US" sz="1200" dirty="0">
+              <a:solidFill>
+                <a:srgbClr val="FF0000"/>
+              </a:solidFill>
+              <a:latin typeface="Arial Black"/>
+              <a:cs typeface="Arial Black"/>
+            </a:endParaRPr>
           </a:p>
         </p:txBody>
       </p:sp>
     </p:spTree>
     <p:extLst>
       <p:ext uri="{BB962C8B-B14F-4D97-AF65-F5344CB8AC3E}">
-        <p14:creationId xmlns:p14="http://schemas.microsoft.com/office/powerpoint/2010/main" val="2522871330"/>
+        <p14:creationId xmlns:p14="http://schemas.microsoft.com/office/powerpoint/2010/main" val="2130530324"/>
       </p:ext>
     </p:extLst>
   </p:cSld>
@@ -4051,68 +5827,175 @@
       </p:grpSpPr>
       <p:sp>
         <p:nvSpPr>
-          <p:cNvPr id="2" name="Title 1"/>
+          <p:cNvPr id="3" name="Content Placeholder 2"/>
           <p:cNvSpPr>
             <a:spLocks noGrp="1"/>
           </p:cNvSpPr>
           <p:nvPr>
+            <p:ph idx="1"/>
+          </p:nvPr>
+        </p:nvSpPr>
+        <p:spPr>
+          <a:xfrm>
+            <a:off x="457200" y="1413357"/>
+            <a:ext cx="8229600" cy="4833039"/>
+          </a:xfrm>
+        </p:spPr>
+        <p:txBody>
+          <a:bodyPr/>
+          <a:lstStyle/>
+          <a:p>
+            <a:r>
+              <a:rPr lang="en-US" dirty="0" smtClean="0">
+                <a:cs typeface="Arial Black"/>
+              </a:rPr>
+              <a:t>The previous normalization method shifts </a:t>
+            </a:r>
+            <a:r>
+              <a:rPr lang="en-US" dirty="0" err="1" smtClean="0">
+                <a:cs typeface="Arial Black"/>
+              </a:rPr>
+              <a:t>Sfp</a:t>
+            </a:r>
+            <a:r>
+              <a:rPr lang="en-US" dirty="0" smtClean="0">
+                <a:cs typeface="Arial Black"/>
+              </a:rPr>
+              <a:t>-only and </a:t>
+            </a:r>
+            <a:r>
+              <a:rPr lang="en-US" dirty="0" err="1" smtClean="0">
+                <a:cs typeface="Arial Black"/>
+              </a:rPr>
+              <a:t>AcpS</a:t>
+            </a:r>
+            <a:r>
+              <a:rPr lang="en-US" dirty="0" smtClean="0">
+                <a:cs typeface="Arial Black"/>
+              </a:rPr>
+              <a:t>-only by the same amount.</a:t>
+            </a:r>
+          </a:p>
+          <a:p>
+            <a:r>
+              <a:rPr lang="en-US" dirty="0" smtClean="0">
+                <a:cs typeface="Arial Black"/>
+              </a:rPr>
+              <a:t>This makes it appear as if </a:t>
+            </a:r>
+            <a:r>
+              <a:rPr lang="en-US" dirty="0" err="1" smtClean="0">
+                <a:cs typeface="Arial Black"/>
+              </a:rPr>
+              <a:t>Sfp</a:t>
+            </a:r>
+            <a:r>
+              <a:rPr lang="en-US" dirty="0" smtClean="0">
+                <a:cs typeface="Arial Black"/>
+              </a:rPr>
+              <a:t> labels lots of peptides, and </a:t>
+            </a:r>
+            <a:r>
+              <a:rPr lang="en-US" dirty="0" err="1" smtClean="0">
+                <a:cs typeface="Arial Black"/>
+              </a:rPr>
+              <a:t>AcpS</a:t>
+            </a:r>
+            <a:r>
+              <a:rPr lang="en-US" dirty="0" smtClean="0">
+                <a:cs typeface="Arial Black"/>
+              </a:rPr>
+              <a:t> labels few.</a:t>
+            </a:r>
+            <a:endParaRPr lang="en-US" dirty="0" smtClean="0">
+              <a:cs typeface="Arial Black"/>
+            </a:endParaRPr>
+          </a:p>
+          <a:p>
+            <a:r>
+              <a:rPr lang="en-US" dirty="0" smtClean="0">
+                <a:cs typeface="Arial Black"/>
+              </a:rPr>
+              <a:t>We recommend a new renormalization method, detailed below, that accounts for differences in average background.</a:t>
+            </a:r>
+          </a:p>
+          <a:p>
+            <a:r>
+              <a:rPr lang="en-US" dirty="0" smtClean="0">
+                <a:cs typeface="Arial Black"/>
+              </a:rPr>
+              <a:t>Using this new renormalization method, we see many more peptides labeled by </a:t>
+            </a:r>
+            <a:r>
+              <a:rPr lang="en-US" dirty="0" err="1" smtClean="0">
+                <a:cs typeface="Arial Black"/>
+              </a:rPr>
+              <a:t>AcpS</a:t>
+            </a:r>
+            <a:r>
+              <a:rPr lang="en-US" dirty="0" smtClean="0">
+                <a:cs typeface="Arial Black"/>
+              </a:rPr>
+              <a:t>.</a:t>
+            </a:r>
+            <a:endParaRPr lang="en-US" dirty="0"/>
+          </a:p>
+        </p:txBody>
+      </p:sp>
+      <p:sp>
+        <p:nvSpPr>
+          <p:cNvPr id="4" name="Title 1"/>
+          <p:cNvSpPr>
+            <a:spLocks noGrp="1"/>
+          </p:cNvSpPr>
+          <p:nvPr>
             <p:ph type="title"/>
           </p:nvPr>
         </p:nvSpPr>
         <p:spPr>
           <a:xfrm>
-            <a:off x="457200" y="274638"/>
-            <a:ext cx="8229600" cy="529364"/>
+            <a:off x="0" y="0"/>
+            <a:ext cx="9144000" cy="1077006"/>
           </a:xfrm>
         </p:spPr>
         <p:txBody>
           <a:bodyPr>
-            <a:normAutofit fontScale="90000"/>
+            <a:normAutofit/>
           </a:bodyPr>
           <a:lstStyle/>
           <a:p>
             <a:r>
-              <a:rPr lang="en-US" dirty="0" smtClean="0"/>
-              <a:t>Histogram plot after normalization</a:t>
-            </a:r>
-            <a:endParaRPr lang="en-US" dirty="0"/>
-          </a:p>
-        </p:txBody>
-      </p:sp>
-      <p:pic>
-        <p:nvPicPr>
-          <p:cNvPr id="4" name="Content Placeholder 3" descr="after_normalization.png"/>
-          <p:cNvPicPr>
-            <a:picLocks noGrp="1" noChangeAspect="1"/>
-          </p:cNvPicPr>
-          <p:nvPr>
-            <p:ph idx="1"/>
-          </p:nvPr>
-        </p:nvPicPr>
-        <p:blipFill>
-          <a:blip r:embed="rId2">
-            <a:extLst>
-              <a:ext uri="{28A0092B-C50C-407E-A947-70E740481C1C}">
-                <a14:useLocalDpi xmlns:a14="http://schemas.microsoft.com/office/drawing/2010/main" val="0"/>
-              </a:ext>
-            </a:extLst>
-          </a:blip>
-          <a:srcRect l="6188" r="6188"/>
-          <a:stretch>
-            <a:fillRect/>
-          </a:stretch>
-        </p:blipFill>
-        <p:spPr>
-          <a:xfrm>
-            <a:off x="457200" y="803275"/>
-            <a:ext cx="8229600" cy="5322888"/>
-          </a:xfrm>
-        </p:spPr>
-      </p:pic>
+              <a:rPr lang="en-US" sz="3200" dirty="0" smtClean="0">
+                <a:latin typeface="Arial Black"/>
+                <a:cs typeface="Arial Black"/>
+              </a:rPr>
+              <a:t>This issue made it appear that there were few peptides labeled by </a:t>
+            </a:r>
+            <a:r>
+              <a:rPr lang="en-US" sz="3200" dirty="0" err="1" smtClean="0">
+                <a:latin typeface="Arial Black"/>
+                <a:cs typeface="Arial Black"/>
+              </a:rPr>
+              <a:t>AcpS</a:t>
+            </a:r>
+            <a:r>
+              <a:rPr lang="en-US" sz="3200" dirty="0" smtClean="0">
+                <a:latin typeface="Arial Black"/>
+                <a:cs typeface="Arial Black"/>
+              </a:rPr>
+              <a:t> </a:t>
+            </a:r>
+            <a:endParaRPr lang="en-US" sz="3200" dirty="0">
+              <a:latin typeface="Arial Black"/>
+              <a:cs typeface="Arial Black"/>
+            </a:endParaRPr>
+          </a:p>
+        </p:txBody>
+      </p:sp>
     </p:spTree>
     <p:extLst>
       <p:ext uri="{BB962C8B-B14F-4D97-AF65-F5344CB8AC3E}">
-        <p14:creationId xmlns:p14="http://schemas.microsoft.com/office/powerpoint/2010/main" val="3143394196"/>
+        <p14:creationId xmlns:p14="http://schemas.microsoft.com/office/powerpoint/2010/main" val="3868603180"/>
       </p:ext>
     </p:extLst>
   </p:cSld>
@@ -4141,6 +6024,769 @@
       </p:grpSpPr>
       <p:sp>
         <p:nvSpPr>
+          <p:cNvPr id="3" name="Content Placeholder 2"/>
+          <p:cNvSpPr>
+            <a:spLocks noGrp="1"/>
+          </p:cNvSpPr>
+          <p:nvPr>
+            <p:ph idx="1"/>
+          </p:nvPr>
+        </p:nvSpPr>
+        <p:spPr>
+          <a:xfrm>
+            <a:off x="332278" y="1954699"/>
+            <a:ext cx="8229600" cy="4416603"/>
+          </a:xfrm>
+        </p:spPr>
+        <p:txBody>
+          <a:bodyPr/>
+          <a:lstStyle/>
+          <a:p>
+            <a:pPr marL="0" indent="0">
+              <a:buNone/>
+            </a:pPr>
+            <a:r>
+              <a:rPr lang="en-US" dirty="0" smtClean="0"/>
+              <a:t>The core idea of our </a:t>
+            </a:r>
+            <a:r>
+              <a:rPr lang="en-US" dirty="0" smtClean="0"/>
+              <a:t>renormalization method is</a:t>
+            </a:r>
+            <a:r>
+              <a:rPr lang="en-US" dirty="0" smtClean="0"/>
+              <a:t>:</a:t>
+            </a:r>
+          </a:p>
+          <a:p>
+            <a:pPr marL="514350" indent="-514350">
+              <a:buAutoNum type="arabicPeriod"/>
+            </a:pPr>
+            <a:r>
+              <a:rPr lang="en-US" dirty="0" smtClean="0"/>
+              <a:t>Using a normal distribution, fit a mean </a:t>
+            </a:r>
+            <a:r>
+              <a:rPr lang="en-US" dirty="0" smtClean="0"/>
+              <a:t>and standard deviation for the background </a:t>
+            </a:r>
+            <a:r>
+              <a:rPr lang="en-US" dirty="0" smtClean="0"/>
+              <a:t>light intensity for each of the four sets of experiments.</a:t>
+            </a:r>
+          </a:p>
+          <a:p>
+            <a:pPr marL="514350" indent="-514350">
+              <a:buAutoNum type="arabicPeriod"/>
+            </a:pPr>
+            <a:r>
+              <a:rPr lang="en-US" dirty="0" smtClean="0"/>
+              <a:t>Normalize </a:t>
+            </a:r>
+            <a:r>
+              <a:rPr lang="en-US" dirty="0" smtClean="0"/>
+              <a:t>the light </a:t>
+            </a:r>
+            <a:r>
+              <a:rPr lang="en-US" dirty="0" smtClean="0"/>
+              <a:t>intensity to </a:t>
+            </a:r>
+            <a:r>
+              <a:rPr lang="en-US" dirty="0" smtClean="0"/>
+              <a:t>the standard </a:t>
+            </a:r>
+            <a:r>
+              <a:rPr lang="en-US" dirty="0" smtClean="0"/>
+              <a:t>normal </a:t>
+            </a:r>
+            <a:r>
+              <a:rPr lang="en-US" dirty="0" smtClean="0"/>
+              <a:t>scale.  This puts the four sets of experiments on the same scale.</a:t>
+            </a:r>
+            <a:endParaRPr lang="en-US" dirty="0"/>
+          </a:p>
+        </p:txBody>
+      </p:sp>
+      <p:sp>
+        <p:nvSpPr>
+          <p:cNvPr id="4" name="Rectangle 3"/>
+          <p:cNvSpPr/>
+          <p:nvPr/>
+        </p:nvSpPr>
+        <p:spPr>
+          <a:xfrm>
+            <a:off x="145740" y="154993"/>
+            <a:ext cx="9143999" cy="1077218"/>
+          </a:xfrm>
+          <a:prstGeom prst="rect">
+            <a:avLst/>
+          </a:prstGeom>
+        </p:spPr>
+        <p:txBody>
+          <a:bodyPr wrap="square">
+            <a:spAutoFit/>
+          </a:bodyPr>
+          <a:lstStyle/>
+          <a:p>
+            <a:r>
+              <a:rPr lang="en-US" sz="3200" dirty="0" smtClean="0">
+                <a:latin typeface="Arial Black"/>
+                <a:cs typeface="Arial Black"/>
+              </a:rPr>
+              <a:t>We can use a new normalization method to address this issue</a:t>
+            </a:r>
+            <a:endParaRPr lang="en-US" sz="3200" dirty="0"/>
+          </a:p>
+        </p:txBody>
+      </p:sp>
+    </p:spTree>
+    <p:extLst>
+      <p:ext uri="{BB962C8B-B14F-4D97-AF65-F5344CB8AC3E}">
+        <p14:creationId xmlns:p14="http://schemas.microsoft.com/office/powerpoint/2010/main" val="182862864"/>
+      </p:ext>
+    </p:extLst>
+  </p:cSld>
+  <p:clrMapOvr>
+    <a:masterClrMapping/>
+  </p:clrMapOvr>
+</p:sld>
+</file>
+
+<file path=ppt/slides/slide6.xml><?xml version="1.0" encoding="utf-8"?>
+<p:sld xmlns:a="http://schemas.openxmlformats.org/drawingml/2006/main" xmlns:r="http://schemas.openxmlformats.org/officeDocument/2006/relationships" xmlns:p="http://schemas.openxmlformats.org/presentationml/2006/main">
+  <p:cSld>
+    <p:spTree>
+      <p:nvGrpSpPr>
+        <p:cNvPr id="1" name=""/>
+        <p:cNvGrpSpPr/>
+        <p:nvPr/>
+      </p:nvGrpSpPr>
+      <p:grpSpPr>
+        <a:xfrm>
+          <a:off x="0" y="0"/>
+          <a:ext cx="0" cy="0"/>
+          <a:chOff x="0" y="0"/>
+          <a:chExt cx="0" cy="0"/>
+        </a:xfrm>
+      </p:grpSpPr>
+      <p:pic>
+        <p:nvPicPr>
+          <p:cNvPr id="4" name="Content Placeholder 3" descr="raw_intensity.png"/>
+          <p:cNvPicPr>
+            <a:picLocks noChangeAspect="1"/>
+          </p:cNvPicPr>
+          <p:nvPr/>
+        </p:nvPicPr>
+        <p:blipFill>
+          <a:blip r:embed="rId2">
+            <a:extLst>
+              <a:ext uri="{28A0092B-C50C-407E-A947-70E740481C1C}">
+                <a14:useLocalDpi xmlns:a14="http://schemas.microsoft.com/office/drawing/2010/main" val="0"/>
+              </a:ext>
+            </a:extLst>
+          </a:blip>
+          <a:srcRect l="9830" r="9830"/>
+          <a:stretch>
+            <a:fillRect/>
+          </a:stretch>
+        </p:blipFill>
+        <p:spPr>
+          <a:xfrm>
+            <a:off x="832817" y="1459921"/>
+            <a:ext cx="7370368" cy="5003779"/>
+          </a:xfrm>
+          <a:prstGeom prst="rect">
+            <a:avLst/>
+          </a:prstGeom>
+        </p:spPr>
+      </p:pic>
+      <p:sp>
+        <p:nvSpPr>
+          <p:cNvPr id="5" name="TextBox 4"/>
+          <p:cNvSpPr txBox="1"/>
+          <p:nvPr/>
+        </p:nvSpPr>
+        <p:spPr>
+          <a:xfrm>
+            <a:off x="833783" y="1434148"/>
+            <a:ext cx="3736259" cy="369332"/>
+          </a:xfrm>
+          <a:prstGeom prst="rect">
+            <a:avLst/>
+          </a:prstGeom>
+          <a:solidFill>
+            <a:schemeClr val="bg1"/>
+          </a:solidFill>
+        </p:spPr>
+        <p:txBody>
+          <a:bodyPr wrap="square" rtlCol="0" anchor="b">
+            <a:spAutoFit/>
+          </a:bodyPr>
+          <a:lstStyle/>
+          <a:p>
+            <a:r>
+              <a:rPr lang="en-US" dirty="0" err="1" smtClean="0"/>
+              <a:t>Sfp</a:t>
+            </a:r>
+            <a:r>
+              <a:rPr lang="en-US" dirty="0" smtClean="0"/>
+              <a:t> only: mean=1455.19, </a:t>
+            </a:r>
+            <a:r>
+              <a:rPr lang="en-US" dirty="0" err="1" smtClean="0"/>
+              <a:t>std</a:t>
+            </a:r>
+            <a:r>
+              <a:rPr lang="en-US" dirty="0" smtClean="0"/>
+              <a:t>=172.88</a:t>
+            </a:r>
+            <a:endParaRPr lang="en-US" dirty="0"/>
+          </a:p>
+        </p:txBody>
+      </p:sp>
+      <p:sp>
+        <p:nvSpPr>
+          <p:cNvPr id="7" name="TextBox 6"/>
+          <p:cNvSpPr txBox="1"/>
+          <p:nvPr/>
+        </p:nvSpPr>
+        <p:spPr>
+          <a:xfrm>
+            <a:off x="4892762" y="1426166"/>
+            <a:ext cx="4059952" cy="369332"/>
+          </a:xfrm>
+          <a:prstGeom prst="rect">
+            <a:avLst/>
+          </a:prstGeom>
+          <a:solidFill>
+            <a:schemeClr val="bg1"/>
+          </a:solidFill>
+        </p:spPr>
+        <p:txBody>
+          <a:bodyPr wrap="square" rtlCol="0" anchor="b">
+            <a:spAutoFit/>
+          </a:bodyPr>
+          <a:lstStyle/>
+          <a:p>
+            <a:r>
+              <a:rPr lang="en-US" dirty="0" err="1" smtClean="0"/>
+              <a:t>Sfp</a:t>
+            </a:r>
+            <a:r>
+              <a:rPr lang="en-US" dirty="0" smtClean="0"/>
+              <a:t> &amp; </a:t>
+            </a:r>
+            <a:r>
+              <a:rPr lang="en-US" dirty="0" err="1" smtClean="0"/>
+              <a:t>PfAcpH</a:t>
+            </a:r>
+            <a:r>
+              <a:rPr lang="en-US" dirty="0" smtClean="0"/>
+              <a:t>: mean </a:t>
+            </a:r>
+            <a:r>
+              <a:rPr lang="en-US" dirty="0"/>
+              <a:t>= </a:t>
+            </a:r>
+            <a:r>
+              <a:rPr lang="en-US" dirty="0" smtClean="0"/>
+              <a:t>1109.3 </a:t>
+            </a:r>
+            <a:r>
+              <a:rPr lang="en-US" dirty="0" err="1" smtClean="0"/>
+              <a:t>std</a:t>
+            </a:r>
+            <a:r>
+              <a:rPr lang="en-US" dirty="0" smtClean="0"/>
+              <a:t> = 85.52</a:t>
+            </a:r>
+            <a:endParaRPr lang="en-US" dirty="0"/>
+          </a:p>
+        </p:txBody>
+      </p:sp>
+      <p:sp>
+        <p:nvSpPr>
+          <p:cNvPr id="8" name="TextBox 7"/>
+          <p:cNvSpPr txBox="1"/>
+          <p:nvPr/>
+        </p:nvSpPr>
+        <p:spPr>
+          <a:xfrm>
+            <a:off x="833782" y="3838406"/>
+            <a:ext cx="4058980" cy="369332"/>
+          </a:xfrm>
+          <a:prstGeom prst="rect">
+            <a:avLst/>
+          </a:prstGeom>
+          <a:solidFill>
+            <a:schemeClr val="bg1"/>
+          </a:solidFill>
+        </p:spPr>
+        <p:txBody>
+          <a:bodyPr wrap="square" rtlCol="0" anchor="b">
+            <a:spAutoFit/>
+          </a:bodyPr>
+          <a:lstStyle/>
+          <a:p>
+            <a:r>
+              <a:rPr lang="en-US" dirty="0" err="1" smtClean="0"/>
+              <a:t>AcpS</a:t>
+            </a:r>
+            <a:r>
+              <a:rPr lang="en-US" dirty="0" smtClean="0"/>
+              <a:t> only: </a:t>
+            </a:r>
+            <a:r>
+              <a:rPr lang="en-US" dirty="0"/>
+              <a:t>mean = 1166.76 </a:t>
+            </a:r>
+            <a:r>
+              <a:rPr lang="en-US" dirty="0" err="1"/>
+              <a:t>std</a:t>
+            </a:r>
+            <a:r>
+              <a:rPr lang="en-US" dirty="0"/>
+              <a:t> = 121.49</a:t>
+            </a:r>
+          </a:p>
+        </p:txBody>
+      </p:sp>
+      <p:sp>
+        <p:nvSpPr>
+          <p:cNvPr id="12" name="TextBox 11"/>
+          <p:cNvSpPr txBox="1"/>
+          <p:nvPr/>
+        </p:nvSpPr>
+        <p:spPr>
+          <a:xfrm>
+            <a:off x="4819892" y="3792664"/>
+            <a:ext cx="4132822" cy="369332"/>
+          </a:xfrm>
+          <a:prstGeom prst="rect">
+            <a:avLst/>
+          </a:prstGeom>
+          <a:solidFill>
+            <a:schemeClr val="bg1"/>
+          </a:solidFill>
+        </p:spPr>
+        <p:txBody>
+          <a:bodyPr wrap="square" rtlCol="0" anchor="b">
+            <a:spAutoFit/>
+          </a:bodyPr>
+          <a:lstStyle/>
+          <a:p>
+            <a:pPr marL="0" lvl="1"/>
+            <a:r>
+              <a:rPr lang="en-US" dirty="0" err="1" smtClean="0"/>
+              <a:t>AcpS</a:t>
+            </a:r>
+            <a:r>
+              <a:rPr lang="en-US" dirty="0" smtClean="0"/>
+              <a:t> &amp; </a:t>
+            </a:r>
+            <a:r>
+              <a:rPr lang="en-US" dirty="0" err="1" smtClean="0"/>
+              <a:t>PfAcpH</a:t>
+            </a:r>
+            <a:r>
+              <a:rPr lang="en-US" dirty="0" smtClean="0"/>
+              <a:t>: </a:t>
+            </a:r>
+            <a:r>
+              <a:rPr lang="en-US" sz="1600" dirty="0"/>
+              <a:t>Mean = 1185.07 </a:t>
+            </a:r>
+            <a:r>
+              <a:rPr lang="en-US" sz="1600" dirty="0" err="1"/>
+              <a:t>std</a:t>
+            </a:r>
+            <a:r>
+              <a:rPr lang="en-US" sz="1600" dirty="0"/>
+              <a:t> = </a:t>
+            </a:r>
+            <a:r>
+              <a:rPr lang="en-US" sz="1600" dirty="0" smtClean="0"/>
+              <a:t>122.27</a:t>
+            </a:r>
+            <a:endParaRPr lang="en-US" sz="1600" dirty="0"/>
+          </a:p>
+        </p:txBody>
+      </p:sp>
+      <p:sp>
+        <p:nvSpPr>
+          <p:cNvPr id="2" name="Content Placeholder 1"/>
+          <p:cNvSpPr>
+            <a:spLocks noGrp="1"/>
+          </p:cNvSpPr>
+          <p:nvPr>
+            <p:ph idx="1"/>
+          </p:nvPr>
+        </p:nvSpPr>
+        <p:spPr>
+          <a:xfrm>
+            <a:off x="311462" y="6014314"/>
+            <a:ext cx="8229600" cy="731780"/>
+          </a:xfrm>
+        </p:spPr>
+        <p:txBody>
+          <a:bodyPr/>
+          <a:lstStyle/>
+          <a:p>
+            <a:pPr marL="0" lvl="1" indent="0">
+              <a:buNone/>
+            </a:pPr>
+            <a:r>
+              <a:rPr lang="en-US" sz="1600" dirty="0" smtClean="0">
+                <a:latin typeface="Arial Black"/>
+                <a:cs typeface="Arial Black"/>
+              </a:rPr>
+              <a:t>Step 2</a:t>
+            </a:r>
+            <a:r>
+              <a:rPr lang="en-US" sz="1600" dirty="0" smtClean="0"/>
+              <a:t>: we </a:t>
+            </a:r>
+            <a:r>
+              <a:rPr lang="en-US" sz="1600" dirty="0"/>
+              <a:t>normalize light intensity by </a:t>
+            </a:r>
+            <a:endParaRPr lang="en-US" sz="1600" dirty="0" smtClean="0"/>
+          </a:p>
+          <a:p>
+            <a:pPr marL="0" lvl="1" indent="0">
+              <a:buNone/>
+            </a:pPr>
+            <a:r>
+              <a:rPr lang="en-US" sz="1600" dirty="0" smtClean="0"/>
+              <a:t>	</a:t>
+            </a:r>
+            <a:r>
+              <a:rPr lang="en-US" sz="1600" dirty="0" err="1" smtClean="0"/>
+              <a:t>Y</a:t>
+            </a:r>
+            <a:r>
+              <a:rPr lang="en-US" sz="1000" dirty="0" err="1" smtClean="0"/>
+              <a:t>norm</a:t>
+            </a:r>
+            <a:r>
+              <a:rPr lang="en-US" sz="1600" dirty="0" smtClean="0"/>
+              <a:t> </a:t>
+            </a:r>
+            <a:r>
+              <a:rPr lang="en-US" sz="1600" dirty="0"/>
+              <a:t>= (</a:t>
+            </a:r>
+            <a:r>
+              <a:rPr lang="en-US" sz="1600" dirty="0" err="1"/>
+              <a:t>Y</a:t>
+            </a:r>
+            <a:r>
+              <a:rPr lang="en-US" sz="1100" dirty="0" err="1"/>
+              <a:t>r</a:t>
+            </a:r>
+            <a:r>
+              <a:rPr lang="en-US" sz="1050" dirty="0" err="1"/>
+              <a:t>aw</a:t>
+            </a:r>
+            <a:r>
+              <a:rPr lang="en-US" sz="1600" dirty="0"/>
+              <a:t> – mean) / </a:t>
+            </a:r>
+            <a:r>
+              <a:rPr lang="en-US" sz="1600" dirty="0" err="1"/>
+              <a:t>std</a:t>
+            </a:r>
+            <a:r>
+              <a:rPr lang="en-US" sz="1600" dirty="0"/>
+              <a:t>  for </a:t>
+            </a:r>
+            <a:r>
+              <a:rPr lang="en-US" sz="1600" dirty="0" err="1"/>
+              <a:t>Sfp</a:t>
+            </a:r>
+            <a:r>
+              <a:rPr lang="en-US" sz="1600" dirty="0" smtClean="0"/>
+              <a:t>-only, </a:t>
+            </a:r>
+            <a:r>
+              <a:rPr lang="en-US" sz="1600" dirty="0" err="1"/>
+              <a:t>Sfp-PfAcpH</a:t>
+            </a:r>
+            <a:r>
+              <a:rPr lang="en-US" sz="1600" dirty="0"/>
+              <a:t>, </a:t>
+            </a:r>
+            <a:r>
+              <a:rPr lang="en-US" sz="1600" dirty="0" err="1"/>
+              <a:t>AcpS</a:t>
+            </a:r>
+            <a:r>
+              <a:rPr lang="en-US" sz="1600" dirty="0" smtClean="0"/>
+              <a:t>-only and </a:t>
+            </a:r>
+            <a:r>
+              <a:rPr lang="en-US" sz="1600" dirty="0" err="1"/>
+              <a:t>AcpS-PfAcpH</a:t>
+            </a:r>
+            <a:r>
+              <a:rPr lang="en-US" sz="1600" dirty="0"/>
+              <a:t>.</a:t>
+            </a:r>
+          </a:p>
+          <a:p>
+            <a:endParaRPr lang="en-US" dirty="0"/>
+          </a:p>
+        </p:txBody>
+      </p:sp>
+      <p:sp>
+        <p:nvSpPr>
+          <p:cNvPr id="9" name="Content Placeholder 1"/>
+          <p:cNvSpPr txBox="1">
+            <a:spLocks/>
+          </p:cNvSpPr>
+          <p:nvPr/>
+        </p:nvSpPr>
+        <p:spPr>
+          <a:xfrm>
+            <a:off x="172379" y="728141"/>
+            <a:ext cx="8229600" cy="731780"/>
+          </a:xfrm>
+          <a:prstGeom prst="rect">
+            <a:avLst/>
+          </a:prstGeom>
+        </p:spPr>
+        <p:txBody>
+          <a:bodyPr vert="horz" lIns="91440" tIns="45720" rIns="91440" bIns="45720" rtlCol="0">
+            <a:normAutofit fontScale="92500"/>
+          </a:bodyPr>
+          <a:lstStyle>
+            <a:lvl1pPr marL="342900" indent="-342900" algn="l" defTabSz="457200" rtl="0" eaLnBrk="1" latinLnBrk="0" hangingPunct="1">
+              <a:spcBef>
+                <a:spcPct val="20000"/>
+              </a:spcBef>
+              <a:buFont typeface="Arial"/>
+              <a:buChar char="•"/>
+              <a:defRPr sz="3200" kern="1200">
+                <a:solidFill>
+                  <a:schemeClr val="tx1"/>
+                </a:solidFill>
+                <a:latin typeface="+mn-lt"/>
+                <a:ea typeface="+mn-ea"/>
+                <a:cs typeface="+mn-cs"/>
+              </a:defRPr>
+            </a:lvl1pPr>
+            <a:lvl2pPr marL="742950" indent="-285750" algn="l" defTabSz="457200" rtl="0" eaLnBrk="1" latinLnBrk="0" hangingPunct="1">
+              <a:spcBef>
+                <a:spcPct val="20000"/>
+              </a:spcBef>
+              <a:buFont typeface="Arial"/>
+              <a:buChar char="–"/>
+              <a:defRPr sz="2800" kern="1200">
+                <a:solidFill>
+                  <a:schemeClr val="tx1"/>
+                </a:solidFill>
+                <a:latin typeface="+mn-lt"/>
+                <a:ea typeface="+mn-ea"/>
+                <a:cs typeface="+mn-cs"/>
+              </a:defRPr>
+            </a:lvl2pPr>
+            <a:lvl3pPr marL="1143000" indent="-228600" algn="l" defTabSz="457200" rtl="0" eaLnBrk="1" latinLnBrk="0" hangingPunct="1">
+              <a:spcBef>
+                <a:spcPct val="20000"/>
+              </a:spcBef>
+              <a:buFont typeface="Arial"/>
+              <a:buChar char="•"/>
+              <a:defRPr sz="2400" kern="1200">
+                <a:solidFill>
+                  <a:schemeClr val="tx1"/>
+                </a:solidFill>
+                <a:latin typeface="+mn-lt"/>
+                <a:ea typeface="+mn-ea"/>
+                <a:cs typeface="+mn-cs"/>
+              </a:defRPr>
+            </a:lvl3pPr>
+            <a:lvl4pPr marL="1600200" indent="-228600" algn="l" defTabSz="457200" rtl="0" eaLnBrk="1" latinLnBrk="0" hangingPunct="1">
+              <a:spcBef>
+                <a:spcPct val="20000"/>
+              </a:spcBef>
+              <a:buFont typeface="Arial"/>
+              <a:buChar char="–"/>
+              <a:defRPr sz="2000" kern="1200">
+                <a:solidFill>
+                  <a:schemeClr val="tx1"/>
+                </a:solidFill>
+                <a:latin typeface="+mn-lt"/>
+                <a:ea typeface="+mn-ea"/>
+                <a:cs typeface="+mn-cs"/>
+              </a:defRPr>
+            </a:lvl4pPr>
+            <a:lvl5pPr marL="2057400" indent="-228600" algn="l" defTabSz="457200" rtl="0" eaLnBrk="1" latinLnBrk="0" hangingPunct="1">
+              <a:spcBef>
+                <a:spcPct val="20000"/>
+              </a:spcBef>
+              <a:buFont typeface="Arial"/>
+              <a:buChar char="»"/>
+              <a:defRPr sz="2000" kern="1200">
+                <a:solidFill>
+                  <a:schemeClr val="tx1"/>
+                </a:solidFill>
+                <a:latin typeface="+mn-lt"/>
+                <a:ea typeface="+mn-ea"/>
+                <a:cs typeface="+mn-cs"/>
+              </a:defRPr>
+            </a:lvl5pPr>
+            <a:lvl6pPr marL="2514600" indent="-228600" algn="l" defTabSz="457200" rtl="0" eaLnBrk="1" latinLnBrk="0" hangingPunct="1">
+              <a:spcBef>
+                <a:spcPct val="20000"/>
+              </a:spcBef>
+              <a:buFont typeface="Arial"/>
+              <a:buChar char="•"/>
+              <a:defRPr sz="2000" kern="1200">
+                <a:solidFill>
+                  <a:schemeClr val="tx1"/>
+                </a:solidFill>
+                <a:latin typeface="+mn-lt"/>
+                <a:ea typeface="+mn-ea"/>
+                <a:cs typeface="+mn-cs"/>
+              </a:defRPr>
+            </a:lvl6pPr>
+            <a:lvl7pPr marL="2971800" indent="-228600" algn="l" defTabSz="457200" rtl="0" eaLnBrk="1" latinLnBrk="0" hangingPunct="1">
+              <a:spcBef>
+                <a:spcPct val="20000"/>
+              </a:spcBef>
+              <a:buFont typeface="Arial"/>
+              <a:buChar char="•"/>
+              <a:defRPr sz="2000" kern="1200">
+                <a:solidFill>
+                  <a:schemeClr val="tx1"/>
+                </a:solidFill>
+                <a:latin typeface="+mn-lt"/>
+                <a:ea typeface="+mn-ea"/>
+                <a:cs typeface="+mn-cs"/>
+              </a:defRPr>
+            </a:lvl7pPr>
+            <a:lvl8pPr marL="3429000" indent="-228600" algn="l" defTabSz="457200" rtl="0" eaLnBrk="1" latinLnBrk="0" hangingPunct="1">
+              <a:spcBef>
+                <a:spcPct val="20000"/>
+              </a:spcBef>
+              <a:buFont typeface="Arial"/>
+              <a:buChar char="•"/>
+              <a:defRPr sz="2000" kern="1200">
+                <a:solidFill>
+                  <a:schemeClr val="tx1"/>
+                </a:solidFill>
+                <a:latin typeface="+mn-lt"/>
+                <a:ea typeface="+mn-ea"/>
+                <a:cs typeface="+mn-cs"/>
+              </a:defRPr>
+            </a:lvl8pPr>
+            <a:lvl9pPr marL="3886200" indent="-228600" algn="l" defTabSz="457200" rtl="0" eaLnBrk="1" latinLnBrk="0" hangingPunct="1">
+              <a:spcBef>
+                <a:spcPct val="20000"/>
+              </a:spcBef>
+              <a:buFont typeface="Arial"/>
+              <a:buChar char="•"/>
+              <a:defRPr sz="2000" kern="1200">
+                <a:solidFill>
+                  <a:schemeClr val="tx1"/>
+                </a:solidFill>
+                <a:latin typeface="+mn-lt"/>
+                <a:ea typeface="+mn-ea"/>
+                <a:cs typeface="+mn-cs"/>
+              </a:defRPr>
+            </a:lvl9pPr>
+          </a:lstStyle>
+          <a:p>
+            <a:pPr marL="0" lvl="1" indent="0">
+              <a:buFont typeface="Arial"/>
+              <a:buNone/>
+            </a:pPr>
+            <a:r>
+              <a:rPr lang="en-US" sz="1600" dirty="0" smtClean="0">
+                <a:latin typeface="Arial Black"/>
+                <a:cs typeface="Arial Black"/>
+              </a:rPr>
+              <a:t>Step 1</a:t>
+            </a:r>
+            <a:r>
+              <a:rPr lang="en-US" sz="1600" dirty="0" smtClean="0"/>
+              <a:t>: we assume that the background raw light intensity is normally distributed, and treat active peptides as outliers.  We estimate the mean and standard deviation (</a:t>
+            </a:r>
+            <a:r>
+              <a:rPr lang="en-US" sz="1600" dirty="0" err="1" smtClean="0"/>
+              <a:t>std</a:t>
+            </a:r>
+            <a:r>
+              <a:rPr lang="en-US" sz="1600" dirty="0" smtClean="0"/>
+              <a:t>)  of the underlying normal.</a:t>
+            </a:r>
+          </a:p>
+        </p:txBody>
+      </p:sp>
+      <p:sp>
+        <p:nvSpPr>
+          <p:cNvPr id="6" name="Rectangle 5"/>
+          <p:cNvSpPr/>
+          <p:nvPr/>
+        </p:nvSpPr>
+        <p:spPr>
+          <a:xfrm>
+            <a:off x="145740" y="154993"/>
+            <a:ext cx="9143999" cy="461665"/>
+          </a:xfrm>
+          <a:prstGeom prst="rect">
+            <a:avLst/>
+          </a:prstGeom>
+        </p:spPr>
+        <p:txBody>
+          <a:bodyPr wrap="square">
+            <a:spAutoFit/>
+          </a:bodyPr>
+          <a:lstStyle/>
+          <a:p>
+            <a:r>
+              <a:rPr lang="en-US" sz="2400" dirty="0" smtClean="0">
+                <a:latin typeface="Arial Black"/>
+                <a:cs typeface="Arial Black"/>
+              </a:rPr>
+              <a:t>Here’s how our new normalization method works</a:t>
+            </a:r>
+            <a:endParaRPr lang="en-US" sz="2400" dirty="0"/>
+          </a:p>
+        </p:txBody>
+      </p:sp>
+    </p:spTree>
+    <p:extLst>
+      <p:ext uri="{BB962C8B-B14F-4D97-AF65-F5344CB8AC3E}">
+        <p14:creationId xmlns:p14="http://schemas.microsoft.com/office/powerpoint/2010/main" val="2906139978"/>
+      </p:ext>
+    </p:extLst>
+  </p:cSld>
+  <p:clrMapOvr>
+    <a:masterClrMapping/>
+  </p:clrMapOvr>
+</p:sld>
+</file>
+
+<file path=ppt/slides/slide7.xml><?xml version="1.0" encoding="utf-8"?>
+<p:sld xmlns:a="http://schemas.openxmlformats.org/drawingml/2006/main" xmlns:r="http://schemas.openxmlformats.org/officeDocument/2006/relationships" xmlns:p="http://schemas.openxmlformats.org/presentationml/2006/main">
+  <p:cSld>
+    <p:spTree>
+      <p:nvGrpSpPr>
+        <p:cNvPr id="1" name=""/>
+        <p:cNvGrpSpPr/>
+        <p:nvPr/>
+      </p:nvGrpSpPr>
+      <p:grpSpPr>
+        <a:xfrm>
+          <a:off x="0" y="0"/>
+          <a:ext cx="0" cy="0"/>
+          <a:chOff x="0" y="0"/>
+          <a:chExt cx="0" cy="0"/>
+        </a:xfrm>
+      </p:grpSpPr>
+      <p:sp>
+        <p:nvSpPr>
           <p:cNvPr id="2" name="Title 1"/>
           <p:cNvSpPr>
             <a:spLocks noGrp="1"/>
@@ -4151,25 +6797,659 @@
         </p:nvSpPr>
         <p:spPr>
           <a:xfrm>
-            <a:off x="-34413" y="76200"/>
-            <a:ext cx="7663931" cy="838200"/>
+            <a:off x="0" y="389159"/>
+            <a:ext cx="9144000" cy="529364"/>
           </a:xfrm>
         </p:spPr>
         <p:txBody>
           <a:bodyPr>
-            <a:normAutofit fontScale="90000"/>
+            <a:noAutofit/>
           </a:bodyPr>
           <a:lstStyle/>
           <a:p>
             <a:r>
-              <a:rPr lang="en-US" sz="3000" b="1" dirty="0" smtClean="0"/>
-              <a:t>Breakdown of </a:t>
-            </a:r>
-            <a:r>
-              <a:rPr lang="en-US" sz="3000" b="1" dirty="0" smtClean="0"/>
-              <a:t>Results (Details in excel spreadsheet)</a:t>
-            </a:r>
-            <a:endParaRPr lang="en-US" sz="3000" b="1" dirty="0"/>
+              <a:rPr lang="en-US" sz="3200" dirty="0" smtClean="0">
+                <a:latin typeface="Arial Black"/>
+                <a:cs typeface="Arial Black"/>
+              </a:rPr>
+              <a:t>Histogram plot </a:t>
+            </a:r>
+            <a:r>
+              <a:rPr lang="en-US" sz="3200" dirty="0" smtClean="0">
+                <a:latin typeface="Arial Black"/>
+                <a:cs typeface="Arial Black"/>
+              </a:rPr>
+              <a:t>after </a:t>
+            </a:r>
+            <a:r>
+              <a:rPr lang="en-US" sz="3200" dirty="0" smtClean="0">
+                <a:latin typeface="Arial Black"/>
+                <a:cs typeface="Arial Black"/>
+              </a:rPr>
+              <a:t>normalization: </a:t>
+            </a:r>
+            <a:br>
+              <a:rPr lang="en-US" sz="3200" dirty="0" smtClean="0">
+                <a:latin typeface="Arial Black"/>
+                <a:cs typeface="Arial Black"/>
+              </a:rPr>
+            </a:br>
+            <a:r>
+              <a:rPr lang="en-US" sz="3200" dirty="0" smtClean="0">
+                <a:latin typeface="Arial Black"/>
+                <a:cs typeface="Arial Black"/>
+              </a:rPr>
+              <a:t>all histograms are on the same scale </a:t>
+            </a:r>
+            <a:endParaRPr lang="en-US" sz="3200" dirty="0">
+              <a:latin typeface="Arial Black"/>
+              <a:cs typeface="Arial Black"/>
+            </a:endParaRPr>
+          </a:p>
+        </p:txBody>
+      </p:sp>
+      <p:pic>
+        <p:nvPicPr>
+          <p:cNvPr id="4" name="Content Placeholder 3" descr="after_normalization.png"/>
+          <p:cNvPicPr>
+            <a:picLocks noGrp="1" noChangeAspect="1"/>
+          </p:cNvPicPr>
+          <p:nvPr>
+            <p:ph idx="1"/>
+          </p:nvPr>
+        </p:nvPicPr>
+        <p:blipFill>
+          <a:blip r:embed="rId2">
+            <a:extLst>
+              <a:ext uri="{28A0092B-C50C-407E-A947-70E740481C1C}">
+                <a14:useLocalDpi xmlns:a14="http://schemas.microsoft.com/office/drawing/2010/main" val="0"/>
+              </a:ext>
+            </a:extLst>
+          </a:blip>
+          <a:srcRect l="6188" r="6188"/>
+          <a:stretch>
+            <a:fillRect/>
+          </a:stretch>
+        </p:blipFill>
+        <p:spPr>
+          <a:xfrm>
+            <a:off x="457200" y="1535112"/>
+            <a:ext cx="8229600" cy="5322888"/>
+          </a:xfrm>
+        </p:spPr>
+      </p:pic>
+      <p:sp>
+        <p:nvSpPr>
+          <p:cNvPr id="5" name="TextBox 4"/>
+          <p:cNvSpPr txBox="1"/>
+          <p:nvPr/>
+        </p:nvSpPr>
+        <p:spPr>
+          <a:xfrm>
+            <a:off x="873171" y="1462213"/>
+            <a:ext cx="3249958" cy="369332"/>
+          </a:xfrm>
+          <a:prstGeom prst="rect">
+            <a:avLst/>
+          </a:prstGeom>
+          <a:solidFill>
+            <a:schemeClr val="bg1"/>
+          </a:solidFill>
+        </p:spPr>
+        <p:txBody>
+          <a:bodyPr wrap="none" rtlCol="0" anchor="b">
+            <a:spAutoFit/>
+          </a:bodyPr>
+          <a:lstStyle/>
+          <a:p>
+            <a:r>
+              <a:rPr lang="en-US" dirty="0" smtClean="0"/>
+              <a:t>Membrane treated with </a:t>
+            </a:r>
+            <a:r>
+              <a:rPr lang="en-US" dirty="0" err="1" smtClean="0"/>
+              <a:t>Sfp</a:t>
+            </a:r>
+            <a:r>
+              <a:rPr lang="en-US" dirty="0" smtClean="0"/>
+              <a:t> only</a:t>
+            </a:r>
+            <a:endParaRPr lang="en-US" dirty="0"/>
+          </a:p>
+        </p:txBody>
+      </p:sp>
+      <p:sp>
+        <p:nvSpPr>
+          <p:cNvPr id="6" name="TextBox 5"/>
+          <p:cNvSpPr txBox="1"/>
+          <p:nvPr/>
+        </p:nvSpPr>
+        <p:spPr>
+          <a:xfrm>
+            <a:off x="5242802" y="1454462"/>
+            <a:ext cx="3745098" cy="369332"/>
+          </a:xfrm>
+          <a:prstGeom prst="rect">
+            <a:avLst/>
+          </a:prstGeom>
+          <a:solidFill>
+            <a:schemeClr val="bg1"/>
+          </a:solidFill>
+        </p:spPr>
+        <p:txBody>
+          <a:bodyPr wrap="none" rtlCol="0" anchor="b">
+            <a:spAutoFit/>
+          </a:bodyPr>
+          <a:lstStyle/>
+          <a:p>
+            <a:r>
+              <a:rPr lang="en-US" dirty="0" smtClean="0"/>
+              <a:t>Membrane treated with </a:t>
+            </a:r>
+            <a:r>
+              <a:rPr lang="en-US" dirty="0" err="1" smtClean="0"/>
+              <a:t>Sfp</a:t>
+            </a:r>
+            <a:r>
+              <a:rPr lang="en-US" dirty="0" smtClean="0"/>
+              <a:t> &amp; </a:t>
+            </a:r>
+            <a:r>
+              <a:rPr lang="en-US" dirty="0" err="1" smtClean="0"/>
+              <a:t>PfAcpH</a:t>
+            </a:r>
+            <a:endParaRPr lang="en-US" dirty="0"/>
+          </a:p>
+        </p:txBody>
+      </p:sp>
+      <p:sp>
+        <p:nvSpPr>
+          <p:cNvPr id="7" name="TextBox 6"/>
+          <p:cNvSpPr txBox="1"/>
+          <p:nvPr/>
+        </p:nvSpPr>
+        <p:spPr>
+          <a:xfrm>
+            <a:off x="5060047" y="4092798"/>
+            <a:ext cx="3905824" cy="369332"/>
+          </a:xfrm>
+          <a:prstGeom prst="rect">
+            <a:avLst/>
+          </a:prstGeom>
+          <a:solidFill>
+            <a:schemeClr val="bg1"/>
+          </a:solidFill>
+        </p:spPr>
+        <p:txBody>
+          <a:bodyPr wrap="none" rtlCol="0" anchor="b">
+            <a:spAutoFit/>
+          </a:bodyPr>
+          <a:lstStyle/>
+          <a:p>
+            <a:r>
+              <a:rPr lang="en-US" dirty="0" smtClean="0"/>
+              <a:t>Membrane treated with </a:t>
+            </a:r>
+            <a:r>
+              <a:rPr lang="en-US" dirty="0" err="1" smtClean="0"/>
+              <a:t>AcpS</a:t>
+            </a:r>
+            <a:r>
+              <a:rPr lang="en-US" dirty="0" smtClean="0"/>
+              <a:t> &amp; </a:t>
+            </a:r>
+            <a:r>
+              <a:rPr lang="en-US" dirty="0" err="1" smtClean="0"/>
+              <a:t>PfAcpH</a:t>
+            </a:r>
+            <a:endParaRPr lang="en-US" dirty="0"/>
+          </a:p>
+        </p:txBody>
+      </p:sp>
+      <p:cxnSp>
+        <p:nvCxnSpPr>
+          <p:cNvPr id="8" name="Straight Arrow Connector 7"/>
+          <p:cNvCxnSpPr/>
+          <p:nvPr/>
+        </p:nvCxnSpPr>
+        <p:spPr>
+          <a:xfrm flipV="1">
+            <a:off x="1714956" y="3822465"/>
+            <a:ext cx="0" cy="170766"/>
+          </a:xfrm>
+          <a:prstGeom prst="straightConnector1">
+            <a:avLst/>
+          </a:prstGeom>
+          <a:ln>
+            <a:solidFill>
+              <a:srgbClr val="FF0000"/>
+            </a:solidFill>
+            <a:tailEnd type="arrow"/>
+          </a:ln>
+        </p:spPr>
+        <p:style>
+          <a:lnRef idx="2">
+            <a:schemeClr val="accent1"/>
+          </a:lnRef>
+          <a:fillRef idx="0">
+            <a:schemeClr val="accent1"/>
+          </a:fillRef>
+          <a:effectRef idx="1">
+            <a:schemeClr val="accent1"/>
+          </a:effectRef>
+          <a:fontRef idx="minor">
+            <a:schemeClr val="tx1"/>
+          </a:fontRef>
+        </p:style>
+      </p:cxnSp>
+      <p:sp>
+        <p:nvSpPr>
+          <p:cNvPr id="9" name="Title 1"/>
+          <p:cNvSpPr txBox="1">
+            <a:spLocks/>
+          </p:cNvSpPr>
+          <p:nvPr/>
+        </p:nvSpPr>
+        <p:spPr>
+          <a:xfrm>
+            <a:off x="704021" y="3952392"/>
+            <a:ext cx="2384502" cy="280811"/>
+          </a:xfrm>
+          <a:prstGeom prst="rect">
+            <a:avLst/>
+          </a:prstGeom>
+        </p:spPr>
+        <p:txBody>
+          <a:bodyPr vert="horz" lIns="91440" tIns="45720" rIns="91440" bIns="45720" rtlCol="0" anchor="ctr">
+            <a:normAutofit/>
+          </a:bodyPr>
+          <a:lstStyle>
+            <a:lvl1pPr algn="ctr" defTabSz="457200" rtl="0" eaLnBrk="1" latinLnBrk="0" hangingPunct="1">
+              <a:spcBef>
+                <a:spcPct val="0"/>
+              </a:spcBef>
+              <a:buNone/>
+              <a:defRPr sz="4400" kern="1200">
+                <a:solidFill>
+                  <a:schemeClr val="tx1"/>
+                </a:solidFill>
+                <a:latin typeface="+mj-lt"/>
+                <a:ea typeface="+mj-ea"/>
+                <a:cs typeface="+mj-cs"/>
+              </a:defRPr>
+            </a:lvl1pPr>
+          </a:lstStyle>
+          <a:p>
+            <a:r>
+              <a:rPr lang="en-US" sz="1200" dirty="0" smtClean="0">
+                <a:solidFill>
+                  <a:srgbClr val="FF0000"/>
+                </a:solidFill>
+                <a:latin typeface="Arial Black"/>
+                <a:cs typeface="Arial Black"/>
+              </a:rPr>
+              <a:t>Centered at 0 </a:t>
+            </a:r>
+            <a:endParaRPr lang="en-US" sz="1200" dirty="0">
+              <a:solidFill>
+                <a:srgbClr val="FF0000"/>
+              </a:solidFill>
+              <a:latin typeface="Arial Black"/>
+              <a:cs typeface="Arial Black"/>
+            </a:endParaRPr>
+          </a:p>
+        </p:txBody>
+      </p:sp>
+      <p:cxnSp>
+        <p:nvCxnSpPr>
+          <p:cNvPr id="10" name="Straight Arrow Connector 9"/>
+          <p:cNvCxnSpPr/>
+          <p:nvPr/>
+        </p:nvCxnSpPr>
+        <p:spPr>
+          <a:xfrm flipV="1">
+            <a:off x="1624300" y="6359657"/>
+            <a:ext cx="0" cy="170766"/>
+          </a:xfrm>
+          <a:prstGeom prst="straightConnector1">
+            <a:avLst/>
+          </a:prstGeom>
+          <a:ln>
+            <a:solidFill>
+              <a:srgbClr val="FF0000"/>
+            </a:solidFill>
+            <a:tailEnd type="arrow"/>
+          </a:ln>
+        </p:spPr>
+        <p:style>
+          <a:lnRef idx="2">
+            <a:schemeClr val="accent1"/>
+          </a:lnRef>
+          <a:fillRef idx="0">
+            <a:schemeClr val="accent1"/>
+          </a:fillRef>
+          <a:effectRef idx="1">
+            <a:schemeClr val="accent1"/>
+          </a:effectRef>
+          <a:fontRef idx="minor">
+            <a:schemeClr val="tx1"/>
+          </a:fontRef>
+        </p:style>
+      </p:cxnSp>
+      <p:sp>
+        <p:nvSpPr>
+          <p:cNvPr id="11" name="Title 1"/>
+          <p:cNvSpPr txBox="1">
+            <a:spLocks/>
+          </p:cNvSpPr>
+          <p:nvPr/>
+        </p:nvSpPr>
+        <p:spPr>
+          <a:xfrm>
+            <a:off x="530085" y="6531228"/>
+            <a:ext cx="2384502" cy="280811"/>
+          </a:xfrm>
+          <a:prstGeom prst="rect">
+            <a:avLst/>
+          </a:prstGeom>
+        </p:spPr>
+        <p:txBody>
+          <a:bodyPr vert="horz" lIns="91440" tIns="45720" rIns="91440" bIns="45720" rtlCol="0" anchor="ctr">
+            <a:normAutofit/>
+          </a:bodyPr>
+          <a:lstStyle>
+            <a:lvl1pPr algn="ctr" defTabSz="457200" rtl="0" eaLnBrk="1" latinLnBrk="0" hangingPunct="1">
+              <a:spcBef>
+                <a:spcPct val="0"/>
+              </a:spcBef>
+              <a:buNone/>
+              <a:defRPr sz="4400" kern="1200">
+                <a:solidFill>
+                  <a:schemeClr val="tx1"/>
+                </a:solidFill>
+                <a:latin typeface="+mj-lt"/>
+                <a:ea typeface="+mj-ea"/>
+                <a:cs typeface="+mj-cs"/>
+              </a:defRPr>
+            </a:lvl1pPr>
+          </a:lstStyle>
+          <a:p>
+            <a:r>
+              <a:rPr lang="en-US" sz="1200" dirty="0" smtClean="0">
+                <a:solidFill>
+                  <a:srgbClr val="FF0000"/>
+                </a:solidFill>
+                <a:latin typeface="Arial Black"/>
+                <a:cs typeface="Arial Black"/>
+              </a:rPr>
+              <a:t>Centered at 0</a:t>
+            </a:r>
+            <a:endParaRPr lang="en-US" sz="1200" dirty="0">
+              <a:solidFill>
+                <a:srgbClr val="FF0000"/>
+              </a:solidFill>
+              <a:latin typeface="Arial Black"/>
+              <a:cs typeface="Arial Black"/>
+            </a:endParaRPr>
+          </a:p>
+        </p:txBody>
+      </p:sp>
+      <p:cxnSp>
+        <p:nvCxnSpPr>
+          <p:cNvPr id="12" name="Straight Arrow Connector 11"/>
+          <p:cNvCxnSpPr/>
+          <p:nvPr/>
+        </p:nvCxnSpPr>
+        <p:spPr>
+          <a:xfrm flipV="1">
+            <a:off x="5680727" y="3815238"/>
+            <a:ext cx="0" cy="170766"/>
+          </a:xfrm>
+          <a:prstGeom prst="straightConnector1">
+            <a:avLst/>
+          </a:prstGeom>
+          <a:ln>
+            <a:solidFill>
+              <a:srgbClr val="FF0000"/>
+            </a:solidFill>
+            <a:tailEnd type="arrow"/>
+          </a:ln>
+        </p:spPr>
+        <p:style>
+          <a:lnRef idx="2">
+            <a:schemeClr val="accent1"/>
+          </a:lnRef>
+          <a:fillRef idx="0">
+            <a:schemeClr val="accent1"/>
+          </a:fillRef>
+          <a:effectRef idx="1">
+            <a:schemeClr val="accent1"/>
+          </a:effectRef>
+          <a:fontRef idx="minor">
+            <a:schemeClr val="tx1"/>
+          </a:fontRef>
+        </p:style>
+      </p:cxnSp>
+      <p:sp>
+        <p:nvSpPr>
+          <p:cNvPr id="13" name="Title 1"/>
+          <p:cNvSpPr txBox="1">
+            <a:spLocks/>
+          </p:cNvSpPr>
+          <p:nvPr/>
+        </p:nvSpPr>
+        <p:spPr>
+          <a:xfrm>
+            <a:off x="4753072" y="3945165"/>
+            <a:ext cx="2384502" cy="280811"/>
+          </a:xfrm>
+          <a:prstGeom prst="rect">
+            <a:avLst/>
+          </a:prstGeom>
+        </p:spPr>
+        <p:txBody>
+          <a:bodyPr vert="horz" lIns="91440" tIns="45720" rIns="91440" bIns="45720" rtlCol="0" anchor="ctr">
+            <a:normAutofit/>
+          </a:bodyPr>
+          <a:lstStyle>
+            <a:lvl1pPr algn="ctr" defTabSz="457200" rtl="0" eaLnBrk="1" latinLnBrk="0" hangingPunct="1">
+              <a:spcBef>
+                <a:spcPct val="0"/>
+              </a:spcBef>
+              <a:buNone/>
+              <a:defRPr sz="4400" kern="1200">
+                <a:solidFill>
+                  <a:schemeClr val="tx1"/>
+                </a:solidFill>
+                <a:latin typeface="+mj-lt"/>
+                <a:ea typeface="+mj-ea"/>
+                <a:cs typeface="+mj-cs"/>
+              </a:defRPr>
+            </a:lvl1pPr>
+          </a:lstStyle>
+          <a:p>
+            <a:r>
+              <a:rPr lang="en-US" sz="1200" dirty="0" smtClean="0">
+                <a:solidFill>
+                  <a:srgbClr val="FF0000"/>
+                </a:solidFill>
+                <a:latin typeface="Arial Black"/>
+                <a:cs typeface="Arial Black"/>
+              </a:rPr>
+              <a:t>Centered at 0 </a:t>
+            </a:r>
+            <a:endParaRPr lang="en-US" sz="1200" dirty="0">
+              <a:solidFill>
+                <a:srgbClr val="FF0000"/>
+              </a:solidFill>
+              <a:latin typeface="Arial Black"/>
+              <a:cs typeface="Arial Black"/>
+            </a:endParaRPr>
+          </a:p>
+        </p:txBody>
+      </p:sp>
+      <p:cxnSp>
+        <p:nvCxnSpPr>
+          <p:cNvPr id="14" name="Straight Arrow Connector 13"/>
+          <p:cNvCxnSpPr/>
+          <p:nvPr/>
+        </p:nvCxnSpPr>
+        <p:spPr>
+          <a:xfrm flipV="1">
+            <a:off x="5751286" y="6338835"/>
+            <a:ext cx="0" cy="170766"/>
+          </a:xfrm>
+          <a:prstGeom prst="straightConnector1">
+            <a:avLst/>
+          </a:prstGeom>
+          <a:ln>
+            <a:solidFill>
+              <a:srgbClr val="FF0000"/>
+            </a:solidFill>
+            <a:tailEnd type="arrow"/>
+          </a:ln>
+        </p:spPr>
+        <p:style>
+          <a:lnRef idx="2">
+            <a:schemeClr val="accent1"/>
+          </a:lnRef>
+          <a:fillRef idx="0">
+            <a:schemeClr val="accent1"/>
+          </a:fillRef>
+          <a:effectRef idx="1">
+            <a:schemeClr val="accent1"/>
+          </a:effectRef>
+          <a:fontRef idx="minor">
+            <a:schemeClr val="tx1"/>
+          </a:fontRef>
+        </p:style>
+      </p:cxnSp>
+      <p:sp>
+        <p:nvSpPr>
+          <p:cNvPr id="15" name="Title 1"/>
+          <p:cNvSpPr txBox="1">
+            <a:spLocks/>
+          </p:cNvSpPr>
+          <p:nvPr/>
+        </p:nvSpPr>
+        <p:spPr>
+          <a:xfrm>
+            <a:off x="4823631" y="6468762"/>
+            <a:ext cx="2384502" cy="280811"/>
+          </a:xfrm>
+          <a:prstGeom prst="rect">
+            <a:avLst/>
+          </a:prstGeom>
+        </p:spPr>
+        <p:txBody>
+          <a:bodyPr vert="horz" lIns="91440" tIns="45720" rIns="91440" bIns="45720" rtlCol="0" anchor="ctr">
+            <a:normAutofit/>
+          </a:bodyPr>
+          <a:lstStyle>
+            <a:lvl1pPr algn="ctr" defTabSz="457200" rtl="0" eaLnBrk="1" latinLnBrk="0" hangingPunct="1">
+              <a:spcBef>
+                <a:spcPct val="0"/>
+              </a:spcBef>
+              <a:buNone/>
+              <a:defRPr sz="4400" kern="1200">
+                <a:solidFill>
+                  <a:schemeClr val="tx1"/>
+                </a:solidFill>
+                <a:latin typeface="+mj-lt"/>
+                <a:ea typeface="+mj-ea"/>
+                <a:cs typeface="+mj-cs"/>
+              </a:defRPr>
+            </a:lvl1pPr>
+          </a:lstStyle>
+          <a:p>
+            <a:r>
+              <a:rPr lang="en-US" sz="1200" dirty="0" smtClean="0">
+                <a:solidFill>
+                  <a:srgbClr val="FF0000"/>
+                </a:solidFill>
+                <a:latin typeface="Arial Black"/>
+                <a:cs typeface="Arial Black"/>
+              </a:rPr>
+              <a:t>Centered at 0 </a:t>
+            </a:r>
+            <a:endParaRPr lang="en-US" sz="1200" dirty="0">
+              <a:solidFill>
+                <a:srgbClr val="FF0000"/>
+              </a:solidFill>
+              <a:latin typeface="Arial Black"/>
+              <a:cs typeface="Arial Black"/>
+            </a:endParaRPr>
+          </a:p>
+        </p:txBody>
+      </p:sp>
+    </p:spTree>
+    <p:extLst>
+      <p:ext uri="{BB962C8B-B14F-4D97-AF65-F5344CB8AC3E}">
+        <p14:creationId xmlns:p14="http://schemas.microsoft.com/office/powerpoint/2010/main" val="3143394196"/>
+      </p:ext>
+    </p:extLst>
+  </p:cSld>
+  <p:clrMapOvr>
+    <a:masterClrMapping/>
+  </p:clrMapOvr>
+</p:sld>
+</file>
+
+<file path=ppt/slides/slide8.xml><?xml version="1.0" encoding="utf-8"?>
+<p:sld xmlns:a="http://schemas.openxmlformats.org/drawingml/2006/main" xmlns:r="http://schemas.openxmlformats.org/officeDocument/2006/relationships" xmlns:p="http://schemas.openxmlformats.org/presentationml/2006/main">
+  <p:cSld>
+    <p:spTree>
+      <p:nvGrpSpPr>
+        <p:cNvPr id="1" name=""/>
+        <p:cNvGrpSpPr/>
+        <p:nvPr/>
+      </p:nvGrpSpPr>
+      <p:grpSpPr>
+        <a:xfrm>
+          <a:off x="0" y="0"/>
+          <a:ext cx="0" cy="0"/>
+          <a:chOff x="0" y="0"/>
+          <a:chExt cx="0" cy="0"/>
+        </a:xfrm>
+      </p:grpSpPr>
+      <p:sp>
+        <p:nvSpPr>
+          <p:cNvPr id="2" name="Title 1"/>
+          <p:cNvSpPr>
+            <a:spLocks noGrp="1"/>
+          </p:cNvSpPr>
+          <p:nvPr>
+            <p:ph type="title"/>
+          </p:nvPr>
+        </p:nvSpPr>
+        <p:spPr>
+          <a:xfrm>
+            <a:off x="-34413" y="76199"/>
+            <a:ext cx="9059998" cy="1259935"/>
+          </a:xfrm>
+        </p:spPr>
+        <p:txBody>
+          <a:bodyPr>
+            <a:noAutofit/>
+          </a:bodyPr>
+          <a:lstStyle/>
+          <a:p>
+            <a:r>
+              <a:rPr lang="en-US" sz="3600" b="1" dirty="0" smtClean="0"/>
+              <a:t>This new normalization changes our results, </a:t>
+            </a:r>
+            <a:br>
+              <a:rPr lang="en-US" sz="3600" b="1" dirty="0" smtClean="0"/>
+            </a:br>
+            <a:r>
+              <a:rPr lang="en-US" sz="3600" b="1" dirty="0" smtClean="0"/>
+              <a:t>especially for </a:t>
+            </a:r>
+            <a:r>
+              <a:rPr lang="en-US" sz="3600" b="1" dirty="0" err="1" smtClean="0"/>
+              <a:t>AcpS</a:t>
+            </a:r>
+            <a:endParaRPr lang="en-US" sz="3600" b="1" dirty="0"/>
           </a:p>
         </p:txBody>
       </p:sp>
@@ -4185,8 +7465,8 @@
         </p:nvSpPr>
         <p:spPr>
           <a:xfrm>
-            <a:off x="228600" y="762000"/>
-            <a:ext cx="8229600" cy="4525963"/>
+            <a:off x="228599" y="1534082"/>
+            <a:ext cx="8796985" cy="5139130"/>
           </a:xfrm>
         </p:spPr>
         <p:txBody>
@@ -4199,287 +7479,175 @@
               <a:buNone/>
             </a:pPr>
             <a:r>
-              <a:rPr lang="en-US" sz="1400" b="1" u="sng" dirty="0" smtClean="0"/>
+              <a:rPr lang="en-US" sz="2400" b="1" u="sng" dirty="0" smtClean="0"/>
               <a:t>LABELING RESULTS</a:t>
             </a:r>
             <a:r>
-              <a:rPr lang="en-US" sz="1400" b="1" dirty="0" smtClean="0"/>
+              <a:rPr lang="en-US" sz="2400" b="1" dirty="0" smtClean="0"/>
               <a:t>:</a:t>
             </a:r>
           </a:p>
           <a:p>
+            <a:r>
+              <a:rPr lang="en-US" sz="2400" dirty="0" err="1" smtClean="0"/>
+              <a:t>Sfp</a:t>
+            </a:r>
+            <a:r>
+              <a:rPr lang="en-US" sz="2400" dirty="0" smtClean="0"/>
+              <a:t>: 46 peptides </a:t>
+            </a:r>
+            <a:r>
+              <a:rPr lang="en-US" sz="2400" dirty="0"/>
+              <a:t>were </a:t>
+            </a:r>
+            <a:r>
+              <a:rPr lang="en-US" sz="2400" dirty="0" smtClean="0"/>
+              <a:t>specifically labeled by </a:t>
+            </a:r>
+            <a:r>
+              <a:rPr lang="en-US" sz="2400" dirty="0" err="1" smtClean="0"/>
+              <a:t>Sfp</a:t>
+            </a:r>
+            <a:r>
+              <a:rPr lang="en-US" sz="2400" dirty="0" smtClean="0"/>
+              <a:t>. </a:t>
+            </a:r>
+          </a:p>
+          <a:p>
+            <a:pPr lvl="2"/>
+            <a:r>
+              <a:rPr lang="en-US" sz="1600" dirty="0" smtClean="0"/>
+              <a:t>[vs. 60 under the old normalization]</a:t>
+            </a:r>
+            <a:endParaRPr lang="en-US" sz="1600" dirty="0"/>
+          </a:p>
+          <a:p>
+            <a:r>
+              <a:rPr lang="en-US" sz="2400" b="1" dirty="0" err="1" smtClean="0"/>
+              <a:t>AcpS</a:t>
+            </a:r>
+            <a:r>
+              <a:rPr lang="en-US" sz="2400" b="1" dirty="0" smtClean="0"/>
+              <a:t>: 38 peptides </a:t>
+            </a:r>
+            <a:r>
+              <a:rPr lang="en-US" sz="2400" b="1" dirty="0" smtClean="0"/>
+              <a:t>were specifically labeled by </a:t>
+            </a:r>
+            <a:r>
+              <a:rPr lang="en-US" sz="2400" b="1" dirty="0" err="1" smtClean="0"/>
+              <a:t>AcpS</a:t>
+            </a:r>
+            <a:r>
+              <a:rPr lang="en-US" sz="2400" dirty="0" smtClean="0"/>
+              <a:t>. </a:t>
+            </a:r>
+            <a:endParaRPr lang="en-US" sz="2400" dirty="0" smtClean="0"/>
+          </a:p>
+          <a:p>
+            <a:pPr lvl="2"/>
+            <a:r>
+              <a:rPr lang="en-US" sz="1600" dirty="0" smtClean="0"/>
+              <a:t>[vs. 7 under the old normalization]</a:t>
+            </a:r>
+            <a:endParaRPr lang="en-US" sz="1600" dirty="0" smtClean="0"/>
+          </a:p>
+          <a:p>
+            <a:pPr marL="457200" lvl="1" indent="0">
+              <a:buNone/>
+            </a:pPr>
+            <a:endParaRPr lang="en-US" sz="2400" dirty="0" smtClean="0"/>
+          </a:p>
+          <a:p>
             <a:pPr marL="0" indent="0">
               <a:buNone/>
             </a:pPr>
             <a:r>
-              <a:rPr lang="en-US" sz="1400" dirty="0" err="1"/>
+              <a:rPr lang="en-US" sz="2400" b="1" u="sng" dirty="0" smtClean="0"/>
+              <a:t>UNLABELING RESULTS</a:t>
+            </a:r>
+            <a:r>
+              <a:rPr lang="en-US" sz="2400" b="1" dirty="0" smtClean="0"/>
+              <a:t>:</a:t>
+            </a:r>
+          </a:p>
+          <a:p>
+            <a:r>
+              <a:rPr lang="en-US" sz="2400" dirty="0" err="1" smtClean="0"/>
+              <a:t>Sfp</a:t>
+            </a:r>
+            <a:r>
+              <a:rPr lang="en-US" sz="2400" dirty="0" smtClean="0"/>
+              <a:t>: 23 peptides </a:t>
+            </a:r>
+            <a:r>
+              <a:rPr lang="en-US" sz="2400" dirty="0"/>
+              <a:t>specifically labeled by </a:t>
+            </a:r>
+            <a:r>
+              <a:rPr lang="en-US" sz="2400" dirty="0" err="1"/>
+              <a:t>Sfp</a:t>
+            </a:r>
+            <a:r>
+              <a:rPr lang="en-US" sz="2400" dirty="0"/>
+              <a:t> </a:t>
+            </a:r>
+            <a:r>
+              <a:rPr lang="en-US" sz="2400" dirty="0" smtClean="0"/>
+              <a:t>were unlabeled. </a:t>
+            </a:r>
+          </a:p>
+          <a:p>
+            <a:pPr lvl="2"/>
+            <a:r>
+              <a:rPr lang="en-US" sz="1600" dirty="0" smtClean="0"/>
+              <a:t>[vs. 41 under the old normalization]</a:t>
+            </a:r>
+            <a:endParaRPr lang="en-US" sz="1600" dirty="0"/>
+          </a:p>
+          <a:p>
+            <a:r>
+              <a:rPr lang="en-US" sz="2400" b="1" dirty="0" err="1" smtClean="0"/>
               <a:t>AcpS</a:t>
             </a:r>
             <a:r>
-              <a:rPr lang="en-US" sz="1400" dirty="0"/>
-              <a:t> labeling results</a:t>
-            </a:r>
-            <a:r>
-              <a:rPr lang="en-US" sz="1400" dirty="0" smtClean="0"/>
-              <a:t>:</a:t>
-            </a:r>
-          </a:p>
-          <a:p>
-            <a:r>
-              <a:rPr lang="en-US" sz="1400" dirty="0" smtClean="0"/>
-              <a:t>38 total peptides were specifically labeled by </a:t>
-            </a:r>
-            <a:r>
-              <a:rPr lang="en-US" sz="1400" dirty="0" err="1" smtClean="0"/>
+              <a:rPr lang="en-US" sz="2400" b="1" dirty="0" smtClean="0"/>
+              <a:t>: 4 peptides </a:t>
+            </a:r>
+            <a:r>
+              <a:rPr lang="en-US" sz="2400" b="1" dirty="0" smtClean="0"/>
+              <a:t>specifically labeled by </a:t>
+            </a:r>
+            <a:r>
+              <a:rPr lang="en-US" sz="2400" b="1" dirty="0" err="1" smtClean="0"/>
               <a:t>AcpS</a:t>
             </a:r>
             <a:r>
-              <a:rPr lang="en-US" sz="1400" dirty="0" smtClean="0"/>
-              <a:t>. </a:t>
-            </a:r>
-          </a:p>
-          <a:p>
-            <a:pPr lvl="1"/>
-            <a:r>
-              <a:rPr lang="en-US" sz="1400" dirty="0" smtClean="0"/>
-              <a:t>12 predicted </a:t>
-            </a:r>
-            <a:r>
-              <a:rPr lang="en-US" sz="1400" dirty="0" err="1" smtClean="0"/>
-              <a:t>AcpS</a:t>
-            </a:r>
-            <a:r>
-              <a:rPr lang="en-US" sz="1400" dirty="0" smtClean="0"/>
-              <a:t> peptides </a:t>
-            </a:r>
-          </a:p>
-          <a:p>
-            <a:pPr lvl="1"/>
-            <a:r>
-              <a:rPr lang="en-US" sz="1400" dirty="0" smtClean="0"/>
-              <a:t>22 predicted </a:t>
-            </a:r>
-            <a:r>
-              <a:rPr lang="en-US" sz="1400" dirty="0" err="1" smtClean="0"/>
-              <a:t>Sfp</a:t>
-            </a:r>
-            <a:r>
-              <a:rPr lang="en-US" sz="1400" dirty="0" smtClean="0"/>
-              <a:t> peptides </a:t>
-            </a:r>
-            <a:endParaRPr lang="en-US" sz="1400" dirty="0"/>
+              <a:rPr lang="en-US" sz="2400" b="1" dirty="0" smtClean="0"/>
+              <a:t> were </a:t>
+            </a:r>
+            <a:r>
+              <a:rPr lang="en-US" sz="2400" b="1" dirty="0" smtClean="0"/>
+              <a:t>unlabeled.</a:t>
+            </a:r>
+            <a:r>
+              <a:rPr lang="en-US" sz="2400" dirty="0" smtClean="0"/>
+              <a:t> </a:t>
+            </a:r>
+          </a:p>
+          <a:p>
+            <a:pPr lvl="2"/>
+            <a:r>
+              <a:rPr lang="en-US" sz="1600" dirty="0" smtClean="0"/>
+              <a:t>[vs. 0 under the old normalization] </a:t>
+            </a:r>
+            <a:endParaRPr lang="en-US" sz="1600" dirty="0" smtClean="0"/>
           </a:p>
           <a:p>
             <a:pPr marL="0" indent="0">
-              <a:buNone/>
-            </a:pPr>
-            <a:r>
-              <a:rPr lang="en-US" sz="1400" dirty="0" err="1" smtClean="0"/>
-              <a:t>Sfp</a:t>
-            </a:r>
-            <a:r>
-              <a:rPr lang="en-US" sz="1400" dirty="0" smtClean="0"/>
-              <a:t> labeling results:</a:t>
-            </a:r>
-          </a:p>
-          <a:p>
-            <a:r>
-              <a:rPr lang="en-US" sz="1400" dirty="0" smtClean="0"/>
-              <a:t>46 total peptides were labeled.</a:t>
-            </a:r>
-          </a:p>
-          <a:p>
-            <a:pPr lvl="1"/>
-            <a:r>
-              <a:rPr lang="en-US" sz="1400" dirty="0" smtClean="0"/>
-              <a:t>11 </a:t>
-            </a:r>
-            <a:r>
-              <a:rPr lang="en-US" sz="1400" dirty="0" err="1" smtClean="0"/>
-              <a:t>Sfp</a:t>
-            </a:r>
-            <a:r>
-              <a:rPr lang="en-US" sz="1400" dirty="0" smtClean="0"/>
-              <a:t> predicted peptides </a:t>
-            </a:r>
-          </a:p>
-          <a:p>
-            <a:pPr lvl="1"/>
-            <a:r>
-              <a:rPr lang="en-US" sz="1400" dirty="0" smtClean="0"/>
-              <a:t>33 </a:t>
-            </a:r>
-            <a:r>
-              <a:rPr lang="en-US" sz="1400" dirty="0" err="1" smtClean="0"/>
-              <a:t>AcpS</a:t>
-            </a:r>
-            <a:r>
-              <a:rPr lang="en-US" sz="1400" dirty="0" smtClean="0"/>
-              <a:t> predicted peptides </a:t>
-            </a:r>
-          </a:p>
-          <a:p>
-            <a:pPr marL="457200" lvl="1" indent="0">
               <a:buNone/>
             </a:pPr>
             <a:endParaRPr lang="en-US" sz="1400" dirty="0" smtClean="0"/>
-          </a:p>
-          <a:p>
-            <a:pPr marL="0" indent="0">
-              <a:buNone/>
-            </a:pPr>
-            <a:r>
-              <a:rPr lang="en-US" sz="1400" b="1" u="sng" dirty="0" smtClean="0"/>
-              <a:t>UNLABELING RESULTS</a:t>
-            </a:r>
-            <a:r>
-              <a:rPr lang="en-US" sz="1400" b="1" dirty="0" smtClean="0"/>
-              <a:t>:</a:t>
-            </a:r>
-          </a:p>
-          <a:p>
-            <a:pPr marL="0" indent="0">
-              <a:buNone/>
-            </a:pPr>
-            <a:r>
-              <a:rPr lang="en-US" sz="1400" dirty="0" err="1" smtClean="0"/>
-              <a:t>AcpS</a:t>
-            </a:r>
-            <a:r>
-              <a:rPr lang="en-US" sz="1400" dirty="0" smtClean="0"/>
-              <a:t> </a:t>
-            </a:r>
-            <a:r>
-              <a:rPr lang="en-US" sz="1400" dirty="0" err="1" smtClean="0"/>
-              <a:t>unlabeling</a:t>
-            </a:r>
-            <a:r>
-              <a:rPr lang="en-US" sz="1400" dirty="0" smtClean="0"/>
-              <a:t>:</a:t>
-            </a:r>
-          </a:p>
-          <a:p>
-            <a:r>
-              <a:rPr lang="en-US" sz="1400" dirty="0"/>
-              <a:t>4</a:t>
-            </a:r>
-            <a:r>
-              <a:rPr lang="en-US" sz="1400" dirty="0" smtClean="0"/>
-              <a:t> total peptides specifically labeled by </a:t>
-            </a:r>
-            <a:r>
-              <a:rPr lang="en-US" sz="1400" dirty="0" err="1" smtClean="0"/>
-              <a:t>AcpS</a:t>
-            </a:r>
-            <a:r>
-              <a:rPr lang="en-US" sz="1400" dirty="0" smtClean="0"/>
-              <a:t> were unlabeled. </a:t>
-            </a:r>
-          </a:p>
-          <a:p>
-            <a:pPr lvl="1"/>
-            <a:r>
-              <a:rPr lang="en-US" sz="1400" dirty="0" smtClean="0"/>
-              <a:t>2 predicted </a:t>
-            </a:r>
-            <a:r>
-              <a:rPr lang="en-US" sz="1400" dirty="0" err="1" smtClean="0"/>
-              <a:t>AcpS</a:t>
-            </a:r>
-            <a:r>
-              <a:rPr lang="en-US" sz="1400" dirty="0" smtClean="0"/>
-              <a:t> peptides </a:t>
-            </a:r>
-          </a:p>
-          <a:p>
-            <a:pPr lvl="1"/>
-            <a:r>
-              <a:rPr lang="en-US" sz="1400" dirty="0" smtClean="0"/>
-              <a:t>1 predicted </a:t>
-            </a:r>
-            <a:r>
-              <a:rPr lang="en-US" sz="1400" dirty="0" err="1" smtClean="0"/>
-              <a:t>Sfp</a:t>
-            </a:r>
-            <a:r>
-              <a:rPr lang="en-US" sz="1400" dirty="0" smtClean="0"/>
-              <a:t> peptides </a:t>
-            </a:r>
-          </a:p>
-          <a:p>
-            <a:pPr marL="0" indent="0">
-              <a:buNone/>
-            </a:pPr>
-            <a:endParaRPr lang="en-US" sz="1400" dirty="0" smtClean="0"/>
-          </a:p>
-          <a:p>
-            <a:pPr marL="0" indent="0">
-              <a:buNone/>
-            </a:pPr>
-            <a:r>
-              <a:rPr lang="en-US" sz="1400" dirty="0" err="1" smtClean="0"/>
-              <a:t>Sfp</a:t>
-            </a:r>
-            <a:r>
-              <a:rPr lang="en-US" sz="1400" dirty="0" smtClean="0"/>
-              <a:t> </a:t>
-            </a:r>
-            <a:r>
-              <a:rPr lang="en-US" sz="1400" dirty="0" err="1" smtClean="0"/>
-              <a:t>Unlabeling</a:t>
-            </a:r>
-            <a:r>
-              <a:rPr lang="en-US" sz="1400" dirty="0" smtClean="0"/>
-              <a:t>:</a:t>
-            </a:r>
-          </a:p>
-          <a:p>
-            <a:r>
-              <a:rPr lang="en-US" sz="1400" dirty="0" smtClean="0"/>
-              <a:t>23 total peptides specifically labeled by </a:t>
-            </a:r>
-            <a:r>
-              <a:rPr lang="en-US" sz="1400" dirty="0" err="1" smtClean="0"/>
-              <a:t>Sfp</a:t>
-            </a:r>
-            <a:r>
-              <a:rPr lang="en-US" sz="1400" dirty="0" smtClean="0"/>
-              <a:t> were unlabeled.</a:t>
-            </a:r>
-          </a:p>
-          <a:p>
-            <a:pPr lvl="1"/>
-            <a:r>
-              <a:rPr lang="en-US" sz="1400" dirty="0"/>
-              <a:t>7</a:t>
-            </a:r>
-            <a:r>
-              <a:rPr lang="en-US" sz="1400" dirty="0" smtClean="0"/>
-              <a:t> </a:t>
-            </a:r>
-            <a:r>
-              <a:rPr lang="en-US" sz="1400" dirty="0" err="1" smtClean="0"/>
-              <a:t>Sfp</a:t>
-            </a:r>
-            <a:r>
-              <a:rPr lang="en-US" sz="1400" dirty="0" smtClean="0"/>
-              <a:t> predicted peptides </a:t>
-            </a:r>
-          </a:p>
-          <a:p>
-            <a:pPr lvl="1"/>
-            <a:r>
-              <a:rPr lang="en-US" sz="1400" dirty="0" smtClean="0"/>
-              <a:t>16 </a:t>
-            </a:r>
-            <a:r>
-              <a:rPr lang="en-US" sz="1400" dirty="0" err="1" smtClean="0"/>
-              <a:t>AcpS</a:t>
-            </a:r>
-            <a:r>
-              <a:rPr lang="en-US" sz="1400" dirty="0" smtClean="0"/>
-              <a:t> predicted peptides </a:t>
-            </a:r>
           </a:p>
           <a:p>
             <a:pPr marL="0" indent="0">

</xml_diff>

<commit_message>
Updating the slides to include numbers on # from Sfp predictions, vs. # from AcpS predictions.  I still wonder whether we flipped the labels, calling things Sfp predictions that were really AcpS predictions.
</commit_message>
<xml_diff>
--- a/presentations/orthogonal_peptide_result_analysis.pptx
+++ b/presentations/orthogonal_peptide_result_analysis.pptx
@@ -5,7 +5,7 @@
     <p:sldMasterId id="2147483648" r:id="rId1"/>
   </p:sldMasterIdLst>
   <p:notesMasterIdLst>
-    <p:notesMasterId r:id="rId10"/>
+    <p:notesMasterId r:id="rId11"/>
   </p:notesMasterIdLst>
   <p:sldIdLst>
     <p:sldId id="259" r:id="rId2"/>
@@ -15,7 +15,8 @@
     <p:sldId id="258" r:id="rId6"/>
     <p:sldId id="267" r:id="rId7"/>
     <p:sldId id="260" r:id="rId8"/>
-    <p:sldId id="257" r:id="rId9"/>
+    <p:sldId id="268" r:id="rId9"/>
+    <p:sldId id="269" r:id="rId10"/>
   </p:sldIdLst>
   <p:sldSz cx="9144000" cy="6858000" type="screen4x3"/>
   <p:notesSz cx="6858000" cy="9144000"/>
@@ -199,7 +200,7 @@
           <a:p>
             <a:fld id="{84BF6C2F-DF77-C34A-A82B-BED468695B2C}" type="datetimeFigureOut">
               <a:rPr lang="en-US" smtClean="0"/>
-              <a:t>5/28/14</a:t>
+              <a:t>5/29/14</a:t>
             </a:fld>
             <a:endParaRPr lang="en-US"/>
           </a:p>
@@ -551,6 +552,90 @@
 </p:notes>
 </file>
 
+<file path=ppt/notesSlides/notesSlide2.xml><?xml version="1.0" encoding="utf-8"?>
+<p:notes xmlns:a="http://schemas.openxmlformats.org/drawingml/2006/main" xmlns:r="http://schemas.openxmlformats.org/officeDocument/2006/relationships" xmlns:p="http://schemas.openxmlformats.org/presentationml/2006/main">
+  <p:cSld>
+    <p:spTree>
+      <p:nvGrpSpPr>
+        <p:cNvPr id="1" name=""/>
+        <p:cNvGrpSpPr/>
+        <p:nvPr/>
+      </p:nvGrpSpPr>
+      <p:grpSpPr>
+        <a:xfrm>
+          <a:off x="0" y="0"/>
+          <a:ext cx="0" cy="0"/>
+          <a:chOff x="0" y="0"/>
+          <a:chExt cx="0" cy="0"/>
+        </a:xfrm>
+      </p:grpSpPr>
+      <p:sp>
+        <p:nvSpPr>
+          <p:cNvPr id="2" name="Slide Image Placeholder 1"/>
+          <p:cNvSpPr>
+            <a:spLocks noGrp="1" noRot="1" noChangeAspect="1"/>
+          </p:cNvSpPr>
+          <p:nvPr>
+            <p:ph type="sldImg"/>
+          </p:nvPr>
+        </p:nvSpPr>
+        <p:spPr/>
+      </p:sp>
+      <p:sp>
+        <p:nvSpPr>
+          <p:cNvPr id="3" name="Notes Placeholder 2"/>
+          <p:cNvSpPr>
+            <a:spLocks noGrp="1"/>
+          </p:cNvSpPr>
+          <p:nvPr>
+            <p:ph type="body" idx="1"/>
+          </p:nvPr>
+        </p:nvSpPr>
+        <p:spPr/>
+        <p:txBody>
+          <a:bodyPr/>
+          <a:lstStyle/>
+          <a:p>
+            <a:endParaRPr lang="en-US" dirty="0"/>
+          </a:p>
+        </p:txBody>
+      </p:sp>
+      <p:sp>
+        <p:nvSpPr>
+          <p:cNvPr id="4" name="Slide Number Placeholder 3"/>
+          <p:cNvSpPr>
+            <a:spLocks noGrp="1"/>
+          </p:cNvSpPr>
+          <p:nvPr>
+            <p:ph type="sldNum" sz="quarter" idx="10"/>
+          </p:nvPr>
+        </p:nvSpPr>
+        <p:spPr/>
+        <p:txBody>
+          <a:bodyPr/>
+          <a:lstStyle/>
+          <a:p>
+            <a:fld id="{C1BCBD6C-3953-C346-861F-2E605B8E2A68}" type="slidenum">
+              <a:rPr lang="en-US" smtClean="0"/>
+              <a:t>9</a:t>
+            </a:fld>
+            <a:endParaRPr lang="en-US"/>
+          </a:p>
+        </p:txBody>
+      </p:sp>
+    </p:spTree>
+    <p:extLst>
+      <p:ext uri="{BB962C8B-B14F-4D97-AF65-F5344CB8AC3E}">
+        <p14:creationId xmlns:p14="http://schemas.microsoft.com/office/powerpoint/2010/main" val="4209147487"/>
+      </p:ext>
+    </p:extLst>
+  </p:cSld>
+  <p:clrMapOvr>
+    <a:masterClrMapping/>
+  </p:clrMapOvr>
+</p:notes>
+</file>
+
 <file path=ppt/slideLayouts/slideLayout1.xml><?xml version="1.0" encoding="utf-8"?>
 <p:sldLayout xmlns:a="http://schemas.openxmlformats.org/drawingml/2006/main" xmlns:r="http://schemas.openxmlformats.org/officeDocument/2006/relationships" xmlns:p="http://schemas.openxmlformats.org/presentationml/2006/main" type="title" preserve="1">
   <p:cSld name="Title Slide">
@@ -732,7 +817,7 @@
           <a:p>
             <a:fld id="{49F69E76-29D0-0646-B747-39A961FBAF0E}" type="datetimeFigureOut">
               <a:rPr lang="en-US" smtClean="0"/>
-              <a:t>5/28/14</a:t>
+              <a:t>5/29/14</a:t>
             </a:fld>
             <a:endParaRPr lang="en-US"/>
           </a:p>
@@ -902,7 +987,7 @@
           <a:p>
             <a:fld id="{49F69E76-29D0-0646-B747-39A961FBAF0E}" type="datetimeFigureOut">
               <a:rPr lang="en-US" smtClean="0"/>
-              <a:t>5/28/14</a:t>
+              <a:t>5/29/14</a:t>
             </a:fld>
             <a:endParaRPr lang="en-US"/>
           </a:p>
@@ -1082,7 +1167,7 @@
           <a:p>
             <a:fld id="{49F69E76-29D0-0646-B747-39A961FBAF0E}" type="datetimeFigureOut">
               <a:rPr lang="en-US" smtClean="0"/>
-              <a:t>5/28/14</a:t>
+              <a:t>5/29/14</a:t>
             </a:fld>
             <a:endParaRPr lang="en-US"/>
           </a:p>
@@ -1252,7 +1337,7 @@
           <a:p>
             <a:fld id="{49F69E76-29D0-0646-B747-39A961FBAF0E}" type="datetimeFigureOut">
               <a:rPr lang="en-US" smtClean="0"/>
-              <a:t>5/28/14</a:t>
+              <a:t>5/29/14</a:t>
             </a:fld>
             <a:endParaRPr lang="en-US"/>
           </a:p>
@@ -1498,7 +1583,7 @@
           <a:p>
             <a:fld id="{49F69E76-29D0-0646-B747-39A961FBAF0E}" type="datetimeFigureOut">
               <a:rPr lang="en-US" smtClean="0"/>
-              <a:t>5/28/14</a:t>
+              <a:t>5/29/14</a:t>
             </a:fld>
             <a:endParaRPr lang="en-US"/>
           </a:p>
@@ -1786,7 +1871,7 @@
           <a:p>
             <a:fld id="{49F69E76-29D0-0646-B747-39A961FBAF0E}" type="datetimeFigureOut">
               <a:rPr lang="en-US" smtClean="0"/>
-              <a:t>5/28/14</a:t>
+              <a:t>5/29/14</a:t>
             </a:fld>
             <a:endParaRPr lang="en-US"/>
           </a:p>
@@ -2208,7 +2293,7 @@
           <a:p>
             <a:fld id="{49F69E76-29D0-0646-B747-39A961FBAF0E}" type="datetimeFigureOut">
               <a:rPr lang="en-US" smtClean="0"/>
-              <a:t>5/28/14</a:t>
+              <a:t>5/29/14</a:t>
             </a:fld>
             <a:endParaRPr lang="en-US"/>
           </a:p>
@@ -2326,7 +2411,7 @@
           <a:p>
             <a:fld id="{49F69E76-29D0-0646-B747-39A961FBAF0E}" type="datetimeFigureOut">
               <a:rPr lang="en-US" smtClean="0"/>
-              <a:t>5/28/14</a:t>
+              <a:t>5/29/14</a:t>
             </a:fld>
             <a:endParaRPr lang="en-US"/>
           </a:p>
@@ -2421,7 +2506,7 @@
           <a:p>
             <a:fld id="{49F69E76-29D0-0646-B747-39A961FBAF0E}" type="datetimeFigureOut">
               <a:rPr lang="en-US" smtClean="0"/>
-              <a:t>5/28/14</a:t>
+              <a:t>5/29/14</a:t>
             </a:fld>
             <a:endParaRPr lang="en-US"/>
           </a:p>
@@ -2698,7 +2783,7 @@
           <a:p>
             <a:fld id="{49F69E76-29D0-0646-B747-39A961FBAF0E}" type="datetimeFigureOut">
               <a:rPr lang="en-US" smtClean="0"/>
-              <a:t>5/28/14</a:t>
+              <a:t>5/29/14</a:t>
             </a:fld>
             <a:endParaRPr lang="en-US"/>
           </a:p>
@@ -2951,7 +3036,7 @@
           <a:p>
             <a:fld id="{49F69E76-29D0-0646-B747-39A961FBAF0E}" type="datetimeFigureOut">
               <a:rPr lang="en-US" smtClean="0"/>
-              <a:t>5/28/14</a:t>
+              <a:t>5/29/14</a:t>
             </a:fld>
             <a:endParaRPr lang="en-US"/>
           </a:p>
@@ -3164,7 +3249,7 @@
           <a:p>
             <a:fld id="{49F69E76-29D0-0646-B747-39A961FBAF0E}" type="datetimeFigureOut">
               <a:rPr lang="en-US" smtClean="0"/>
-              <a:t>5/28/14</a:t>
+              <a:t>5/29/14</a:t>
             </a:fld>
             <a:endParaRPr lang="en-US"/>
           </a:p>
@@ -4633,11 +4718,7 @@
             </a:r>
             <a:r>
               <a:rPr lang="en-US" dirty="0"/>
-              <a:t>763.514</a:t>
-            </a:r>
-            <a:r>
-              <a:rPr lang="en-US" dirty="0"/>
-              <a:t> </a:t>
+              <a:t>763.514 </a:t>
             </a:r>
             <a:endParaRPr lang="en-US" dirty="0" smtClean="0"/>
           </a:p>
@@ -4860,14 +4941,7 @@
                 <a:latin typeface="Arial Black"/>
                 <a:cs typeface="Arial Black"/>
               </a:rPr>
-              <a:t>Using the </a:t>
-            </a:r>
-            <a:r>
-              <a:rPr lang="en-US" sz="2000" dirty="0" smtClean="0">
-                <a:latin typeface="Arial Black"/>
-                <a:cs typeface="Arial Black"/>
-              </a:rPr>
-              <a:t>previous normalization method, </a:t>
+              <a:t>Using the previous normalization method, </a:t>
             </a:r>
             <a:br>
               <a:rPr lang="en-US" sz="2000" dirty="0" smtClean="0">
@@ -4955,14 +5029,7 @@
                 <a:latin typeface="Arial Black"/>
                 <a:cs typeface="Arial Black"/>
               </a:rPr>
-              <a:t>).</a:t>
-            </a:r>
-            <a:r>
-              <a:rPr lang="en-US" sz="2000" dirty="0" smtClean="0">
-                <a:latin typeface="Arial Black"/>
-                <a:cs typeface="Arial Black"/>
-              </a:rPr>
-              <a:t> </a:t>
+              <a:t>). </a:t>
             </a:r>
             <a:endParaRPr lang="en-US" sz="2000" dirty="0">
               <a:latin typeface="Arial Black"/>
@@ -5907,9 +5974,6 @@
               </a:rPr>
               <a:t> labels few.</a:t>
             </a:r>
-            <a:endParaRPr lang="en-US" dirty="0" smtClean="0">
-              <a:cs typeface="Arial Black"/>
-            </a:endParaRPr>
           </a:p>
           <a:p>
             <a:r>
@@ -6047,15 +6111,7 @@
             </a:pPr>
             <a:r>
               <a:rPr lang="en-US" dirty="0" smtClean="0"/>
-              <a:t>The core idea of our </a:t>
-            </a:r>
-            <a:r>
-              <a:rPr lang="en-US" dirty="0" smtClean="0"/>
-              <a:t>renormalization method is</a:t>
-            </a:r>
-            <a:r>
-              <a:rPr lang="en-US" dirty="0" smtClean="0"/>
-              <a:t>:</a:t>
+              <a:t>The core idea of our renormalization method is:</a:t>
             </a:r>
           </a:p>
           <a:p>
@@ -6064,15 +6120,7 @@
             </a:pPr>
             <a:r>
               <a:rPr lang="en-US" dirty="0" smtClean="0"/>
-              <a:t>Using a normal distribution, fit a mean </a:t>
-            </a:r>
-            <a:r>
-              <a:rPr lang="en-US" dirty="0" smtClean="0"/>
-              <a:t>and standard deviation for the background </a:t>
-            </a:r>
-            <a:r>
-              <a:rPr lang="en-US" dirty="0" smtClean="0"/>
-              <a:t>light intensity for each of the four sets of experiments.</a:t>
+              <a:t>Using a normal distribution, fit a mean and standard deviation for the background light intensity for each of the four sets of experiments.</a:t>
             </a:r>
           </a:p>
           <a:p>
@@ -6081,27 +6129,7 @@
             </a:pPr>
             <a:r>
               <a:rPr lang="en-US" dirty="0" smtClean="0"/>
-              <a:t>Normalize </a:t>
-            </a:r>
-            <a:r>
-              <a:rPr lang="en-US" dirty="0" smtClean="0"/>
-              <a:t>the light </a:t>
-            </a:r>
-            <a:r>
-              <a:rPr lang="en-US" dirty="0" smtClean="0"/>
-              <a:t>intensity to </a:t>
-            </a:r>
-            <a:r>
-              <a:rPr lang="en-US" dirty="0" smtClean="0"/>
-              <a:t>the standard </a:t>
-            </a:r>
-            <a:r>
-              <a:rPr lang="en-US" dirty="0" smtClean="0"/>
-              <a:t>normal </a:t>
-            </a:r>
-            <a:r>
-              <a:rPr lang="en-US" dirty="0" smtClean="0"/>
-              <a:t>scale.  This puts the four sets of experiments on the same scale.</a:t>
+              <a:t>Normalize the light intensity to the standard normal scale.  This puts the four sets of experiments on the same scale.</a:t>
             </a:r>
             <a:endParaRPr lang="en-US" dirty="0"/>
           </a:p>
@@ -6812,21 +6840,7 @@
                 <a:latin typeface="Arial Black"/>
                 <a:cs typeface="Arial Black"/>
               </a:rPr>
-              <a:t>Histogram plot </a:t>
-            </a:r>
-            <a:r>
-              <a:rPr lang="en-US" sz="3200" dirty="0" smtClean="0">
-                <a:latin typeface="Arial Black"/>
-                <a:cs typeface="Arial Black"/>
-              </a:rPr>
-              <a:t>after </a:t>
-            </a:r>
-            <a:r>
-              <a:rPr lang="en-US" sz="3200" dirty="0" smtClean="0">
-                <a:latin typeface="Arial Black"/>
-                <a:cs typeface="Arial Black"/>
-              </a:rPr>
-              <a:t>normalization: </a:t>
+              <a:t>Histogram plot after normalization: </a:t>
             </a:r>
             <a:br>
               <a:rPr lang="en-US" sz="3200" dirty="0" smtClean="0">
@@ -7414,18 +7428,18 @@
       </p:grpSpPr>
       <p:sp>
         <p:nvSpPr>
-          <p:cNvPr id="2" name="Title 1"/>
+          <p:cNvPr id="3" name="Content Placeholder 2"/>
           <p:cNvSpPr>
             <a:spLocks noGrp="1"/>
           </p:cNvSpPr>
           <p:nvPr>
-            <p:ph type="title"/>
-          </p:nvPr>
-        </p:nvSpPr>
-        <p:spPr>
-          <a:xfrm>
-            <a:off x="-34413" y="76199"/>
-            <a:ext cx="9059998" cy="1259935"/>
+            <p:ph idx="1"/>
+          </p:nvPr>
+        </p:nvSpPr>
+        <p:spPr>
+          <a:xfrm>
+            <a:off x="377048" y="1368204"/>
+            <a:ext cx="8229600" cy="5774343"/>
           </a:xfrm>
         </p:spPr>
         <p:txBody>
@@ -7434,9 +7448,414 @@
           </a:bodyPr>
           <a:lstStyle/>
           <a:p>
+            <a:pPr marL="0" indent="0">
+              <a:buNone/>
+            </a:pPr>
+            <a:r>
+              <a:rPr lang="en-US" sz="1400" b="1" u="sng" dirty="0" smtClean="0"/>
+              <a:t>LABELING RESULTS</a:t>
+            </a:r>
+            <a:r>
+              <a:rPr lang="en-US" sz="1400" b="1" dirty="0" smtClean="0"/>
+              <a:t>:</a:t>
+            </a:r>
+          </a:p>
+          <a:p>
+            <a:pPr marL="0" indent="0">
+              <a:buNone/>
+            </a:pPr>
+            <a:r>
+              <a:rPr lang="en-US" sz="1400" dirty="0" err="1"/>
+              <a:t>Sfp</a:t>
+            </a:r>
+            <a:r>
+              <a:rPr lang="en-US" sz="1400" dirty="0"/>
+              <a:t> labeling results:</a:t>
+            </a:r>
+          </a:p>
+          <a:p>
+            <a:r>
+              <a:rPr lang="en-US" sz="1400" dirty="0"/>
+              <a:t>46 </a:t>
+            </a:r>
+            <a:r>
+              <a:rPr lang="en-US" sz="1400" dirty="0" smtClean="0"/>
+              <a:t>peptides </a:t>
+            </a:r>
+            <a:r>
+              <a:rPr lang="en-US" sz="1400" dirty="0"/>
+              <a:t>were specifically labeled by </a:t>
+            </a:r>
+            <a:r>
+              <a:rPr lang="en-US" sz="1400" dirty="0" err="1"/>
+              <a:t>Sfp</a:t>
+            </a:r>
+            <a:r>
+              <a:rPr lang="en-US" sz="1400" dirty="0"/>
+              <a:t>.</a:t>
+            </a:r>
+          </a:p>
+          <a:p>
+            <a:pPr lvl="1"/>
+            <a:r>
+              <a:rPr lang="en-US" sz="1400" dirty="0" smtClean="0"/>
+              <a:t>11/46 were </a:t>
+            </a:r>
+            <a:r>
+              <a:rPr lang="en-US" sz="1400" dirty="0" err="1"/>
+              <a:t>Sfp</a:t>
+            </a:r>
+            <a:r>
+              <a:rPr lang="en-US" sz="1400" dirty="0"/>
+              <a:t> predicted </a:t>
+            </a:r>
+            <a:r>
+              <a:rPr lang="en-US" sz="1400" dirty="0" smtClean="0"/>
+              <a:t>peptides, 33/46 were </a:t>
+            </a:r>
+            <a:r>
+              <a:rPr lang="en-US" sz="1400" dirty="0" err="1"/>
+              <a:t>AcpS</a:t>
+            </a:r>
+            <a:r>
+              <a:rPr lang="en-US" sz="1400" dirty="0"/>
+              <a:t> predicted </a:t>
+            </a:r>
+            <a:r>
+              <a:rPr lang="en-US" sz="1400" dirty="0" smtClean="0"/>
+              <a:t>peptides, 2/46 were controls</a:t>
+            </a:r>
+          </a:p>
+          <a:p>
+            <a:pPr lvl="1"/>
+            <a:r>
+              <a:rPr lang="en-US" sz="1400" dirty="0" smtClean="0"/>
+              <a:t>Compare to 60 under the old normalization</a:t>
+            </a:r>
+          </a:p>
+          <a:p>
+            <a:pPr marL="0" indent="0">
+              <a:buNone/>
+            </a:pPr>
+            <a:r>
+              <a:rPr lang="en-US" sz="1400" dirty="0" err="1" smtClean="0"/>
+              <a:t>AcpS</a:t>
+            </a:r>
+            <a:r>
+              <a:rPr lang="en-US" sz="1400" dirty="0" smtClean="0"/>
+              <a:t> </a:t>
+            </a:r>
+            <a:r>
+              <a:rPr lang="en-US" sz="1400" dirty="0"/>
+              <a:t>labeling results</a:t>
+            </a:r>
+            <a:r>
+              <a:rPr lang="en-US" sz="1400" dirty="0" smtClean="0"/>
+              <a:t>:</a:t>
+            </a:r>
+          </a:p>
+          <a:p>
+            <a:r>
+              <a:rPr lang="en-US" sz="1400" b="1" dirty="0" smtClean="0"/>
+              <a:t>38 total peptides were specifically labeled by </a:t>
+            </a:r>
+            <a:r>
+              <a:rPr lang="en-US" sz="1400" b="1" dirty="0" err="1" smtClean="0"/>
+              <a:t>AcpS</a:t>
+            </a:r>
+            <a:r>
+              <a:rPr lang="en-US" sz="1400" b="1" dirty="0" smtClean="0"/>
+              <a:t>. </a:t>
+            </a:r>
+          </a:p>
+          <a:p>
+            <a:pPr lvl="1"/>
+            <a:r>
+              <a:rPr lang="en-US" sz="1400" dirty="0" smtClean="0"/>
+              <a:t>12/38 were </a:t>
+            </a:r>
+            <a:r>
+              <a:rPr lang="en-US" sz="1400" dirty="0" err="1" smtClean="0"/>
+              <a:t>AcpS</a:t>
+            </a:r>
+            <a:r>
+              <a:rPr lang="en-US" sz="1400" dirty="0" smtClean="0"/>
+              <a:t> predicted peptides, 22/38 were </a:t>
+            </a:r>
+            <a:r>
+              <a:rPr lang="en-US" sz="1400" dirty="0" err="1" smtClean="0"/>
+              <a:t>Sfp</a:t>
+            </a:r>
+            <a:r>
+              <a:rPr lang="en-US" sz="1400" dirty="0" smtClean="0"/>
+              <a:t> predicted peptides, 4/38 wer</a:t>
+            </a:r>
+            <a:r>
+              <a:rPr lang="en-US" sz="1400" dirty="0" smtClean="0"/>
+              <a:t>e controls</a:t>
+            </a:r>
+            <a:endParaRPr lang="en-US" sz="1400" dirty="0"/>
+          </a:p>
+          <a:p>
+            <a:pPr lvl="1"/>
+            <a:r>
+              <a:rPr lang="en-US" sz="1400" dirty="0" smtClean="0"/>
+              <a:t>Compare to 7 under the old normalization</a:t>
+            </a:r>
+          </a:p>
+          <a:p>
+            <a:pPr lvl="1"/>
+            <a:endParaRPr lang="en-US" sz="1400" dirty="0" smtClean="0"/>
+          </a:p>
+          <a:p>
+            <a:pPr marL="0" indent="0">
+              <a:buNone/>
+            </a:pPr>
+            <a:r>
+              <a:rPr lang="en-US" sz="1400" b="1" u="sng" dirty="0" smtClean="0"/>
+              <a:t>UNLABELING RESULTS</a:t>
+            </a:r>
+            <a:r>
+              <a:rPr lang="en-US" sz="1400" b="1" dirty="0" smtClean="0"/>
+              <a:t>:</a:t>
+            </a:r>
+          </a:p>
+          <a:p>
+            <a:pPr marL="0" indent="0">
+              <a:buNone/>
+            </a:pPr>
+            <a:r>
+              <a:rPr lang="en-US" sz="1400" dirty="0" err="1" smtClean="0"/>
+              <a:t>AcpS</a:t>
+            </a:r>
+            <a:r>
+              <a:rPr lang="en-US" sz="1400" dirty="0" smtClean="0"/>
+              <a:t> </a:t>
+            </a:r>
+            <a:r>
+              <a:rPr lang="en-US" sz="1400" dirty="0" err="1" smtClean="0"/>
+              <a:t>unlabeling</a:t>
+            </a:r>
+            <a:r>
+              <a:rPr lang="en-US" sz="1400" dirty="0" smtClean="0"/>
+              <a:t>:</a:t>
+            </a:r>
+          </a:p>
+          <a:p>
+            <a:r>
+              <a:rPr lang="en-US" sz="1400" b="1" dirty="0"/>
+              <a:t>4</a:t>
+            </a:r>
+            <a:r>
+              <a:rPr lang="en-US" sz="1400" b="1" dirty="0" smtClean="0"/>
+              <a:t> total peptides specifically labeled by </a:t>
+            </a:r>
+            <a:r>
+              <a:rPr lang="en-US" sz="1400" b="1" dirty="0" err="1" smtClean="0"/>
+              <a:t>AcpS</a:t>
+            </a:r>
+            <a:r>
+              <a:rPr lang="en-US" sz="1400" b="1" dirty="0" smtClean="0"/>
+              <a:t> were unlabeled. </a:t>
+            </a:r>
+          </a:p>
+          <a:p>
+            <a:pPr lvl="1"/>
+            <a:r>
+              <a:rPr lang="en-US" sz="1400" dirty="0" smtClean="0"/>
+              <a:t>2/4 were </a:t>
+            </a:r>
+            <a:r>
+              <a:rPr lang="en-US" sz="1400" dirty="0" err="1" smtClean="0"/>
+              <a:t>AcpS</a:t>
+            </a:r>
+            <a:r>
+              <a:rPr lang="en-US" sz="1400" dirty="0" smtClean="0"/>
+              <a:t> </a:t>
+            </a:r>
+            <a:r>
+              <a:rPr lang="en-US" sz="1400" dirty="0" smtClean="0"/>
+              <a:t>predicted </a:t>
+            </a:r>
+            <a:r>
+              <a:rPr lang="en-US" sz="1400" dirty="0" smtClean="0"/>
+              <a:t>peptides, 1/4 was a </a:t>
+            </a:r>
+            <a:r>
+              <a:rPr lang="en-US" sz="1400" dirty="0" err="1" smtClean="0"/>
+              <a:t>Sfp</a:t>
+            </a:r>
+            <a:r>
+              <a:rPr lang="en-US" sz="1400" dirty="0" smtClean="0"/>
+              <a:t> predicted peptide, 1/4 was a control</a:t>
+            </a:r>
+            <a:endParaRPr lang="en-US" sz="1400" dirty="0" smtClean="0"/>
+          </a:p>
+          <a:p>
+            <a:pPr lvl="1"/>
+            <a:r>
+              <a:rPr lang="en-US" sz="1400" dirty="0"/>
+              <a:t>Compare to </a:t>
+            </a:r>
+            <a:r>
+              <a:rPr lang="en-US" sz="1400" dirty="0" smtClean="0"/>
+              <a:t>0 </a:t>
+            </a:r>
+            <a:r>
+              <a:rPr lang="en-US" sz="1400" dirty="0"/>
+              <a:t>under the old </a:t>
+            </a:r>
+            <a:r>
+              <a:rPr lang="en-US" sz="1400" dirty="0" smtClean="0"/>
+              <a:t>normalization</a:t>
+            </a:r>
+            <a:endParaRPr lang="en-US" sz="1400" dirty="0" smtClean="0"/>
+          </a:p>
+          <a:p>
+            <a:pPr marL="0" indent="0">
+              <a:buNone/>
+            </a:pPr>
+            <a:r>
+              <a:rPr lang="en-US" sz="1400" dirty="0" err="1" smtClean="0"/>
+              <a:t>Sfp</a:t>
+            </a:r>
+            <a:r>
+              <a:rPr lang="en-US" sz="1400" dirty="0" smtClean="0"/>
+              <a:t> </a:t>
+            </a:r>
+            <a:r>
+              <a:rPr lang="en-US" sz="1400" dirty="0" err="1" smtClean="0"/>
+              <a:t>Unlabeling</a:t>
+            </a:r>
+            <a:r>
+              <a:rPr lang="en-US" sz="1400" dirty="0" smtClean="0"/>
+              <a:t>:</a:t>
+            </a:r>
+          </a:p>
+          <a:p>
+            <a:r>
+              <a:rPr lang="en-US" sz="1400" dirty="0" smtClean="0"/>
+              <a:t>23 total peptides specifically labeled by </a:t>
+            </a:r>
+            <a:r>
+              <a:rPr lang="en-US" sz="1400" dirty="0" err="1" smtClean="0"/>
+              <a:t>Sfp</a:t>
+            </a:r>
+            <a:r>
+              <a:rPr lang="en-US" sz="1400" dirty="0" smtClean="0"/>
+              <a:t> were unlabeled.</a:t>
+            </a:r>
+          </a:p>
+          <a:p>
+            <a:pPr lvl="1"/>
+            <a:r>
+              <a:rPr lang="en-US" sz="1400" dirty="0" smtClean="0"/>
+              <a:t>7/23 were </a:t>
+            </a:r>
+            <a:r>
+              <a:rPr lang="en-US" sz="1400" dirty="0" err="1" smtClean="0"/>
+              <a:t>Sfp</a:t>
+            </a:r>
+            <a:r>
+              <a:rPr lang="en-US" sz="1400" dirty="0" smtClean="0"/>
+              <a:t> predicted </a:t>
+            </a:r>
+            <a:r>
+              <a:rPr lang="en-US" sz="1400" dirty="0" smtClean="0"/>
+              <a:t>peptides, 16/23 were </a:t>
+            </a:r>
+            <a:r>
+              <a:rPr lang="en-US" sz="1400" dirty="0" err="1" smtClean="0"/>
+              <a:t>AcpS</a:t>
+            </a:r>
+            <a:r>
+              <a:rPr lang="en-US" sz="1400" dirty="0" smtClean="0"/>
+              <a:t> predicted peptides </a:t>
+            </a:r>
+          </a:p>
+          <a:p>
+            <a:pPr marL="0" indent="0">
+              <a:buNone/>
+            </a:pPr>
+            <a:endParaRPr lang="en-US" sz="1400" dirty="0" smtClean="0"/>
+          </a:p>
+          <a:p>
+            <a:pPr marL="0" indent="0">
+              <a:buNone/>
+            </a:pPr>
+            <a:r>
+              <a:rPr lang="en-US" sz="1400" b="1" dirty="0" smtClean="0"/>
+              <a:t>Under the new normalization: </a:t>
+            </a:r>
+          </a:p>
+          <a:p>
+            <a:pPr marL="0" indent="0">
+              <a:buNone/>
+            </a:pPr>
+            <a:r>
+              <a:rPr lang="en-US" sz="1400" b="1" dirty="0"/>
+              <a:t>	</a:t>
+            </a:r>
+            <a:r>
+              <a:rPr lang="en-US" sz="1400" b="1" dirty="0" smtClean="0"/>
+              <a:t>38 </a:t>
+            </a:r>
+            <a:r>
+              <a:rPr lang="en-US" sz="1400" b="1" dirty="0"/>
+              <a:t>peptides specifically labeled by </a:t>
+            </a:r>
+            <a:r>
+              <a:rPr lang="en-US" sz="1400" b="1" dirty="0" err="1"/>
+              <a:t>AcpS</a:t>
+            </a:r>
+            <a:r>
+              <a:rPr lang="en-US" sz="1400" b="1" dirty="0"/>
+              <a:t>;</a:t>
+            </a:r>
+            <a:br>
+              <a:rPr lang="en-US" sz="1400" b="1" dirty="0"/>
+            </a:br>
+            <a:r>
+              <a:rPr lang="en-US" sz="1400" b="1" dirty="0" smtClean="0"/>
+              <a:t>	of </a:t>
+            </a:r>
+            <a:r>
+              <a:rPr lang="en-US" sz="1400" b="1" dirty="0"/>
+              <a:t>these, 4 were unlabeled</a:t>
+            </a:r>
+            <a:endParaRPr lang="en-US" sz="1400" dirty="0"/>
+          </a:p>
+        </p:txBody>
+      </p:sp>
+      <p:sp>
+        <p:nvSpPr>
+          <p:cNvPr id="6" name="Title 1"/>
+          <p:cNvSpPr>
+            <a:spLocks noGrp="1"/>
+          </p:cNvSpPr>
+          <p:nvPr>
+            <p:ph type="title"/>
+          </p:nvPr>
+        </p:nvSpPr>
+        <p:spPr>
+          <a:xfrm>
+            <a:off x="-34413" y="76199"/>
+            <a:ext cx="9059998" cy="1210449"/>
+          </a:xfrm>
+        </p:spPr>
+        <p:txBody>
+          <a:bodyPr>
+            <a:noAutofit/>
+          </a:bodyPr>
+          <a:lstStyle/>
+          <a:p>
             <a:r>
               <a:rPr lang="en-US" sz="3600" b="1" dirty="0" smtClean="0"/>
-              <a:t>This new normalization changes our results, </a:t>
+              <a:t>This new normalization changes our </a:t>
+            </a:r>
+            <a:r>
+              <a:rPr lang="en-US" sz="3600" b="1" dirty="0" smtClean="0"/>
+              <a:t>results:</a:t>
             </a:r>
             <a:br>
               <a:rPr lang="en-US" sz="3600" b="1" dirty="0" smtClean="0"/>
@@ -7453,6 +7872,43 @@
           </a:p>
         </p:txBody>
       </p:sp>
+    </p:spTree>
+    <p:extLst>
+      <p:ext uri="{BB962C8B-B14F-4D97-AF65-F5344CB8AC3E}">
+        <p14:creationId xmlns:p14="http://schemas.microsoft.com/office/powerpoint/2010/main" val="1717739359"/>
+      </p:ext>
+    </p:extLst>
+  </p:cSld>
+  <p:clrMapOvr>
+    <a:masterClrMapping/>
+  </p:clrMapOvr>
+  <p:timing>
+    <p:tnLst>
+      <p:par>
+        <p:cTn xmlns:p14="http://schemas.microsoft.com/office/powerpoint/2010/main" id="1" dur="indefinite" restart="never" nodeType="tmRoot"/>
+      </p:par>
+    </p:tnLst>
+  </p:timing>
+</p:sld>
+</file>
+
+<file path=ppt/slides/slide9.xml><?xml version="1.0" encoding="utf-8"?>
+<p:sld xmlns:a="http://schemas.openxmlformats.org/drawingml/2006/main" xmlns:r="http://schemas.openxmlformats.org/officeDocument/2006/relationships" xmlns:p="http://schemas.openxmlformats.org/presentationml/2006/main">
+  <p:cSld>
+    <p:spTree>
+      <p:nvGrpSpPr>
+        <p:cNvPr id="1" name=""/>
+        <p:cNvGrpSpPr/>
+        <p:nvPr/>
+      </p:nvGrpSpPr>
+      <p:grpSpPr>
+        <a:xfrm>
+          <a:off x="0" y="0"/>
+          <a:ext cx="0" cy="0"/>
+          <a:chOff x="0" y="0"/>
+          <a:chExt cx="0" cy="0"/>
+        </a:xfrm>
+      </p:grpSpPr>
       <p:sp>
         <p:nvSpPr>
           <p:cNvPr id="3" name="Content Placeholder 2"/>
@@ -7465,8 +7921,8 @@
         </p:nvSpPr>
         <p:spPr>
           <a:xfrm>
-            <a:off x="228599" y="1534082"/>
-            <a:ext cx="8796985" cy="5139130"/>
+            <a:off x="377048" y="1368204"/>
+            <a:ext cx="8229600" cy="5015551"/>
           </a:xfrm>
         </p:spPr>
         <p:txBody>
@@ -7479,194 +7935,394 @@
               <a:buNone/>
             </a:pPr>
             <a:r>
-              <a:rPr lang="en-US" sz="2400" b="1" u="sng" dirty="0" smtClean="0"/>
+              <a:rPr lang="en-US" sz="1400" b="1" u="sng" dirty="0" smtClean="0"/>
               <a:t>LABELING RESULTS</a:t>
             </a:r>
             <a:r>
-              <a:rPr lang="en-US" sz="2400" b="1" dirty="0" smtClean="0"/>
+              <a:rPr lang="en-US" sz="1400" b="1" dirty="0" smtClean="0"/>
               <a:t>:</a:t>
             </a:r>
           </a:p>
           <a:p>
-            <a:r>
-              <a:rPr lang="en-US" sz="2400" dirty="0" err="1" smtClean="0"/>
+            <a:pPr marL="0" indent="0">
+              <a:buNone/>
+            </a:pPr>
+            <a:r>
+              <a:rPr lang="en-US" sz="1400" dirty="0" err="1"/>
               <a:t>Sfp</a:t>
             </a:r>
             <a:r>
-              <a:rPr lang="en-US" sz="2400" dirty="0" smtClean="0"/>
-              <a:t>: 46 peptides </a:t>
-            </a:r>
-            <a:r>
-              <a:rPr lang="en-US" sz="2400" dirty="0"/>
-              <a:t>were </a:t>
-            </a:r>
-            <a:r>
-              <a:rPr lang="en-US" sz="2400" dirty="0" smtClean="0"/>
-              <a:t>specifically labeled by </a:t>
-            </a:r>
-            <a:r>
-              <a:rPr lang="en-US" sz="2400" dirty="0" err="1" smtClean="0"/>
+              <a:rPr lang="en-US" sz="1400" dirty="0"/>
+              <a:t> labeling results:</a:t>
+            </a:r>
+          </a:p>
+          <a:p>
+            <a:r>
+              <a:rPr lang="en-US" sz="1400" dirty="0"/>
+              <a:t>46 </a:t>
+            </a:r>
+            <a:r>
+              <a:rPr lang="en-US" sz="1400" dirty="0" smtClean="0"/>
+              <a:t>peptides </a:t>
+            </a:r>
+            <a:r>
+              <a:rPr lang="en-US" sz="1400" dirty="0"/>
+              <a:t>were specifically labeled by </a:t>
+            </a:r>
+            <a:r>
+              <a:rPr lang="en-US" sz="1400" dirty="0" err="1"/>
               <a:t>Sfp</a:t>
             </a:r>
             <a:r>
-              <a:rPr lang="en-US" sz="2400" dirty="0" smtClean="0"/>
+              <a:rPr lang="en-US" sz="1400" dirty="0"/>
+              <a:t>.</a:t>
+            </a:r>
+          </a:p>
+          <a:p>
+            <a:pPr lvl="1"/>
+            <a:r>
+              <a:rPr lang="en-US" sz="1400" dirty="0" smtClean="0"/>
+              <a:t>11/46 were </a:t>
+            </a:r>
+            <a:r>
+              <a:rPr lang="en-US" sz="1400" dirty="0" err="1"/>
+              <a:t>Sfp</a:t>
+            </a:r>
+            <a:r>
+              <a:rPr lang="en-US" sz="1400" dirty="0"/>
+              <a:t> predicted </a:t>
+            </a:r>
+            <a:r>
+              <a:rPr lang="en-US" sz="1400" dirty="0" smtClean="0"/>
+              <a:t>peptides, 33/46 were </a:t>
+            </a:r>
+            <a:r>
+              <a:rPr lang="en-US" sz="1400" dirty="0" err="1"/>
+              <a:t>AcpS</a:t>
+            </a:r>
+            <a:r>
+              <a:rPr lang="en-US" sz="1400" dirty="0"/>
+              <a:t> predicted </a:t>
+            </a:r>
+            <a:r>
+              <a:rPr lang="en-US" sz="1400" dirty="0" smtClean="0"/>
+              <a:t>peptides, 2/46 were controls</a:t>
+            </a:r>
+          </a:p>
+          <a:p>
+            <a:pPr lvl="1"/>
+            <a:r>
+              <a:rPr lang="en-US" sz="1400" dirty="0" smtClean="0"/>
+              <a:t>Compare to 60 under the old normalization.</a:t>
+            </a:r>
+          </a:p>
+          <a:p>
+            <a:pPr marL="0" indent="0">
+              <a:buNone/>
+            </a:pPr>
+            <a:r>
+              <a:rPr lang="en-US" sz="1400" dirty="0" err="1" smtClean="0"/>
+              <a:t>AcpS</a:t>
+            </a:r>
+            <a:r>
+              <a:rPr lang="en-US" sz="1400" dirty="0" smtClean="0"/>
+              <a:t> </a:t>
+            </a:r>
+            <a:r>
+              <a:rPr lang="en-US" sz="1400" dirty="0"/>
+              <a:t>labeling results</a:t>
+            </a:r>
+            <a:r>
+              <a:rPr lang="en-US" sz="1400" dirty="0" smtClean="0"/>
+              <a:t>:</a:t>
+            </a:r>
+          </a:p>
+          <a:p>
+            <a:r>
+              <a:rPr lang="en-US" sz="1400" dirty="0" smtClean="0"/>
+              <a:t>38 total peptides were specifically labeled by </a:t>
+            </a:r>
+            <a:r>
+              <a:rPr lang="en-US" sz="1400" dirty="0" err="1" smtClean="0"/>
+              <a:t>AcpS</a:t>
+            </a:r>
+            <a:r>
+              <a:rPr lang="en-US" sz="1400" dirty="0" smtClean="0"/>
               <a:t>. </a:t>
             </a:r>
           </a:p>
           <a:p>
-            <a:pPr lvl="2"/>
-            <a:r>
-              <a:rPr lang="en-US" sz="1600" dirty="0" smtClean="0"/>
-              <a:t>[vs. 60 under the old normalization]</a:t>
-            </a:r>
-            <a:endParaRPr lang="en-US" sz="1600" dirty="0"/>
-          </a:p>
-          <a:p>
-            <a:r>
-              <a:rPr lang="en-US" sz="2400" b="1" dirty="0" err="1" smtClean="0"/>
+            <a:pPr lvl="1"/>
+            <a:r>
+              <a:rPr lang="en-US" sz="1400" dirty="0" smtClean="0"/>
+              <a:t>12/38 were </a:t>
+            </a:r>
+            <a:r>
+              <a:rPr lang="en-US" sz="1400" dirty="0" err="1" smtClean="0"/>
               <a:t>AcpS</a:t>
             </a:r>
             <a:r>
-              <a:rPr lang="en-US" sz="2400" b="1" dirty="0" smtClean="0"/>
-              <a:t>: 38 peptides </a:t>
-            </a:r>
-            <a:r>
-              <a:rPr lang="en-US" sz="2400" b="1" dirty="0" smtClean="0"/>
-              <a:t>were specifically labeled by </a:t>
-            </a:r>
-            <a:r>
-              <a:rPr lang="en-US" sz="2400" b="1" dirty="0" err="1" smtClean="0"/>
+              <a:rPr lang="en-US" sz="1400" dirty="0" smtClean="0"/>
+              <a:t> predicted peptides, 22/38 were </a:t>
+            </a:r>
+            <a:r>
+              <a:rPr lang="en-US" sz="1400" dirty="0" err="1" smtClean="0"/>
+              <a:t>Sfp</a:t>
+            </a:r>
+            <a:r>
+              <a:rPr lang="en-US" sz="1400" dirty="0" smtClean="0"/>
+              <a:t> predicted peptides, 4/38 wer</a:t>
+            </a:r>
+            <a:r>
+              <a:rPr lang="en-US" sz="1400" dirty="0" smtClean="0"/>
+              <a:t>e controls</a:t>
+            </a:r>
+            <a:endParaRPr lang="en-US" sz="1400" dirty="0"/>
+          </a:p>
+          <a:p>
+            <a:pPr lvl="1"/>
+            <a:r>
+              <a:rPr lang="en-US" sz="1400" dirty="0" smtClean="0"/>
+              <a:t>Compare to 7 under the old normalization.</a:t>
+            </a:r>
+          </a:p>
+          <a:p>
+            <a:pPr lvl="1"/>
+            <a:endParaRPr lang="en-US" sz="1400" dirty="0" smtClean="0"/>
+          </a:p>
+          <a:p>
+            <a:pPr marL="0" indent="0">
+              <a:buNone/>
+            </a:pPr>
+            <a:r>
+              <a:rPr lang="en-US" sz="1400" b="1" u="sng" dirty="0" smtClean="0"/>
+              <a:t>UNLABELING RESULTS</a:t>
+            </a:r>
+            <a:r>
+              <a:rPr lang="en-US" sz="1400" b="1" dirty="0" smtClean="0"/>
+              <a:t>:</a:t>
+            </a:r>
+          </a:p>
+          <a:p>
+            <a:pPr marL="0" indent="0">
+              <a:buNone/>
+            </a:pPr>
+            <a:r>
+              <a:rPr lang="en-US" sz="1400" dirty="0" err="1"/>
+              <a:t>Sfp</a:t>
+            </a:r>
+            <a:r>
+              <a:rPr lang="en-US" sz="1400" dirty="0"/>
+              <a:t> </a:t>
+            </a:r>
+            <a:r>
+              <a:rPr lang="en-US" sz="1400" dirty="0" err="1"/>
+              <a:t>Unlabeling</a:t>
+            </a:r>
+            <a:r>
+              <a:rPr lang="en-US" sz="1400" dirty="0"/>
+              <a:t>:</a:t>
+            </a:r>
+          </a:p>
+          <a:p>
+            <a:r>
+              <a:rPr lang="en-US" sz="1400" dirty="0"/>
+              <a:t>23 total peptides specifically labeled by </a:t>
+            </a:r>
+            <a:r>
+              <a:rPr lang="en-US" sz="1400" dirty="0" err="1"/>
+              <a:t>Sfp</a:t>
+            </a:r>
+            <a:r>
+              <a:rPr lang="en-US" sz="1400" dirty="0"/>
+              <a:t> were unlabeled.</a:t>
+            </a:r>
+          </a:p>
+          <a:p>
+            <a:pPr lvl="1"/>
+            <a:r>
+              <a:rPr lang="en-US" sz="1400" dirty="0"/>
+              <a:t>7/23 were </a:t>
+            </a:r>
+            <a:r>
+              <a:rPr lang="en-US" sz="1400" dirty="0" err="1"/>
+              <a:t>Sfp</a:t>
+            </a:r>
+            <a:r>
+              <a:rPr lang="en-US" sz="1400" dirty="0"/>
+              <a:t> predicted peptides, 16/23 were </a:t>
+            </a:r>
+            <a:r>
+              <a:rPr lang="en-US" sz="1400" dirty="0" err="1"/>
               <a:t>AcpS</a:t>
             </a:r>
             <a:r>
-              <a:rPr lang="en-US" sz="2400" dirty="0" smtClean="0"/>
-              <a:t>. </a:t>
-            </a:r>
-            <a:endParaRPr lang="en-US" sz="2400" dirty="0" smtClean="0"/>
-          </a:p>
-          <a:p>
-            <a:pPr lvl="2"/>
-            <a:r>
-              <a:rPr lang="en-US" sz="1600" dirty="0" smtClean="0"/>
-              <a:t>[vs. 7 under the old normalization]</a:t>
-            </a:r>
-            <a:endParaRPr lang="en-US" sz="1600" dirty="0" smtClean="0"/>
-          </a:p>
-          <a:p>
-            <a:pPr marL="457200" lvl="1" indent="0">
+              <a:rPr lang="en-US" sz="1400" dirty="0"/>
+              <a:t> predicted peptides.</a:t>
+            </a:r>
+          </a:p>
+          <a:p>
+            <a:pPr lvl="1"/>
+            <a:r>
+              <a:rPr lang="en-US" sz="1400" dirty="0"/>
+              <a:t>Compare </a:t>
+            </a:r>
+            <a:r>
+              <a:rPr lang="en-US" sz="1400"/>
+              <a:t>to </a:t>
+            </a:r>
+            <a:r>
+              <a:rPr lang="en-US" sz="1400" smtClean="0"/>
+              <a:t>41 under </a:t>
+            </a:r>
+            <a:r>
+              <a:rPr lang="en-US" sz="1400" dirty="0" smtClean="0"/>
+              <a:t>the old normalization.</a:t>
+            </a:r>
+            <a:endParaRPr lang="en-US" sz="1400" dirty="0"/>
+          </a:p>
+          <a:p>
+            <a:pPr marL="0" indent="0">
               <a:buNone/>
             </a:pPr>
-            <a:endParaRPr lang="en-US" sz="2400" dirty="0" smtClean="0"/>
-          </a:p>
-          <a:p>
-            <a:pPr marL="0" indent="0">
-              <a:buNone/>
-            </a:pPr>
-            <a:r>
-              <a:rPr lang="en-US" sz="2400" b="1" u="sng" dirty="0" smtClean="0"/>
-              <a:t>UNLABELING RESULTS</a:t>
-            </a:r>
-            <a:r>
-              <a:rPr lang="en-US" sz="2400" b="1" dirty="0" smtClean="0"/>
+            <a:r>
+              <a:rPr lang="en-US" sz="1400" dirty="0" err="1" smtClean="0"/>
+              <a:t>AcpS</a:t>
+            </a:r>
+            <a:r>
+              <a:rPr lang="en-US" sz="1400" dirty="0" smtClean="0"/>
+              <a:t> </a:t>
+            </a:r>
+            <a:r>
+              <a:rPr lang="en-US" sz="1400" dirty="0" err="1" smtClean="0"/>
+              <a:t>unlabeling</a:t>
+            </a:r>
+            <a:r>
+              <a:rPr lang="en-US" sz="1400" dirty="0" smtClean="0"/>
               <a:t>:</a:t>
             </a:r>
           </a:p>
           <a:p>
             <a:r>
-              <a:rPr lang="en-US" sz="2400" dirty="0" err="1" smtClean="0"/>
+              <a:rPr lang="en-US" sz="1400" dirty="0"/>
+              <a:t>4</a:t>
+            </a:r>
+            <a:r>
+              <a:rPr lang="en-US" sz="1400" dirty="0" smtClean="0"/>
+              <a:t> total peptides specifically labeled by </a:t>
+            </a:r>
+            <a:r>
+              <a:rPr lang="en-US" sz="1400" dirty="0" err="1" smtClean="0"/>
+              <a:t>AcpS</a:t>
+            </a:r>
+            <a:r>
+              <a:rPr lang="en-US" sz="1400" dirty="0" smtClean="0"/>
+              <a:t> were unlabeled. </a:t>
+            </a:r>
+          </a:p>
+          <a:p>
+            <a:pPr lvl="1"/>
+            <a:r>
+              <a:rPr lang="en-US" sz="1400" dirty="0" smtClean="0"/>
+              <a:t>2/4 were </a:t>
+            </a:r>
+            <a:r>
+              <a:rPr lang="en-US" sz="1400" dirty="0" err="1" smtClean="0"/>
+              <a:t>AcpS</a:t>
+            </a:r>
+            <a:r>
+              <a:rPr lang="en-US" sz="1400" dirty="0" smtClean="0"/>
+              <a:t> </a:t>
+            </a:r>
+            <a:r>
+              <a:rPr lang="en-US" sz="1400" dirty="0" smtClean="0"/>
+              <a:t>predicted </a:t>
+            </a:r>
+            <a:r>
+              <a:rPr lang="en-US" sz="1400" dirty="0" smtClean="0"/>
+              <a:t>peptides, 1/4 was a </a:t>
+            </a:r>
+            <a:r>
+              <a:rPr lang="en-US" sz="1400" dirty="0" err="1" smtClean="0"/>
               <a:t>Sfp</a:t>
             </a:r>
             <a:r>
-              <a:rPr lang="en-US" sz="2400" dirty="0" smtClean="0"/>
-              <a:t>: 23 peptides </a:t>
-            </a:r>
-            <a:r>
-              <a:rPr lang="en-US" sz="2400" dirty="0"/>
-              <a:t>specifically labeled by </a:t>
-            </a:r>
-            <a:r>
-              <a:rPr lang="en-US" sz="2400" dirty="0" err="1"/>
-              <a:t>Sfp</a:t>
-            </a:r>
-            <a:r>
-              <a:rPr lang="en-US" sz="2400" dirty="0"/>
-              <a:t> </a:t>
-            </a:r>
-            <a:r>
-              <a:rPr lang="en-US" sz="2400" dirty="0" smtClean="0"/>
-              <a:t>were unlabeled. </a:t>
-            </a:r>
-          </a:p>
-          <a:p>
-            <a:pPr lvl="2"/>
-            <a:r>
-              <a:rPr lang="en-US" sz="1600" dirty="0" smtClean="0"/>
-              <a:t>[vs. 41 under the old normalization]</a:t>
-            </a:r>
-            <a:endParaRPr lang="en-US" sz="1600" dirty="0"/>
-          </a:p>
-          <a:p>
-            <a:r>
-              <a:rPr lang="en-US" sz="2400" b="1" dirty="0" err="1" smtClean="0"/>
+              <a:rPr lang="en-US" sz="1400" dirty="0" smtClean="0"/>
+              <a:t> predicted peptide, 1/4 was a control</a:t>
+            </a:r>
+            <a:endParaRPr lang="en-US" sz="1400" dirty="0" smtClean="0"/>
+          </a:p>
+          <a:p>
+            <a:pPr lvl="1"/>
+            <a:r>
+              <a:rPr lang="en-US" sz="1400" dirty="0"/>
+              <a:t>Compare to </a:t>
+            </a:r>
+            <a:r>
+              <a:rPr lang="en-US" sz="1400" dirty="0" smtClean="0"/>
+              <a:t>0 </a:t>
+            </a:r>
+            <a:r>
+              <a:rPr lang="en-US" sz="1400" dirty="0"/>
+              <a:t>under the old </a:t>
+            </a:r>
+            <a:r>
+              <a:rPr lang="en-US" sz="1400" dirty="0" smtClean="0"/>
+              <a:t>normalization.</a:t>
+            </a:r>
+            <a:endParaRPr lang="en-US" sz="1400" dirty="0" smtClean="0"/>
+          </a:p>
+        </p:txBody>
+      </p:sp>
+      <p:sp>
+        <p:nvSpPr>
+          <p:cNvPr id="6" name="Title 1"/>
+          <p:cNvSpPr>
+            <a:spLocks noGrp="1"/>
+          </p:cNvSpPr>
+          <p:nvPr>
+            <p:ph type="title"/>
+          </p:nvPr>
+        </p:nvSpPr>
+        <p:spPr>
+          <a:xfrm>
+            <a:off x="-34413" y="76199"/>
+            <a:ext cx="9059998" cy="1210449"/>
+          </a:xfrm>
+        </p:spPr>
+        <p:txBody>
+          <a:bodyPr>
+            <a:noAutofit/>
+          </a:bodyPr>
+          <a:lstStyle/>
+          <a:p>
+            <a:r>
+              <a:rPr lang="en-US" sz="3600" b="1" dirty="0" smtClean="0"/>
+              <a:t>This new normalization changes our </a:t>
+            </a:r>
+            <a:r>
+              <a:rPr lang="en-US" sz="3600" b="1" dirty="0" smtClean="0"/>
+              <a:t>results:</a:t>
+            </a:r>
+            <a:br>
+              <a:rPr lang="en-US" sz="3600" b="1" dirty="0" smtClean="0"/>
+            </a:br>
+            <a:r>
+              <a:rPr lang="en-US" sz="3600" b="1" dirty="0" smtClean="0"/>
+              <a:t>especially for </a:t>
+            </a:r>
+            <a:r>
+              <a:rPr lang="en-US" sz="3600" b="1" dirty="0" err="1" smtClean="0"/>
               <a:t>AcpS</a:t>
             </a:r>
-            <a:r>
-              <a:rPr lang="en-US" sz="2400" b="1" dirty="0" smtClean="0"/>
-              <a:t>: 4 peptides </a:t>
-            </a:r>
-            <a:r>
-              <a:rPr lang="en-US" sz="2400" b="1" dirty="0" smtClean="0"/>
-              <a:t>specifically labeled by </a:t>
-            </a:r>
-            <a:r>
-              <a:rPr lang="en-US" sz="2400" b="1" dirty="0" err="1" smtClean="0"/>
-              <a:t>AcpS</a:t>
-            </a:r>
-            <a:r>
-              <a:rPr lang="en-US" sz="2400" b="1" dirty="0" smtClean="0"/>
-              <a:t> were </a:t>
-            </a:r>
-            <a:r>
-              <a:rPr lang="en-US" sz="2400" b="1" dirty="0" smtClean="0"/>
-              <a:t>unlabeled.</a:t>
-            </a:r>
-            <a:r>
-              <a:rPr lang="en-US" sz="2400" dirty="0" smtClean="0"/>
-              <a:t> </a:t>
-            </a:r>
-          </a:p>
-          <a:p>
-            <a:pPr lvl="2"/>
-            <a:r>
-              <a:rPr lang="en-US" sz="1600" dirty="0" smtClean="0"/>
-              <a:t>[vs. 0 under the old normalization] </a:t>
-            </a:r>
-            <a:endParaRPr lang="en-US" sz="1600" dirty="0" smtClean="0"/>
-          </a:p>
-          <a:p>
-            <a:pPr marL="0" indent="0">
-              <a:buNone/>
-            </a:pPr>
-            <a:endParaRPr lang="en-US" sz="1400" dirty="0" smtClean="0"/>
-          </a:p>
-          <a:p>
-            <a:pPr marL="0" indent="0">
-              <a:buNone/>
-            </a:pPr>
-            <a:endParaRPr lang="en-US" sz="1400" dirty="0" smtClean="0"/>
-          </a:p>
-          <a:p>
-            <a:pPr marL="0" indent="0">
-              <a:buNone/>
-            </a:pPr>
-            <a:endParaRPr lang="en-US" sz="1400" dirty="0"/>
+            <a:endParaRPr lang="en-US" sz="3600" b="1" dirty="0"/>
           </a:p>
         </p:txBody>
       </p:sp>
     </p:spTree>
     <p:extLst>
       <p:ext uri="{BB962C8B-B14F-4D97-AF65-F5344CB8AC3E}">
-        <p14:creationId xmlns:p14="http://schemas.microsoft.com/office/powerpoint/2010/main" val="3639906486"/>
+        <p14:creationId xmlns:p14="http://schemas.microsoft.com/office/powerpoint/2010/main" val="1224734267"/>
       </p:ext>
     </p:extLst>
   </p:cSld>

</xml_diff>